<commit_message>
Presentacion - Más animaciones
</commit_message>
<xml_diff>
--- a/- Presentacion/Filminas.pptx
+++ b/- Presentacion/Filminas.pptx
@@ -3392,7 +3392,7 @@
       <dsp:spPr>
         <a:xfrm>
           <a:off x="531159" y="353056"/>
-          <a:ext cx="7832505" cy="706564"/>
+          <a:ext cx="9913717" cy="706564"/>
         </a:xfrm>
         <a:prstGeom prst="rect">
           <a:avLst/>
@@ -3463,7 +3463,7 @@
       </dsp:txBody>
       <dsp:txXfrm>
         <a:off x="531159" y="353056"/>
-        <a:ext cx="7832505" cy="706564"/>
+        <a:ext cx="9913717" cy="706564"/>
       </dsp:txXfrm>
     </dsp:sp>
     <dsp:sp modelId="{017BCD35-B270-4953-93F3-E98EC436D09D}">
@@ -3521,7 +3521,7 @@
       <dsp:spPr>
         <a:xfrm>
           <a:off x="1037463" y="1412563"/>
-          <a:ext cx="7326201" cy="706564"/>
+          <a:ext cx="9407413" cy="706564"/>
         </a:xfrm>
         <a:prstGeom prst="rect">
           <a:avLst/>
@@ -3588,7 +3588,7 @@
       </dsp:txBody>
       <dsp:txXfrm>
         <a:off x="1037463" y="1412563"/>
-        <a:ext cx="7326201" cy="706564"/>
+        <a:ext cx="9407413" cy="706564"/>
       </dsp:txXfrm>
     </dsp:sp>
     <dsp:sp modelId="{272D4433-559A-4779-8B7F-22EF277DBA6D}">
@@ -3646,7 +3646,7 @@
       <dsp:spPr>
         <a:xfrm>
           <a:off x="1192857" y="2472071"/>
-          <a:ext cx="7170807" cy="706564"/>
+          <a:ext cx="9252019" cy="706564"/>
         </a:xfrm>
         <a:prstGeom prst="rect">
           <a:avLst/>
@@ -3713,7 +3713,7 @@
       </dsp:txBody>
       <dsp:txXfrm>
         <a:off x="1192857" y="2472071"/>
-        <a:ext cx="7170807" cy="706564"/>
+        <a:ext cx="9252019" cy="706564"/>
       </dsp:txXfrm>
     </dsp:sp>
     <dsp:sp modelId="{F65C6A59-F8DE-4C69-A481-7A4DEA8869C9}">
@@ -3771,7 +3771,7 @@
       <dsp:spPr>
         <a:xfrm>
           <a:off x="1037463" y="3531579"/>
-          <a:ext cx="7326201" cy="706564"/>
+          <a:ext cx="9407413" cy="706564"/>
         </a:xfrm>
         <a:prstGeom prst="rect">
           <a:avLst/>
@@ -3838,7 +3838,7 @@
       </dsp:txBody>
       <dsp:txXfrm>
         <a:off x="1037463" y="3531579"/>
-        <a:ext cx="7326201" cy="706564"/>
+        <a:ext cx="9407413" cy="706564"/>
       </dsp:txXfrm>
     </dsp:sp>
     <dsp:sp modelId="{ECFACE56-4127-49A5-8FE8-03AFD291208F}">
@@ -3896,7 +3896,7 @@
       <dsp:spPr>
         <a:xfrm>
           <a:off x="531159" y="4591087"/>
-          <a:ext cx="7832505" cy="706564"/>
+          <a:ext cx="9913717" cy="706564"/>
         </a:xfrm>
         <a:prstGeom prst="rect">
           <a:avLst/>
@@ -3963,7 +3963,7 @@
       </dsp:txBody>
       <dsp:txXfrm>
         <a:off x="531159" y="4591087"/>
-        <a:ext cx="7832505" cy="706564"/>
+        <a:ext cx="9913717" cy="706564"/>
       </dsp:txXfrm>
     </dsp:sp>
     <dsp:sp modelId="{1BFE37C5-1F74-4ABC-9314-CE560FA74291}">
@@ -17047,10 +17047,10 @@
   </p:clrMapOvr>
   <mc:AlternateContent xmlns:mc="http://schemas.openxmlformats.org/markup-compatibility/2006">
     <mc:Choice xmlns:p14="http://schemas.microsoft.com/office/powerpoint/2010/main" Requires="p14">
-      <p:transition spd="slow" p14:dur="2000" advClick="0" advTm="1249"/>
+      <p:transition spd="slow" p14:dur="2000" advTm="1249"/>
     </mc:Choice>
     <mc:Fallback>
-      <p:transition spd="slow" advClick="0" advTm="1249"/>
+      <p:transition spd="slow" advTm="1249"/>
     </mc:Fallback>
   </mc:AlternateContent>
   <p:timing>
@@ -17348,14 +17348,6 @@
   <p:clrMapOvr>
     <a:masterClrMapping/>
   </p:clrMapOvr>
-  <mc:AlternateContent xmlns:mc="http://schemas.openxmlformats.org/markup-compatibility/2006">
-    <mc:Choice xmlns:p14="http://schemas.microsoft.com/office/powerpoint/2010/main" Requires="p14">
-      <p:transition spd="slow" p14:dur="2000" advClick="0"/>
-    </mc:Choice>
-    <mc:Fallback>
-      <p:transition spd="slow" advClick="0"/>
-    </mc:Fallback>
-  </mc:AlternateContent>
   <p:timing>
     <p:tnLst>
       <p:par>
@@ -17933,24 +17925,15 @@
                                   </p:childTnLst>
                                 </p:cTn>
                               </p:par>
-                            </p:childTnLst>
-                          </p:cTn>
-                        </p:par>
-                        <p:par>
-                          <p:cTn id="51" fill="hold">
-                            <p:stCondLst>
-                              <p:cond delay="21500"/>
-                            </p:stCondLst>
-                            <p:childTnLst>
                               <p:par>
-                                <p:cTn id="52" presetID="10" presetClass="exit" presetSubtype="0" fill="hold" nodeType="afterEffect">
+                                <p:cTn id="51" presetID="10" presetClass="exit" presetSubtype="0" fill="hold" nodeType="withEffect">
                                   <p:stCondLst>
-                                    <p:cond delay="0"/>
+                                    <p:cond delay="2000"/>
                                   </p:stCondLst>
                                   <p:childTnLst>
                                     <p:animEffect transition="out" filter="fade">
                                       <p:cBhvr>
-                                        <p:cTn id="53" dur="500"/>
+                                        <p:cTn id="52" dur="500"/>
                                         <p:tgtEl>
                                           <p:spTgt spid="29"/>
                                         </p:tgtEl>
@@ -17958,7 +17941,7 @@
                                     </p:animEffect>
                                     <p:set>
                                       <p:cBhvr>
-                                        <p:cTn id="54" dur="1" fill="hold">
+                                        <p:cTn id="53" dur="1" fill="hold">
                                           <p:stCondLst>
                                             <p:cond delay="499"/>
                                           </p:stCondLst>
@@ -18299,14 +18282,6 @@
   <p:clrMapOvr>
     <a:masterClrMapping/>
   </p:clrMapOvr>
-  <mc:AlternateContent xmlns:mc="http://schemas.openxmlformats.org/markup-compatibility/2006">
-    <mc:Choice xmlns:p14="http://schemas.microsoft.com/office/powerpoint/2010/main" Requires="p14">
-      <p:transition spd="slow" p14:dur="2000" advClick="0"/>
-    </mc:Choice>
-    <mc:Fallback>
-      <p:transition spd="slow" advClick="0"/>
-    </mc:Fallback>
-  </mc:AlternateContent>
   <p:timing>
     <p:tnLst>
       <p:par>
@@ -19292,8 +19267,8 @@
         </p:blipFill>
         <p:spPr>
           <a:xfrm>
-            <a:off x="732722" y="1300163"/>
-            <a:ext cx="3809619" cy="2555364"/>
+            <a:off x="1123605" y="93687"/>
+            <a:ext cx="9944790" cy="6670628"/>
           </a:xfrm>
           <a:prstGeom prst="rect">
             <a:avLst/>
@@ -19322,8 +19297,8 @@
         </p:blipFill>
         <p:spPr>
           <a:xfrm>
-            <a:off x="4816624" y="1300163"/>
-            <a:ext cx="3825785" cy="2555364"/>
+            <a:off x="1160479" y="132408"/>
+            <a:ext cx="9871042" cy="6593184"/>
           </a:xfrm>
           <a:prstGeom prst="rect">
             <a:avLst/>
@@ -19352,8 +19327,8 @@
         </p:blipFill>
         <p:spPr>
           <a:xfrm>
-            <a:off x="2871056" y="4026273"/>
-            <a:ext cx="3342569" cy="2258833"/>
+            <a:off x="1160479" y="93686"/>
+            <a:ext cx="9871042" cy="6670629"/>
           </a:xfrm>
           <a:prstGeom prst="rect">
             <a:avLst/>
@@ -19370,14 +19345,6 @@
   <p:clrMapOvr>
     <a:masterClrMapping/>
   </p:clrMapOvr>
-  <mc:AlternateContent xmlns:mc="http://schemas.openxmlformats.org/markup-compatibility/2006">
-    <mc:Choice xmlns:p14="http://schemas.microsoft.com/office/powerpoint/2010/main" Requires="p14">
-      <p:transition spd="slow" p14:dur="2000" advClick="0"/>
-    </mc:Choice>
-    <mc:Fallback>
-      <p:transition spd="slow" advClick="0"/>
-    </mc:Fallback>
-  </mc:AlternateContent>
   <p:timing>
     <p:tnLst>
       <p:par>
@@ -19433,6 +19400,342 @@
                                         </p:tgtEl>
                                       </p:cBhvr>
                                     </p:animEffect>
+                                  </p:childTnLst>
+                                </p:cTn>
+                              </p:par>
+                            </p:childTnLst>
+                          </p:cTn>
+                        </p:par>
+                        <p:par>
+                          <p:cTn id="8" fill="hold">
+                            <p:stCondLst>
+                              <p:cond delay="1000"/>
+                            </p:stCondLst>
+                            <p:childTnLst>
+                              <p:par>
+                                <p:cTn id="9" presetID="53" presetClass="entr" presetSubtype="16" fill="hold" nodeType="afterEffect">
+                                  <p:stCondLst>
+                                    <p:cond delay="1000"/>
+                                  </p:stCondLst>
+                                  <p:childTnLst>
+                                    <p:set>
+                                      <p:cBhvr>
+                                        <p:cTn id="10" dur="1" fill="hold">
+                                          <p:stCondLst>
+                                            <p:cond delay="0"/>
+                                          </p:stCondLst>
+                                        </p:cTn>
+                                        <p:tgtEl>
+                                          <p:spTgt spid="4"/>
+                                        </p:tgtEl>
+                                        <p:attrNameLst>
+                                          <p:attrName>style.visibility</p:attrName>
+                                        </p:attrNameLst>
+                                      </p:cBhvr>
+                                      <p:to>
+                                        <p:strVal val="visible"/>
+                                      </p:to>
+                                    </p:set>
+                                    <p:anim calcmode="lin" valueType="num">
+                                      <p:cBhvr>
+                                        <p:cTn id="11" dur="2000" fill="hold"/>
+                                        <p:tgtEl>
+                                          <p:spTgt spid="4"/>
+                                        </p:tgtEl>
+                                        <p:attrNameLst>
+                                          <p:attrName>ppt_w</p:attrName>
+                                        </p:attrNameLst>
+                                      </p:cBhvr>
+                                      <p:tavLst>
+                                        <p:tav tm="0">
+                                          <p:val>
+                                            <p:fltVal val="0"/>
+                                          </p:val>
+                                        </p:tav>
+                                        <p:tav tm="100000">
+                                          <p:val>
+                                            <p:strVal val="#ppt_w"/>
+                                          </p:val>
+                                        </p:tav>
+                                      </p:tavLst>
+                                    </p:anim>
+                                    <p:anim calcmode="lin" valueType="num">
+                                      <p:cBhvr>
+                                        <p:cTn id="12" dur="2000" fill="hold"/>
+                                        <p:tgtEl>
+                                          <p:spTgt spid="4"/>
+                                        </p:tgtEl>
+                                        <p:attrNameLst>
+                                          <p:attrName>ppt_h</p:attrName>
+                                        </p:attrNameLst>
+                                      </p:cBhvr>
+                                      <p:tavLst>
+                                        <p:tav tm="0">
+                                          <p:val>
+                                            <p:fltVal val="0"/>
+                                          </p:val>
+                                        </p:tav>
+                                        <p:tav tm="100000">
+                                          <p:val>
+                                            <p:strVal val="#ppt_h"/>
+                                          </p:val>
+                                        </p:tav>
+                                      </p:tavLst>
+                                    </p:anim>
+                                    <p:animEffect transition="in" filter="fade">
+                                      <p:cBhvr>
+                                        <p:cTn id="13" dur="2000"/>
+                                        <p:tgtEl>
+                                          <p:spTgt spid="4"/>
+                                        </p:tgtEl>
+                                      </p:cBhvr>
+                                    </p:animEffect>
+                                  </p:childTnLst>
+                                </p:cTn>
+                              </p:par>
+                              <p:par>
+                                <p:cTn id="14" presetID="42" presetClass="path" presetSubtype="0" accel="50000" decel="50000" fill="hold" nodeType="withEffect">
+                                  <p:stCondLst>
+                                    <p:cond delay="1000"/>
+                                  </p:stCondLst>
+                                  <p:childTnLst>
+                                    <p:animMotion origin="layout" path="M -0.5 0.5 L 0 0 " pathEditMode="relative" rAng="0" ptsTypes="AA">
+                                      <p:cBhvr>
+                                        <p:cTn id="15" dur="2000" fill="hold"/>
+                                        <p:tgtEl>
+                                          <p:spTgt spid="4"/>
+                                        </p:tgtEl>
+                                        <p:attrNameLst>
+                                          <p:attrName>ppt_x</p:attrName>
+                                          <p:attrName>ppt_y</p:attrName>
+                                        </p:attrNameLst>
+                                      </p:cBhvr>
+                                      <p:rCtr x="25000" y="-25000"/>
+                                    </p:animMotion>
+                                  </p:childTnLst>
+                                </p:cTn>
+                              </p:par>
+                            </p:childTnLst>
+                          </p:cTn>
+                        </p:par>
+                        <p:par>
+                          <p:cTn id="16" fill="hold">
+                            <p:stCondLst>
+                              <p:cond delay="4000"/>
+                            </p:stCondLst>
+                            <p:childTnLst>
+                              <p:par>
+                                <p:cTn id="17" presetID="53" presetClass="entr" presetSubtype="16" fill="hold" nodeType="afterEffect">
+                                  <p:stCondLst>
+                                    <p:cond delay="2000"/>
+                                  </p:stCondLst>
+                                  <p:childTnLst>
+                                    <p:set>
+                                      <p:cBhvr>
+                                        <p:cTn id="18" dur="1" fill="hold">
+                                          <p:stCondLst>
+                                            <p:cond delay="0"/>
+                                          </p:stCondLst>
+                                        </p:cTn>
+                                        <p:tgtEl>
+                                          <p:spTgt spid="6"/>
+                                        </p:tgtEl>
+                                        <p:attrNameLst>
+                                          <p:attrName>style.visibility</p:attrName>
+                                        </p:attrNameLst>
+                                      </p:cBhvr>
+                                      <p:to>
+                                        <p:strVal val="visible"/>
+                                      </p:to>
+                                    </p:set>
+                                    <p:anim calcmode="lin" valueType="num">
+                                      <p:cBhvr>
+                                        <p:cTn id="19" dur="2000" fill="hold"/>
+                                        <p:tgtEl>
+                                          <p:spTgt spid="6"/>
+                                        </p:tgtEl>
+                                        <p:attrNameLst>
+                                          <p:attrName>ppt_w</p:attrName>
+                                        </p:attrNameLst>
+                                      </p:cBhvr>
+                                      <p:tavLst>
+                                        <p:tav tm="0">
+                                          <p:val>
+                                            <p:fltVal val="0"/>
+                                          </p:val>
+                                        </p:tav>
+                                        <p:tav tm="100000">
+                                          <p:val>
+                                            <p:strVal val="#ppt_w"/>
+                                          </p:val>
+                                        </p:tav>
+                                      </p:tavLst>
+                                    </p:anim>
+                                    <p:anim calcmode="lin" valueType="num">
+                                      <p:cBhvr>
+                                        <p:cTn id="20" dur="2000" fill="hold"/>
+                                        <p:tgtEl>
+                                          <p:spTgt spid="6"/>
+                                        </p:tgtEl>
+                                        <p:attrNameLst>
+                                          <p:attrName>ppt_h</p:attrName>
+                                        </p:attrNameLst>
+                                      </p:cBhvr>
+                                      <p:tavLst>
+                                        <p:tav tm="0">
+                                          <p:val>
+                                            <p:fltVal val="0"/>
+                                          </p:val>
+                                        </p:tav>
+                                        <p:tav tm="100000">
+                                          <p:val>
+                                            <p:strVal val="#ppt_h"/>
+                                          </p:val>
+                                        </p:tav>
+                                      </p:tavLst>
+                                    </p:anim>
+                                    <p:animEffect transition="in" filter="fade">
+                                      <p:cBhvr>
+                                        <p:cTn id="21" dur="2000"/>
+                                        <p:tgtEl>
+                                          <p:spTgt spid="6"/>
+                                        </p:tgtEl>
+                                      </p:cBhvr>
+                                    </p:animEffect>
+                                  </p:childTnLst>
+                                </p:cTn>
+                              </p:par>
+                              <p:par>
+                                <p:cTn id="22" presetID="42" presetClass="path" presetSubtype="0" accel="50000" decel="50000" fill="hold" nodeType="withEffect">
+                                  <p:stCondLst>
+                                    <p:cond delay="2000"/>
+                                  </p:stCondLst>
+                                  <p:childTnLst>
+                                    <p:animMotion origin="layout" path="M 0.5 0.5 L 0 0 " pathEditMode="relative" rAng="0" ptsTypes="AA">
+                                      <p:cBhvr>
+                                        <p:cTn id="23" dur="2000" fill="hold"/>
+                                        <p:tgtEl>
+                                          <p:spTgt spid="6"/>
+                                        </p:tgtEl>
+                                        <p:attrNameLst>
+                                          <p:attrName>ppt_x</p:attrName>
+                                          <p:attrName>ppt_y</p:attrName>
+                                        </p:attrNameLst>
+                                      </p:cBhvr>
+                                      <p:rCtr x="-25000" y="-25000"/>
+                                    </p:animMotion>
+                                  </p:childTnLst>
+                                </p:cTn>
+                              </p:par>
+                            </p:childTnLst>
+                          </p:cTn>
+                        </p:par>
+                        <p:par>
+                          <p:cTn id="24" fill="hold">
+                            <p:stCondLst>
+                              <p:cond delay="8000"/>
+                            </p:stCondLst>
+                            <p:childTnLst>
+                              <p:par>
+                                <p:cTn id="25" presetID="53" presetClass="entr" presetSubtype="16" fill="hold" nodeType="afterEffect">
+                                  <p:stCondLst>
+                                    <p:cond delay="2000"/>
+                                  </p:stCondLst>
+                                  <p:childTnLst>
+                                    <p:set>
+                                      <p:cBhvr>
+                                        <p:cTn id="26" dur="1" fill="hold">
+                                          <p:stCondLst>
+                                            <p:cond delay="0"/>
+                                          </p:stCondLst>
+                                        </p:cTn>
+                                        <p:tgtEl>
+                                          <p:spTgt spid="7"/>
+                                        </p:tgtEl>
+                                        <p:attrNameLst>
+                                          <p:attrName>style.visibility</p:attrName>
+                                        </p:attrNameLst>
+                                      </p:cBhvr>
+                                      <p:to>
+                                        <p:strVal val="visible"/>
+                                      </p:to>
+                                    </p:set>
+                                    <p:anim calcmode="lin" valueType="num">
+                                      <p:cBhvr>
+                                        <p:cTn id="27" dur="2000" fill="hold"/>
+                                        <p:tgtEl>
+                                          <p:spTgt spid="7"/>
+                                        </p:tgtEl>
+                                        <p:attrNameLst>
+                                          <p:attrName>ppt_w</p:attrName>
+                                        </p:attrNameLst>
+                                      </p:cBhvr>
+                                      <p:tavLst>
+                                        <p:tav tm="0">
+                                          <p:val>
+                                            <p:fltVal val="0"/>
+                                          </p:val>
+                                        </p:tav>
+                                        <p:tav tm="100000">
+                                          <p:val>
+                                            <p:strVal val="#ppt_w"/>
+                                          </p:val>
+                                        </p:tav>
+                                      </p:tavLst>
+                                    </p:anim>
+                                    <p:anim calcmode="lin" valueType="num">
+                                      <p:cBhvr>
+                                        <p:cTn id="28" dur="2000" fill="hold"/>
+                                        <p:tgtEl>
+                                          <p:spTgt spid="7"/>
+                                        </p:tgtEl>
+                                        <p:attrNameLst>
+                                          <p:attrName>ppt_h</p:attrName>
+                                        </p:attrNameLst>
+                                      </p:cBhvr>
+                                      <p:tavLst>
+                                        <p:tav tm="0">
+                                          <p:val>
+                                            <p:fltVal val="0"/>
+                                          </p:val>
+                                        </p:tav>
+                                        <p:tav tm="100000">
+                                          <p:val>
+                                            <p:strVal val="#ppt_h"/>
+                                          </p:val>
+                                        </p:tav>
+                                      </p:tavLst>
+                                    </p:anim>
+                                    <p:animEffect transition="in" filter="fade">
+                                      <p:cBhvr>
+                                        <p:cTn id="29" dur="2000"/>
+                                        <p:tgtEl>
+                                          <p:spTgt spid="7"/>
+                                        </p:tgtEl>
+                                      </p:cBhvr>
+                                    </p:animEffect>
+                                  </p:childTnLst>
+                                </p:cTn>
+                              </p:par>
+                              <p:par>
+                                <p:cTn id="30" presetID="42" presetClass="path" presetSubtype="0" accel="50000" decel="50000" fill="hold" nodeType="withEffect">
+                                  <p:stCondLst>
+                                    <p:cond delay="2000"/>
+                                  </p:stCondLst>
+                                  <p:childTnLst>
+                                    <p:animMotion origin="layout" path="M 0 0.5 L 0 0 " pathEditMode="relative" rAng="0" ptsTypes="AA">
+                                      <p:cBhvr>
+                                        <p:cTn id="31" dur="2000" fill="hold"/>
+                                        <p:tgtEl>
+                                          <p:spTgt spid="7"/>
+                                        </p:tgtEl>
+                                        <p:attrNameLst>
+                                          <p:attrName>ppt_x</p:attrName>
+                                          <p:attrName>ppt_y</p:attrName>
+                                        </p:attrNameLst>
+                                      </p:cBhvr>
+                                      <p:rCtr x="0" y="-25000"/>
+                                    </p:animMotion>
                                   </p:childTnLst>
                                 </p:cTn>
                               </p:par>
@@ -19522,14 +19825,14 @@
           <p:nvPr>
             <p:extLst>
               <p:ext uri="{D42A27DB-BD31-4B8C-83A1-F6EECF244321}">
-                <p14:modId xmlns:p14="http://schemas.microsoft.com/office/powerpoint/2010/main" val="1606372989"/>
+                <p14:modId xmlns:p14="http://schemas.microsoft.com/office/powerpoint/2010/main" val="3136582409"/>
               </p:ext>
             </p:extLst>
           </p:nvPr>
         </p:nvGraphicFramePr>
         <p:xfrm>
           <a:off x="600076" y="1207292"/>
-          <a:ext cx="8443912" cy="5650708"/>
+          <a:ext cx="10525124" cy="5650708"/>
         </p:xfrm>
         <a:graphic>
           <a:graphicData uri="http://schemas.openxmlformats.org/drawingml/2006/diagram">
@@ -19547,14 +19850,6 @@
   <p:clrMapOvr>
     <a:masterClrMapping/>
   </p:clrMapOvr>
-  <mc:AlternateContent xmlns:mc="http://schemas.openxmlformats.org/markup-compatibility/2006">
-    <mc:Choice xmlns:p14="http://schemas.microsoft.com/office/powerpoint/2010/main" Requires="p14">
-      <p:transition spd="slow" p14:dur="2000" advClick="0"/>
-    </mc:Choice>
-    <mc:Fallback>
-      <p:transition spd="slow" advClick="0"/>
-    </mc:Fallback>
-  </mc:AlternateContent>
   <p:timing>
     <p:tnLst>
       <p:par>
@@ -19616,6 +19911,524 @@
                             </p:childTnLst>
                           </p:cTn>
                         </p:par>
+                        <p:par>
+                          <p:cTn id="8" fill="hold">
+                            <p:stCondLst>
+                              <p:cond delay="1000"/>
+                            </p:stCondLst>
+                            <p:childTnLst>
+                              <p:par>
+                                <p:cTn id="9" presetID="10" presetClass="entr" presetSubtype="0" fill="hold" grpId="0" nodeType="afterEffect">
+                                  <p:stCondLst>
+                                    <p:cond delay="1000"/>
+                                  </p:stCondLst>
+                                  <p:childTnLst>
+                                    <p:set>
+                                      <p:cBhvr>
+                                        <p:cTn id="10" dur="1" fill="hold">
+                                          <p:stCondLst>
+                                            <p:cond delay="0"/>
+                                          </p:stCondLst>
+                                        </p:cTn>
+                                        <p:tgtEl>
+                                          <p:spTgt spid="4">
+                                            <p:graphicEl>
+                                              <a:dgm id="{9A29400E-D447-4998-A023-B0F9B967EC93}"/>
+                                            </p:graphicEl>
+                                          </p:spTgt>
+                                        </p:tgtEl>
+                                        <p:attrNameLst>
+                                          <p:attrName>style.visibility</p:attrName>
+                                        </p:attrNameLst>
+                                      </p:cBhvr>
+                                      <p:to>
+                                        <p:strVal val="visible"/>
+                                      </p:to>
+                                    </p:set>
+                                    <p:animEffect transition="in" filter="fade">
+                                      <p:cBhvr>
+                                        <p:cTn id="11" dur="500"/>
+                                        <p:tgtEl>
+                                          <p:spTgt spid="4">
+                                            <p:graphicEl>
+                                              <a:dgm id="{9A29400E-D447-4998-A023-B0F9B967EC93}"/>
+                                            </p:graphicEl>
+                                          </p:spTgt>
+                                        </p:tgtEl>
+                                      </p:cBhvr>
+                                    </p:animEffect>
+                                  </p:childTnLst>
+                                </p:cTn>
+                              </p:par>
+                              <p:par>
+                                <p:cTn id="12" presetID="10" presetClass="entr" presetSubtype="0" fill="hold" grpId="0" nodeType="withEffect">
+                                  <p:stCondLst>
+                                    <p:cond delay="1000"/>
+                                  </p:stCondLst>
+                                  <p:childTnLst>
+                                    <p:set>
+                                      <p:cBhvr>
+                                        <p:cTn id="13" dur="1" fill="hold">
+                                          <p:stCondLst>
+                                            <p:cond delay="0"/>
+                                          </p:stCondLst>
+                                        </p:cTn>
+                                        <p:tgtEl>
+                                          <p:spTgt spid="4">
+                                            <p:graphicEl>
+                                              <a:dgm id="{017BCD35-B270-4953-93F3-E98EC436D09D}"/>
+                                            </p:graphicEl>
+                                          </p:spTgt>
+                                        </p:tgtEl>
+                                        <p:attrNameLst>
+                                          <p:attrName>style.visibility</p:attrName>
+                                        </p:attrNameLst>
+                                      </p:cBhvr>
+                                      <p:to>
+                                        <p:strVal val="visible"/>
+                                      </p:to>
+                                    </p:set>
+                                    <p:animEffect transition="in" filter="fade">
+                                      <p:cBhvr>
+                                        <p:cTn id="14" dur="500"/>
+                                        <p:tgtEl>
+                                          <p:spTgt spid="4">
+                                            <p:graphicEl>
+                                              <a:dgm id="{017BCD35-B270-4953-93F3-E98EC436D09D}"/>
+                                            </p:graphicEl>
+                                          </p:spTgt>
+                                        </p:tgtEl>
+                                      </p:cBhvr>
+                                    </p:animEffect>
+                                  </p:childTnLst>
+                                </p:cTn>
+                              </p:par>
+                              <p:par>
+                                <p:cTn id="15" presetID="10" presetClass="entr" presetSubtype="0" fill="hold" grpId="0" nodeType="withEffect">
+                                  <p:stCondLst>
+                                    <p:cond delay="1000"/>
+                                  </p:stCondLst>
+                                  <p:childTnLst>
+                                    <p:set>
+                                      <p:cBhvr>
+                                        <p:cTn id="16" dur="1" fill="hold">
+                                          <p:stCondLst>
+                                            <p:cond delay="0"/>
+                                          </p:stCondLst>
+                                        </p:cTn>
+                                        <p:tgtEl>
+                                          <p:spTgt spid="4">
+                                            <p:graphicEl>
+                                              <a:dgm id="{8140F5BC-68DF-400F-A176-F616C8093151}"/>
+                                            </p:graphicEl>
+                                          </p:spTgt>
+                                        </p:tgtEl>
+                                        <p:attrNameLst>
+                                          <p:attrName>style.visibility</p:attrName>
+                                        </p:attrNameLst>
+                                      </p:cBhvr>
+                                      <p:to>
+                                        <p:strVal val="visible"/>
+                                      </p:to>
+                                    </p:set>
+                                    <p:animEffect transition="in" filter="fade">
+                                      <p:cBhvr>
+                                        <p:cTn id="17" dur="500"/>
+                                        <p:tgtEl>
+                                          <p:spTgt spid="4">
+                                            <p:graphicEl>
+                                              <a:dgm id="{8140F5BC-68DF-400F-A176-F616C8093151}"/>
+                                            </p:graphicEl>
+                                          </p:spTgt>
+                                        </p:tgtEl>
+                                      </p:cBhvr>
+                                    </p:animEffect>
+                                  </p:childTnLst>
+                                </p:cTn>
+                              </p:par>
+                            </p:childTnLst>
+                          </p:cTn>
+                        </p:par>
+                        <p:par>
+                          <p:cTn id="18" fill="hold">
+                            <p:stCondLst>
+                              <p:cond delay="2500"/>
+                            </p:stCondLst>
+                            <p:childTnLst>
+                              <p:par>
+                                <p:cTn id="19" presetID="10" presetClass="entr" presetSubtype="0" fill="hold" grpId="0" nodeType="afterEffect">
+                                  <p:stCondLst>
+                                    <p:cond delay="1000"/>
+                                  </p:stCondLst>
+                                  <p:childTnLst>
+                                    <p:set>
+                                      <p:cBhvr>
+                                        <p:cTn id="20" dur="1" fill="hold">
+                                          <p:stCondLst>
+                                            <p:cond delay="0"/>
+                                          </p:stCondLst>
+                                        </p:cTn>
+                                        <p:tgtEl>
+                                          <p:spTgt spid="4">
+                                            <p:graphicEl>
+                                              <a:dgm id="{272D4433-559A-4779-8B7F-22EF277DBA6D}"/>
+                                            </p:graphicEl>
+                                          </p:spTgt>
+                                        </p:tgtEl>
+                                        <p:attrNameLst>
+                                          <p:attrName>style.visibility</p:attrName>
+                                        </p:attrNameLst>
+                                      </p:cBhvr>
+                                      <p:to>
+                                        <p:strVal val="visible"/>
+                                      </p:to>
+                                    </p:set>
+                                    <p:animEffect transition="in" filter="fade">
+                                      <p:cBhvr>
+                                        <p:cTn id="21" dur="500"/>
+                                        <p:tgtEl>
+                                          <p:spTgt spid="4">
+                                            <p:graphicEl>
+                                              <a:dgm id="{272D4433-559A-4779-8B7F-22EF277DBA6D}"/>
+                                            </p:graphicEl>
+                                          </p:spTgt>
+                                        </p:tgtEl>
+                                      </p:cBhvr>
+                                    </p:animEffect>
+                                  </p:childTnLst>
+                                </p:cTn>
+                              </p:par>
+                              <p:par>
+                                <p:cTn id="22" presetID="10" presetClass="entr" presetSubtype="0" fill="hold" grpId="0" nodeType="withEffect">
+                                  <p:stCondLst>
+                                    <p:cond delay="1000"/>
+                                  </p:stCondLst>
+                                  <p:childTnLst>
+                                    <p:set>
+                                      <p:cBhvr>
+                                        <p:cTn id="23" dur="1" fill="hold">
+                                          <p:stCondLst>
+                                            <p:cond delay="0"/>
+                                          </p:stCondLst>
+                                        </p:cTn>
+                                        <p:tgtEl>
+                                          <p:spTgt spid="4">
+                                            <p:graphicEl>
+                                              <a:dgm id="{E72A1AB4-5CC1-41F6-BC90-E254B003E12B}"/>
+                                            </p:graphicEl>
+                                          </p:spTgt>
+                                        </p:tgtEl>
+                                        <p:attrNameLst>
+                                          <p:attrName>style.visibility</p:attrName>
+                                        </p:attrNameLst>
+                                      </p:cBhvr>
+                                      <p:to>
+                                        <p:strVal val="visible"/>
+                                      </p:to>
+                                    </p:set>
+                                    <p:animEffect transition="in" filter="fade">
+                                      <p:cBhvr>
+                                        <p:cTn id="24" dur="500"/>
+                                        <p:tgtEl>
+                                          <p:spTgt spid="4">
+                                            <p:graphicEl>
+                                              <a:dgm id="{E72A1AB4-5CC1-41F6-BC90-E254B003E12B}"/>
+                                            </p:graphicEl>
+                                          </p:spTgt>
+                                        </p:tgtEl>
+                                      </p:cBhvr>
+                                    </p:animEffect>
+                                  </p:childTnLst>
+                                </p:cTn>
+                              </p:par>
+                            </p:childTnLst>
+                          </p:cTn>
+                        </p:par>
+                        <p:par>
+                          <p:cTn id="25" fill="hold">
+                            <p:stCondLst>
+                              <p:cond delay="4000"/>
+                            </p:stCondLst>
+                            <p:childTnLst>
+                              <p:par>
+                                <p:cTn id="26" presetID="10" presetClass="entr" presetSubtype="0" fill="hold" grpId="0" nodeType="afterEffect">
+                                  <p:stCondLst>
+                                    <p:cond delay="1000"/>
+                                  </p:stCondLst>
+                                  <p:childTnLst>
+                                    <p:set>
+                                      <p:cBhvr>
+                                        <p:cTn id="27" dur="1" fill="hold">
+                                          <p:stCondLst>
+                                            <p:cond delay="0"/>
+                                          </p:stCondLst>
+                                        </p:cTn>
+                                        <p:tgtEl>
+                                          <p:spTgt spid="4">
+                                            <p:graphicEl>
+                                              <a:dgm id="{F65C6A59-F8DE-4C69-A481-7A4DEA8869C9}"/>
+                                            </p:graphicEl>
+                                          </p:spTgt>
+                                        </p:tgtEl>
+                                        <p:attrNameLst>
+                                          <p:attrName>style.visibility</p:attrName>
+                                        </p:attrNameLst>
+                                      </p:cBhvr>
+                                      <p:to>
+                                        <p:strVal val="visible"/>
+                                      </p:to>
+                                    </p:set>
+                                    <p:animEffect transition="in" filter="fade">
+                                      <p:cBhvr>
+                                        <p:cTn id="28" dur="500"/>
+                                        <p:tgtEl>
+                                          <p:spTgt spid="4">
+                                            <p:graphicEl>
+                                              <a:dgm id="{F65C6A59-F8DE-4C69-A481-7A4DEA8869C9}"/>
+                                            </p:graphicEl>
+                                          </p:spTgt>
+                                        </p:tgtEl>
+                                      </p:cBhvr>
+                                    </p:animEffect>
+                                  </p:childTnLst>
+                                </p:cTn>
+                              </p:par>
+                              <p:par>
+                                <p:cTn id="29" presetID="10" presetClass="entr" presetSubtype="0" fill="hold" grpId="0" nodeType="withEffect">
+                                  <p:stCondLst>
+                                    <p:cond delay="1000"/>
+                                  </p:stCondLst>
+                                  <p:childTnLst>
+                                    <p:set>
+                                      <p:cBhvr>
+                                        <p:cTn id="30" dur="1" fill="hold">
+                                          <p:stCondLst>
+                                            <p:cond delay="0"/>
+                                          </p:stCondLst>
+                                        </p:cTn>
+                                        <p:tgtEl>
+                                          <p:spTgt spid="4">
+                                            <p:graphicEl>
+                                              <a:dgm id="{463998AF-51E3-49F0-A2E0-474149259F51}"/>
+                                            </p:graphicEl>
+                                          </p:spTgt>
+                                        </p:tgtEl>
+                                        <p:attrNameLst>
+                                          <p:attrName>style.visibility</p:attrName>
+                                        </p:attrNameLst>
+                                      </p:cBhvr>
+                                      <p:to>
+                                        <p:strVal val="visible"/>
+                                      </p:to>
+                                    </p:set>
+                                    <p:animEffect transition="in" filter="fade">
+                                      <p:cBhvr>
+                                        <p:cTn id="31" dur="500"/>
+                                        <p:tgtEl>
+                                          <p:spTgt spid="4">
+                                            <p:graphicEl>
+                                              <a:dgm id="{463998AF-51E3-49F0-A2E0-474149259F51}"/>
+                                            </p:graphicEl>
+                                          </p:spTgt>
+                                        </p:tgtEl>
+                                      </p:cBhvr>
+                                    </p:animEffect>
+                                  </p:childTnLst>
+                                </p:cTn>
+                              </p:par>
+                            </p:childTnLst>
+                          </p:cTn>
+                        </p:par>
+                        <p:par>
+                          <p:cTn id="32" fill="hold">
+                            <p:stCondLst>
+                              <p:cond delay="5500"/>
+                            </p:stCondLst>
+                            <p:childTnLst>
+                              <p:par>
+                                <p:cTn id="33" presetID="10" presetClass="entr" presetSubtype="0" fill="hold" grpId="0" nodeType="afterEffect">
+                                  <p:stCondLst>
+                                    <p:cond delay="1000"/>
+                                  </p:stCondLst>
+                                  <p:childTnLst>
+                                    <p:set>
+                                      <p:cBhvr>
+                                        <p:cTn id="34" dur="1" fill="hold">
+                                          <p:stCondLst>
+                                            <p:cond delay="0"/>
+                                          </p:stCondLst>
+                                        </p:cTn>
+                                        <p:tgtEl>
+                                          <p:spTgt spid="4">
+                                            <p:graphicEl>
+                                              <a:dgm id="{ECFACE56-4127-49A5-8FE8-03AFD291208F}"/>
+                                            </p:graphicEl>
+                                          </p:spTgt>
+                                        </p:tgtEl>
+                                        <p:attrNameLst>
+                                          <p:attrName>style.visibility</p:attrName>
+                                        </p:attrNameLst>
+                                      </p:cBhvr>
+                                      <p:to>
+                                        <p:strVal val="visible"/>
+                                      </p:to>
+                                    </p:set>
+                                    <p:animEffect transition="in" filter="fade">
+                                      <p:cBhvr>
+                                        <p:cTn id="35" dur="500"/>
+                                        <p:tgtEl>
+                                          <p:spTgt spid="4">
+                                            <p:graphicEl>
+                                              <a:dgm id="{ECFACE56-4127-49A5-8FE8-03AFD291208F}"/>
+                                            </p:graphicEl>
+                                          </p:spTgt>
+                                        </p:tgtEl>
+                                      </p:cBhvr>
+                                    </p:animEffect>
+                                  </p:childTnLst>
+                                </p:cTn>
+                              </p:par>
+                              <p:par>
+                                <p:cTn id="36" presetID="10" presetClass="entr" presetSubtype="0" fill="hold" grpId="0" nodeType="withEffect">
+                                  <p:stCondLst>
+                                    <p:cond delay="1000"/>
+                                  </p:stCondLst>
+                                  <p:childTnLst>
+                                    <p:set>
+                                      <p:cBhvr>
+                                        <p:cTn id="37" dur="1" fill="hold">
+                                          <p:stCondLst>
+                                            <p:cond delay="0"/>
+                                          </p:stCondLst>
+                                        </p:cTn>
+                                        <p:tgtEl>
+                                          <p:spTgt spid="4">
+                                            <p:graphicEl>
+                                              <a:dgm id="{619D5A2E-C69E-473C-A3A6-38F4F1A36571}"/>
+                                            </p:graphicEl>
+                                          </p:spTgt>
+                                        </p:tgtEl>
+                                        <p:attrNameLst>
+                                          <p:attrName>style.visibility</p:attrName>
+                                        </p:attrNameLst>
+                                      </p:cBhvr>
+                                      <p:to>
+                                        <p:strVal val="visible"/>
+                                      </p:to>
+                                    </p:set>
+                                    <p:animEffect transition="in" filter="fade">
+                                      <p:cBhvr>
+                                        <p:cTn id="38" dur="500"/>
+                                        <p:tgtEl>
+                                          <p:spTgt spid="4">
+                                            <p:graphicEl>
+                                              <a:dgm id="{619D5A2E-C69E-473C-A3A6-38F4F1A36571}"/>
+                                            </p:graphicEl>
+                                          </p:spTgt>
+                                        </p:tgtEl>
+                                      </p:cBhvr>
+                                    </p:animEffect>
+                                  </p:childTnLst>
+                                </p:cTn>
+                              </p:par>
+                            </p:childTnLst>
+                          </p:cTn>
+                        </p:par>
+                        <p:par>
+                          <p:cTn id="39" fill="hold">
+                            <p:stCondLst>
+                              <p:cond delay="7000"/>
+                            </p:stCondLst>
+                            <p:childTnLst>
+                              <p:par>
+                                <p:cTn id="40" presetID="10" presetClass="entr" presetSubtype="0" fill="hold" grpId="0" nodeType="afterEffect">
+                                  <p:stCondLst>
+                                    <p:cond delay="1000"/>
+                                  </p:stCondLst>
+                                  <p:childTnLst>
+                                    <p:set>
+                                      <p:cBhvr>
+                                        <p:cTn id="41" dur="1" fill="hold">
+                                          <p:stCondLst>
+                                            <p:cond delay="0"/>
+                                          </p:stCondLst>
+                                        </p:cTn>
+                                        <p:tgtEl>
+                                          <p:spTgt spid="4">
+                                            <p:graphicEl>
+                                              <a:dgm id="{1BFE37C5-1F74-4ABC-9314-CE560FA74291}"/>
+                                            </p:graphicEl>
+                                          </p:spTgt>
+                                        </p:tgtEl>
+                                        <p:attrNameLst>
+                                          <p:attrName>style.visibility</p:attrName>
+                                        </p:attrNameLst>
+                                      </p:cBhvr>
+                                      <p:to>
+                                        <p:strVal val="visible"/>
+                                      </p:to>
+                                    </p:set>
+                                    <p:animEffect transition="in" filter="fade">
+                                      <p:cBhvr>
+                                        <p:cTn id="42" dur="500"/>
+                                        <p:tgtEl>
+                                          <p:spTgt spid="4">
+                                            <p:graphicEl>
+                                              <a:dgm id="{1BFE37C5-1F74-4ABC-9314-CE560FA74291}"/>
+                                            </p:graphicEl>
+                                          </p:spTgt>
+                                        </p:tgtEl>
+                                      </p:cBhvr>
+                                    </p:animEffect>
+                                  </p:childTnLst>
+                                </p:cTn>
+                              </p:par>
+                              <p:par>
+                                <p:cTn id="43" presetID="10" presetClass="entr" presetSubtype="0" fill="hold" grpId="0" nodeType="withEffect">
+                                  <p:stCondLst>
+                                    <p:cond delay="1000"/>
+                                  </p:stCondLst>
+                                  <p:childTnLst>
+                                    <p:set>
+                                      <p:cBhvr>
+                                        <p:cTn id="44" dur="1" fill="hold">
+                                          <p:stCondLst>
+                                            <p:cond delay="0"/>
+                                          </p:stCondLst>
+                                        </p:cTn>
+                                        <p:tgtEl>
+                                          <p:spTgt spid="4">
+                                            <p:graphicEl>
+                                              <a:dgm id="{FBE636F6-41A0-4DA0-B810-81152DC828B0}"/>
+                                            </p:graphicEl>
+                                          </p:spTgt>
+                                        </p:tgtEl>
+                                        <p:attrNameLst>
+                                          <p:attrName>style.visibility</p:attrName>
+                                        </p:attrNameLst>
+                                      </p:cBhvr>
+                                      <p:to>
+                                        <p:strVal val="visible"/>
+                                      </p:to>
+                                    </p:set>
+                                    <p:animEffect transition="in" filter="fade">
+                                      <p:cBhvr>
+                                        <p:cTn id="45" dur="500"/>
+                                        <p:tgtEl>
+                                          <p:spTgt spid="4">
+                                            <p:graphicEl>
+                                              <a:dgm id="{FBE636F6-41A0-4DA0-B810-81152DC828B0}"/>
+                                            </p:graphicEl>
+                                          </p:spTgt>
+                                        </p:tgtEl>
+                                      </p:cBhvr>
+                                    </p:animEffect>
+                                  </p:childTnLst>
+                                </p:cTn>
+                              </p:par>
+                            </p:childTnLst>
+                          </p:cTn>
+                        </p:par>
                       </p:childTnLst>
                     </p:cTn>
                   </p:par>
@@ -19642,6 +20455,11 @@
     </p:tnLst>
     <p:bldLst>
       <p:bldP spid="2" grpId="0"/>
+      <p:bldGraphic spid="4" grpId="0" uiExpand="1">
+        <p:bldSub>
+          <a:bldDgm bld="one"/>
+        </p:bldSub>
+      </p:bldGraphic>
     </p:bldLst>
   </p:timing>
 </p:sld>
@@ -19699,13 +20517,13 @@
           <p:nvPr>
             <p:extLst>
               <p:ext uri="{D42A27DB-BD31-4B8C-83A1-F6EECF244321}">
-                <p14:modId xmlns:p14="http://schemas.microsoft.com/office/powerpoint/2010/main" val="2172885624"/>
+                <p14:modId xmlns:p14="http://schemas.microsoft.com/office/powerpoint/2010/main" val="2416376559"/>
               </p:ext>
             </p:extLst>
           </p:nvPr>
         </p:nvGraphicFramePr>
         <p:xfrm>
-          <a:off x="989013" y="1334028"/>
+          <a:off x="2032000" y="1334028"/>
           <a:ext cx="8128000" cy="5418667"/>
         </p:xfrm>
         <a:graphic>
@@ -19724,14 +20542,6 @@
   <p:clrMapOvr>
     <a:masterClrMapping/>
   </p:clrMapOvr>
-  <mc:AlternateContent xmlns:mc="http://schemas.openxmlformats.org/markup-compatibility/2006">
-    <mc:Choice xmlns:p14="http://schemas.microsoft.com/office/powerpoint/2010/main" Requires="p14">
-      <p:transition spd="slow" p14:dur="2000" advClick="0"/>
-    </mc:Choice>
-    <mc:Fallback>
-      <p:transition spd="slow" advClick="0"/>
-    </mc:Fallback>
-  </mc:AlternateContent>
   <p:timing>
     <p:tnLst>
       <p:par>
@@ -19793,6 +20603,110 @@
                             </p:childTnLst>
                           </p:cTn>
                         </p:par>
+                        <p:par>
+                          <p:cTn id="8" fill="hold">
+                            <p:stCondLst>
+                              <p:cond delay="1000"/>
+                            </p:stCondLst>
+                            <p:childTnLst>
+                              <p:par>
+                                <p:cTn id="9" presetID="10" presetClass="entr" presetSubtype="0" fill="hold" grpId="0" nodeType="afterEffect">
+                                  <p:stCondLst>
+                                    <p:cond delay="0"/>
+                                  </p:stCondLst>
+                                  <p:childTnLst>
+                                    <p:set>
+                                      <p:cBhvr>
+                                        <p:cTn id="10" dur="1" fill="hold">
+                                          <p:stCondLst>
+                                            <p:cond delay="0"/>
+                                          </p:stCondLst>
+                                        </p:cTn>
+                                        <p:tgtEl>
+                                          <p:spTgt spid="3">
+                                            <p:graphicEl>
+                                              <a:dgm id="{6698DAAB-CF6A-4902-9FF6-826D17B11C39}"/>
+                                            </p:graphicEl>
+                                          </p:spTgt>
+                                        </p:tgtEl>
+                                        <p:attrNameLst>
+                                          <p:attrName>style.visibility</p:attrName>
+                                        </p:attrNameLst>
+                                      </p:cBhvr>
+                                      <p:to>
+                                        <p:strVal val="visible"/>
+                                      </p:to>
+                                    </p:set>
+                                    <p:animEffect transition="in" filter="fade">
+                                      <p:cBhvr>
+                                        <p:cTn id="11" dur="1000"/>
+                                        <p:tgtEl>
+                                          <p:spTgt spid="3">
+                                            <p:graphicEl>
+                                              <a:dgm id="{6698DAAB-CF6A-4902-9FF6-826D17B11C39}"/>
+                                            </p:graphicEl>
+                                          </p:spTgt>
+                                        </p:tgtEl>
+                                      </p:cBhvr>
+                                    </p:animEffect>
+                                  </p:childTnLst>
+                                </p:cTn>
+                              </p:par>
+                            </p:childTnLst>
+                          </p:cTn>
+                        </p:par>
+                        <p:par>
+                          <p:cTn id="12" fill="hold">
+                            <p:stCondLst>
+                              <p:cond delay="2000"/>
+                            </p:stCondLst>
+                            <p:childTnLst>
+                              <p:par>
+                                <p:cTn id="13" presetID="10" presetClass="entr" presetSubtype="0" fill="hold" grpId="0" nodeType="afterEffect">
+                                  <p:stCondLst>
+                                    <p:cond delay="1000"/>
+                                  </p:stCondLst>
+                                  <p:childTnLst>
+                                    <p:set>
+                                      <p:cBhvr>
+                                        <p:cTn id="14" dur="1" fill="hold">
+                                          <p:stCondLst>
+                                            <p:cond delay="0"/>
+                                          </p:stCondLst>
+                                        </p:cTn>
+                                        <p:tgtEl>
+                                          <p:spTgt spid="3">
+                                            <p:graphicEl>
+                                              <a:dgm id="{2D5CAFE2-9B6C-46FA-863F-95C475E14595}"/>
+                                            </p:graphicEl>
+                                          </p:spTgt>
+                                        </p:tgtEl>
+                                        <p:attrNameLst>
+                                          <p:attrName>style.visibility</p:attrName>
+                                        </p:attrNameLst>
+                                      </p:cBhvr>
+                                      <p:to>
+                                        <p:strVal val="visible"/>
+                                      </p:to>
+                                    </p:set>
+                                    <p:animEffect transition="in" filter="fade">
+                                      <p:cBhvr>
+                                        <p:cTn id="15" dur="500"/>
+                                        <p:tgtEl>
+                                          <p:spTgt spid="3">
+                                            <p:graphicEl>
+                                              <a:dgm id="{2D5CAFE2-9B6C-46FA-863F-95C475E14595}"/>
+                                            </p:graphicEl>
+                                          </p:spTgt>
+                                        </p:tgtEl>
+                                      </p:cBhvr>
+                                    </p:animEffect>
+                                  </p:childTnLst>
+                                </p:cTn>
+                              </p:par>
+                            </p:childTnLst>
+                          </p:cTn>
+                        </p:par>
                       </p:childTnLst>
                     </p:cTn>
                   </p:par>
@@ -19819,6 +20733,11 @@
     </p:tnLst>
     <p:bldLst>
       <p:bldP spid="2" grpId="0"/>
+      <p:bldGraphic spid="3" grpId="0" uiExpand="1">
+        <p:bldSub>
+          <a:bldDgm bld="one"/>
+        </p:bldSub>
+      </p:bldGraphic>
     </p:bldLst>
   </p:timing>
 </p:sld>
@@ -19879,14 +20798,6 @@
   <p:clrMapOvr>
     <a:masterClrMapping/>
   </p:clrMapOvr>
-  <mc:AlternateContent xmlns:mc="http://schemas.openxmlformats.org/markup-compatibility/2006">
-    <mc:Choice xmlns:p14="http://schemas.microsoft.com/office/powerpoint/2010/main" Requires="p14">
-      <p:transition spd="slow" p14:dur="2000" advClick="0"/>
-    </mc:Choice>
-    <mc:Fallback>
-      <p:transition spd="slow" advClick="0"/>
-    </mc:Fallback>
-  </mc:AlternateContent>
   <p:timing>
     <p:tnLst>
       <p:par>
@@ -20270,14 +21181,6 @@
   <p:clrMapOvr>
     <a:masterClrMapping/>
   </p:clrMapOvr>
-  <mc:AlternateContent xmlns:mc="http://schemas.openxmlformats.org/markup-compatibility/2006">
-    <mc:Choice xmlns:p14="http://schemas.microsoft.com/office/powerpoint/2010/main" Requires="p14">
-      <p:transition spd="slow" p14:dur="2000" advClick="0"/>
-    </mc:Choice>
-    <mc:Fallback>
-      <p:transition spd="slow" advClick="0"/>
-    </mc:Fallback>
-  </mc:AlternateContent>
   <p:timing>
     <p:tnLst>
       <p:par>
@@ -20425,14 +21328,6 @@
   <p:clrMapOvr>
     <a:masterClrMapping/>
   </p:clrMapOvr>
-  <mc:AlternateContent xmlns:mc="http://schemas.openxmlformats.org/markup-compatibility/2006">
-    <mc:Choice xmlns:p14="http://schemas.microsoft.com/office/powerpoint/2010/main" Requires="p14">
-      <p:transition spd="slow" p14:dur="2000" advClick="0"/>
-    </mc:Choice>
-    <mc:Fallback>
-      <p:transition spd="slow" advClick="0"/>
-    </mc:Fallback>
-  </mc:AlternateContent>
   <p:timing>
     <p:tnLst>
       <p:par>
@@ -20580,14 +21475,6 @@
   <p:clrMapOvr>
     <a:masterClrMapping/>
   </p:clrMapOvr>
-  <mc:AlternateContent xmlns:mc="http://schemas.openxmlformats.org/markup-compatibility/2006">
-    <mc:Choice xmlns:p14="http://schemas.microsoft.com/office/powerpoint/2010/main" Requires="p14">
-      <p:transition spd="slow" p14:dur="2000" advClick="0"/>
-    </mc:Choice>
-    <mc:Fallback>
-      <p:transition spd="slow" advClick="0"/>
-    </mc:Fallback>
-  </mc:AlternateContent>
   <p:timing>
     <p:tnLst>
       <p:par>
@@ -20735,14 +21622,6 @@
   <p:clrMapOvr>
     <a:masterClrMapping/>
   </p:clrMapOvr>
-  <mc:AlternateContent xmlns:mc="http://schemas.openxmlformats.org/markup-compatibility/2006">
-    <mc:Choice xmlns:p14="http://schemas.microsoft.com/office/powerpoint/2010/main" Requires="p14">
-      <p:transition spd="slow" p14:dur="2000" advClick="0"/>
-    </mc:Choice>
-    <mc:Fallback>
-      <p:transition spd="slow" advClick="0"/>
-    </mc:Fallback>
-  </mc:AlternateContent>
   <p:timing>
     <p:tnLst>
       <p:par>
@@ -20893,7 +21772,7 @@
         <p:spPr>
           <a:xfrm>
             <a:off x="878416" y="1614486"/>
-            <a:ext cx="9079972" cy="5128145"/>
+            <a:ext cx="9008534" cy="5128145"/>
           </a:xfrm>
         </p:spPr>
         <p:txBody>
@@ -20981,14 +21860,6 @@
   <p:clrMapOvr>
     <a:masterClrMapping/>
   </p:clrMapOvr>
-  <mc:AlternateContent xmlns:mc="http://schemas.openxmlformats.org/markup-compatibility/2006">
-    <mc:Choice xmlns:p14="http://schemas.microsoft.com/office/powerpoint/2010/main" Requires="p14">
-      <p:transition spd="slow" p14:dur="2000" advClick="0"/>
-    </mc:Choice>
-    <mc:Fallback>
-      <p:transition spd="slow" advClick="0"/>
-    </mc:Fallback>
-  </mc:AlternateContent>
   <p:timing>
     <p:tnLst>
       <p:par>
@@ -21596,14 +22467,6 @@
   <p:clrMapOvr>
     <a:masterClrMapping/>
   </p:clrMapOvr>
-  <mc:AlternateContent xmlns:mc="http://schemas.openxmlformats.org/markup-compatibility/2006">
-    <mc:Choice xmlns:p14="http://schemas.microsoft.com/office/powerpoint/2010/main" Requires="p14">
-      <p:transition spd="slow" p14:dur="2000" advClick="0"/>
-    </mc:Choice>
-    <mc:Fallback>
-      <p:transition spd="slow" advClick="0"/>
-    </mc:Fallback>
-  </mc:AlternateContent>
   <p:timing>
     <p:tnLst>
       <p:par>
@@ -22601,14 +23464,6 @@
   <p:clrMapOvr>
     <a:masterClrMapping/>
   </p:clrMapOvr>
-  <mc:AlternateContent xmlns:mc="http://schemas.openxmlformats.org/markup-compatibility/2006">
-    <mc:Choice xmlns:p14="http://schemas.microsoft.com/office/powerpoint/2010/main" Requires="p14">
-      <p:transition spd="slow" p14:dur="2000" advClick="0"/>
-    </mc:Choice>
-    <mc:Fallback>
-      <p:transition spd="slow" advClick="0"/>
-    </mc:Fallback>
-  </mc:AlternateContent>
   <p:timing>
     <p:tnLst>
       <p:par>
@@ -23115,14 +23970,6 @@
   <p:clrMapOvr>
     <a:masterClrMapping/>
   </p:clrMapOvr>
-  <mc:AlternateContent xmlns:mc="http://schemas.openxmlformats.org/markup-compatibility/2006">
-    <mc:Choice xmlns:p14="http://schemas.microsoft.com/office/powerpoint/2010/main" Requires="p14">
-      <p:transition spd="slow" p14:dur="2000" advClick="0"/>
-    </mc:Choice>
-    <mc:Fallback>
-      <p:transition spd="slow" advClick="0"/>
-    </mc:Fallback>
-  </mc:AlternateContent>
   <p:timing>
     <p:tnLst>
       <p:par>
@@ -23385,14 +24232,6 @@
   <p:clrMapOvr>
     <a:masterClrMapping/>
   </p:clrMapOvr>
-  <mc:AlternateContent xmlns:mc="http://schemas.openxmlformats.org/markup-compatibility/2006">
-    <mc:Choice xmlns:p14="http://schemas.microsoft.com/office/powerpoint/2010/main" Requires="p14">
-      <p:transition spd="slow" p14:dur="2000" advClick="0"/>
-    </mc:Choice>
-    <mc:Fallback>
-      <p:transition spd="slow" advClick="0"/>
-    </mc:Fallback>
-  </mc:AlternateContent>
   <p:timing>
     <p:tnLst>
       <p:par>
@@ -23822,6 +24661,36 @@
       </p:sp>
       <p:pic>
         <p:nvPicPr>
+          <p:cNvPr id="7" name="Imagen 6"/>
+          <p:cNvPicPr>
+            <a:picLocks noChangeAspect="1"/>
+          </p:cNvPicPr>
+          <p:nvPr/>
+        </p:nvPicPr>
+        <p:blipFill>
+          <a:blip r:embed="rId4">
+            <a:extLst>
+              <a:ext uri="{28A0092B-C50C-407E-A947-70E740481C1C}">
+                <a14:useLocalDpi xmlns:a14="http://schemas.microsoft.com/office/drawing/2010/main" val="0"/>
+              </a:ext>
+            </a:extLst>
+          </a:blip>
+          <a:stretch>
+            <a:fillRect/>
+          </a:stretch>
+        </p:blipFill>
+        <p:spPr>
+          <a:xfrm>
+            <a:off x="774992" y="5004"/>
+            <a:ext cx="10051052" cy="6845274"/>
+          </a:xfrm>
+          <a:prstGeom prst="rect">
+            <a:avLst/>
+          </a:prstGeom>
+        </p:spPr>
+      </p:pic>
+      <p:pic>
+        <p:nvPicPr>
           <p:cNvPr id="10" name="Imagen 9"/>
           <p:cNvPicPr>
             <a:picLocks noChangeAspect="1"/>
@@ -23829,7 +24698,7 @@
           <p:nvPr/>
         </p:nvPicPr>
         <p:blipFill>
-          <a:blip r:embed="rId4">
+          <a:blip r:embed="rId5">
             <a:extLst>
               <a:ext uri="{28A0092B-C50C-407E-A947-70E740481C1C}">
                 <a14:useLocalDpi xmlns:a14="http://schemas.microsoft.com/office/drawing/2010/main" val="0"/>
@@ -23850,36 +24719,6 @@
           </a:prstGeom>
         </p:spPr>
       </p:pic>
-      <p:pic>
-        <p:nvPicPr>
-          <p:cNvPr id="7" name="Imagen 6"/>
-          <p:cNvPicPr>
-            <a:picLocks noChangeAspect="1"/>
-          </p:cNvPicPr>
-          <p:nvPr/>
-        </p:nvPicPr>
-        <p:blipFill>
-          <a:blip r:embed="rId5">
-            <a:extLst>
-              <a:ext uri="{28A0092B-C50C-407E-A947-70E740481C1C}">
-                <a14:useLocalDpi xmlns:a14="http://schemas.microsoft.com/office/drawing/2010/main" val="0"/>
-              </a:ext>
-            </a:extLst>
-          </a:blip>
-          <a:stretch>
-            <a:fillRect/>
-          </a:stretch>
-        </p:blipFill>
-        <p:spPr>
-          <a:xfrm>
-            <a:off x="774992" y="5004"/>
-            <a:ext cx="10051052" cy="6845274"/>
-          </a:xfrm>
-          <a:prstGeom prst="rect">
-            <a:avLst/>
-          </a:prstGeom>
-        </p:spPr>
-      </p:pic>
     </p:spTree>
     <p:extLst>
       <p:ext uri="{BB962C8B-B14F-4D97-AF65-F5344CB8AC3E}">
@@ -23890,14 +24729,6 @@
   <p:clrMapOvr>
     <a:masterClrMapping/>
   </p:clrMapOvr>
-  <mc:AlternateContent xmlns:mc="http://schemas.openxmlformats.org/markup-compatibility/2006">
-    <mc:Choice xmlns:p14="http://schemas.microsoft.com/office/powerpoint/2010/main" Requires="p14">
-      <p:transition spd="slow" p14:dur="2000" advClick="0"/>
-    </mc:Choice>
-    <mc:Fallback>
-      <p:transition spd="slow" advClick="0"/>
-    </mc:Fallback>
-  </mc:AlternateContent>
   <p:timing>
     <p:tnLst>
       <p:par>
@@ -24279,120 +25110,6 @@
                             </p:childTnLst>
                           </p:cTn>
                         </p:par>
-                        <p:par>
-                          <p:cTn id="32" fill="hold">
-                            <p:stCondLst>
-                              <p:cond delay="13000"/>
-                            </p:stCondLst>
-                            <p:childTnLst>
-                              <p:par>
-                                <p:cTn id="33" presetID="10" presetClass="exit" presetSubtype="0" fill="hold" nodeType="afterEffect">
-                                  <p:stCondLst>
-                                    <p:cond delay="2000"/>
-                                  </p:stCondLst>
-                                  <p:childTnLst>
-                                    <p:animEffect transition="out" filter="fade">
-                                      <p:cBhvr>
-                                        <p:cTn id="34" dur="250"/>
-                                        <p:tgtEl>
-                                          <p:spTgt spid="6"/>
-                                        </p:tgtEl>
-                                      </p:cBhvr>
-                                    </p:animEffect>
-                                    <p:set>
-                                      <p:cBhvr>
-                                        <p:cTn id="35" dur="1" fill="hold">
-                                          <p:stCondLst>
-                                            <p:cond delay="249"/>
-                                          </p:stCondLst>
-                                        </p:cTn>
-                                        <p:tgtEl>
-                                          <p:spTgt spid="6"/>
-                                        </p:tgtEl>
-                                        <p:attrNameLst>
-                                          <p:attrName>style.visibility</p:attrName>
-                                        </p:attrNameLst>
-                                      </p:cBhvr>
-                                      <p:to>
-                                        <p:strVal val="hidden"/>
-                                      </p:to>
-                                    </p:set>
-                                  </p:childTnLst>
-                                </p:cTn>
-                              </p:par>
-                              <p:par>
-                                <p:cTn id="36" presetID="10" presetClass="exit" presetSubtype="0" fill="hold" nodeType="withEffect">
-                                  <p:stCondLst>
-                                    <p:cond delay="2000"/>
-                                  </p:stCondLst>
-                                  <p:childTnLst>
-                                    <p:animEffect transition="out" filter="fade">
-                                      <p:cBhvr>
-                                        <p:cTn id="37" dur="500"/>
-                                        <p:tgtEl>
-                                          <p:spTgt spid="10"/>
-                                        </p:tgtEl>
-                                      </p:cBhvr>
-                                    </p:animEffect>
-                                    <p:set>
-                                      <p:cBhvr>
-                                        <p:cTn id="38" dur="1" fill="hold">
-                                          <p:stCondLst>
-                                            <p:cond delay="499"/>
-                                          </p:stCondLst>
-                                        </p:cTn>
-                                        <p:tgtEl>
-                                          <p:spTgt spid="10"/>
-                                        </p:tgtEl>
-                                        <p:attrNameLst>
-                                          <p:attrName>style.visibility</p:attrName>
-                                        </p:attrNameLst>
-                                      </p:cBhvr>
-                                      <p:to>
-                                        <p:strVal val="hidden"/>
-                                      </p:to>
-                                    </p:set>
-                                  </p:childTnLst>
-                                </p:cTn>
-                              </p:par>
-                              <p:par>
-                                <p:cTn id="39" presetID="10" presetClass="exit" presetSubtype="0" fill="hold" nodeType="withEffect">
-                                  <p:stCondLst>
-                                    <p:cond delay="2000"/>
-                                  </p:stCondLst>
-                                  <p:childTnLst>
-                                    <p:animEffect transition="out" filter="fade">
-                                      <p:cBhvr>
-                                        <p:cTn id="40" dur="500"/>
-                                        <p:tgtEl>
-                                          <p:spTgt spid="7"/>
-                                        </p:tgtEl>
-                                      </p:cBhvr>
-                                    </p:animEffect>
-                                    <p:set>
-                                      <p:cBhvr>
-                                        <p:cTn id="41" dur="1" fill="hold">
-                                          <p:stCondLst>
-                                            <p:cond delay="499"/>
-                                          </p:stCondLst>
-                                        </p:cTn>
-                                        <p:tgtEl>
-                                          <p:spTgt spid="7"/>
-                                        </p:tgtEl>
-                                        <p:attrNameLst>
-                                          <p:attrName>style.visibility</p:attrName>
-                                        </p:attrNameLst>
-                                      </p:cBhvr>
-                                      <p:to>
-                                        <p:strVal val="hidden"/>
-                                      </p:to>
-                                    </p:set>
-                                  </p:childTnLst>
-                                </p:cTn>
-                              </p:par>
-                            </p:childTnLst>
-                          </p:cTn>
-                        </p:par>
                       </p:childTnLst>
                     </p:cTn>
                   </p:par>
@@ -24591,14 +25308,6 @@
   <p:clrMapOvr>
     <a:masterClrMapping/>
   </p:clrMapOvr>
-  <mc:AlternateContent xmlns:mc="http://schemas.openxmlformats.org/markup-compatibility/2006">
-    <mc:Choice xmlns:p14="http://schemas.microsoft.com/office/powerpoint/2010/main" Requires="p14">
-      <p:transition spd="slow" p14:dur="2000" advClick="0"/>
-    </mc:Choice>
-    <mc:Fallback>
-      <p:transition spd="slow" advClick="0"/>
-    </mc:Fallback>
-  </mc:AlternateContent>
   <p:timing>
     <p:tnLst>
       <p:par>
@@ -25150,14 +25859,6 @@
   <p:clrMapOvr>
     <a:masterClrMapping/>
   </p:clrMapOvr>
-  <mc:AlternateContent xmlns:mc="http://schemas.openxmlformats.org/markup-compatibility/2006">
-    <mc:Choice xmlns:p14="http://schemas.microsoft.com/office/powerpoint/2010/main" Requires="p14">
-      <p:transition spd="slow" p14:dur="2000" advClick="0"/>
-    </mc:Choice>
-    <mc:Fallback>
-      <p:transition spd="slow" advClick="0"/>
-    </mc:Fallback>
-  </mc:AlternateContent>
   <p:timing>
     <p:tnLst>
       <p:par>
@@ -26063,120 +26764,6 @@
                             </p:childTnLst>
                           </p:cTn>
                         </p:par>
-                        <p:par>
-                          <p:cTn id="76" fill="hold">
-                            <p:stCondLst>
-                              <p:cond delay="29000"/>
-                            </p:stCondLst>
-                            <p:childTnLst>
-                              <p:par>
-                                <p:cTn id="77" presetID="10" presetClass="exit" presetSubtype="0" fill="hold" nodeType="afterEffect">
-                                  <p:stCondLst>
-                                    <p:cond delay="2000"/>
-                                  </p:stCondLst>
-                                  <p:childTnLst>
-                                    <p:animEffect transition="out" filter="fade">
-                                      <p:cBhvr>
-                                        <p:cTn id="78" dur="500"/>
-                                        <p:tgtEl>
-                                          <p:spTgt spid="26"/>
-                                        </p:tgtEl>
-                                      </p:cBhvr>
-                                    </p:animEffect>
-                                    <p:set>
-                                      <p:cBhvr>
-                                        <p:cTn id="79" dur="1" fill="hold">
-                                          <p:stCondLst>
-                                            <p:cond delay="499"/>
-                                          </p:stCondLst>
-                                        </p:cTn>
-                                        <p:tgtEl>
-                                          <p:spTgt spid="26"/>
-                                        </p:tgtEl>
-                                        <p:attrNameLst>
-                                          <p:attrName>style.visibility</p:attrName>
-                                        </p:attrNameLst>
-                                      </p:cBhvr>
-                                      <p:to>
-                                        <p:strVal val="hidden"/>
-                                      </p:to>
-                                    </p:set>
-                                  </p:childTnLst>
-                                </p:cTn>
-                              </p:par>
-                              <p:par>
-                                <p:cTn id="80" presetID="10" presetClass="exit" presetSubtype="0" fill="hold" nodeType="withEffect">
-                                  <p:stCondLst>
-                                    <p:cond delay="2000"/>
-                                  </p:stCondLst>
-                                  <p:childTnLst>
-                                    <p:animEffect transition="out" filter="fade">
-                                      <p:cBhvr>
-                                        <p:cTn id="81" dur="500"/>
-                                        <p:tgtEl>
-                                          <p:spTgt spid="22"/>
-                                        </p:tgtEl>
-                                      </p:cBhvr>
-                                    </p:animEffect>
-                                    <p:set>
-                                      <p:cBhvr>
-                                        <p:cTn id="82" dur="1" fill="hold">
-                                          <p:stCondLst>
-                                            <p:cond delay="499"/>
-                                          </p:stCondLst>
-                                        </p:cTn>
-                                        <p:tgtEl>
-                                          <p:spTgt spid="22"/>
-                                        </p:tgtEl>
-                                        <p:attrNameLst>
-                                          <p:attrName>style.visibility</p:attrName>
-                                        </p:attrNameLst>
-                                      </p:cBhvr>
-                                      <p:to>
-                                        <p:strVal val="hidden"/>
-                                      </p:to>
-                                    </p:set>
-                                  </p:childTnLst>
-                                </p:cTn>
-                              </p:par>
-                              <p:par>
-                                <p:cTn id="83" presetID="10" presetClass="exit" presetSubtype="0" fill="hold" grpId="1" nodeType="withEffect">
-                                  <p:stCondLst>
-                                    <p:cond delay="2000"/>
-                                  </p:stCondLst>
-                                  <p:childTnLst>
-                                    <p:animEffect transition="out" filter="fade">
-                                      <p:cBhvr>
-                                        <p:cTn id="84" dur="500"/>
-                                        <p:tgtEl>
-                                          <p:spTgt spid="17"/>
-                                        </p:tgtEl>
-                                      </p:cBhvr>
-                                    </p:animEffect>
-                                    <p:set>
-                                      <p:cBhvr>
-                                        <p:cTn id="85" dur="1" fill="hold">
-                                          <p:stCondLst>
-                                            <p:cond delay="499"/>
-                                          </p:stCondLst>
-                                        </p:cTn>
-                                        <p:tgtEl>
-                                          <p:spTgt spid="17"/>
-                                        </p:tgtEl>
-                                        <p:attrNameLst>
-                                          <p:attrName>style.visibility</p:attrName>
-                                        </p:attrNameLst>
-                                      </p:cBhvr>
-                                      <p:to>
-                                        <p:strVal val="hidden"/>
-                                      </p:to>
-                                    </p:set>
-                                  </p:childTnLst>
-                                </p:cTn>
-                              </p:par>
-                            </p:childTnLst>
-                          </p:cTn>
-                        </p:par>
                       </p:childTnLst>
                     </p:cTn>
                   </p:par>
@@ -26206,7 +26793,6 @@
       <p:bldP spid="2" grpId="0" animBg="1"/>
       <p:bldP spid="2" grpId="1" animBg="1"/>
       <p:bldP spid="17" grpId="0" animBg="1"/>
-      <p:bldP spid="17" grpId="1" animBg="1"/>
       <p:bldP spid="17" grpId="2" animBg="1"/>
       <p:bldP spid="17" grpId="3" animBg="1"/>
       <p:bldP spid="17" grpId="4" animBg="1"/>
@@ -26439,21 +27025,15 @@
           <p:nvPr/>
         </p:nvPicPr>
         <p:blipFill>
-          <a:blip r:embed="rId4">
-            <a:extLst>
-              <a:ext uri="{28A0092B-C50C-407E-A947-70E740481C1C}">
-                <a14:useLocalDpi xmlns:a14="http://schemas.microsoft.com/office/drawing/2010/main" val="0"/>
-              </a:ext>
-            </a:extLst>
-          </a:blip>
+          <a:blip r:embed="rId4"/>
           <a:stretch>
             <a:fillRect/>
           </a:stretch>
         </p:blipFill>
         <p:spPr>
           <a:xfrm>
-            <a:off x="3915840" y="807407"/>
-            <a:ext cx="4360322" cy="5243188"/>
+            <a:off x="3924853" y="807407"/>
+            <a:ext cx="4342296" cy="5243188"/>
           </a:xfrm>
           <a:prstGeom prst="rect">
             <a:avLst/>
@@ -26470,14 +27050,6 @@
   <p:clrMapOvr>
     <a:masterClrMapping/>
   </p:clrMapOvr>
-  <mc:AlternateContent xmlns:mc="http://schemas.openxmlformats.org/markup-compatibility/2006">
-    <mc:Choice xmlns:p14="http://schemas.microsoft.com/office/powerpoint/2010/main" Requires="p14">
-      <p:transition spd="slow" p14:dur="2000" advClick="0"/>
-    </mc:Choice>
-    <mc:Fallback>
-      <p:transition spd="slow" advClick="0"/>
-    </mc:Fallback>
-  </mc:AlternateContent>
   <p:timing>
     <p:tnLst>
       <p:par>
@@ -27129,7 +27701,7 @@
                                     <p:cond delay="0"/>
                                   </p:stCondLst>
                                   <p:childTnLst>
-                                    <p:animMotion origin="layout" path="M 0 -0.8507 L 0 -1.37222 " pathEditMode="relative" rAng="0" ptsTypes="AA">
+                                    <p:animMotion origin="layout" path="M 0 -0.8507 L 0 -1.32454 " pathEditMode="relative" rAng="0" ptsTypes="AA">
                                       <p:cBhvr>
                                         <p:cTn id="56" dur="2000" fill="hold"/>
                                         <p:tgtEl>
@@ -27140,7 +27712,7 @@
                                           <p:attrName>ppt_y</p:attrName>
                                         </p:attrNameLst>
                                       </p:cBhvr>
-                                      <p:rCtr x="0" y="-24120"/>
+                                      <p:rCtr x="0" y="-23704"/>
                                     </p:animMotion>
                                   </p:childTnLst>
                                 </p:cTn>
@@ -27245,14 +27817,84 @@
                             </p:stCondLst>
                             <p:childTnLst>
                               <p:par>
-                                <p:cTn id="64" presetID="10" presetClass="exit" presetSubtype="0" fill="hold" nodeType="afterEffect">
+                                <p:cTn id="64" presetID="10" presetClass="exit" presetSubtype="0" fill="hold" grpId="3" nodeType="afterEffect">
                                   <p:stCondLst>
-                                    <p:cond delay="0"/>
+                                    <p:cond delay="1000"/>
                                   </p:stCondLst>
                                   <p:childTnLst>
                                     <p:animEffect transition="out" filter="fade">
                                       <p:cBhvr>
                                         <p:cTn id="65" dur="500"/>
+                                        <p:tgtEl>
+                                          <p:spTgt spid="20"/>
+                                        </p:tgtEl>
+                                      </p:cBhvr>
+                                    </p:animEffect>
+                                    <p:set>
+                                      <p:cBhvr>
+                                        <p:cTn id="66" dur="1" fill="hold">
+                                          <p:stCondLst>
+                                            <p:cond delay="499"/>
+                                          </p:stCondLst>
+                                        </p:cTn>
+                                        <p:tgtEl>
+                                          <p:spTgt spid="20"/>
+                                        </p:tgtEl>
+                                        <p:attrNameLst>
+                                          <p:attrName>style.visibility</p:attrName>
+                                        </p:attrNameLst>
+                                      </p:cBhvr>
+                                      <p:to>
+                                        <p:strVal val="hidden"/>
+                                      </p:to>
+                                    </p:set>
+                                  </p:childTnLst>
+                                </p:cTn>
+                              </p:par>
+                              <p:par>
+                                <p:cTn id="67" presetID="10" presetClass="exit" presetSubtype="0" fill="hold" nodeType="withEffect">
+                                  <p:stCondLst>
+                                    <p:cond delay="1000"/>
+                                  </p:stCondLst>
+                                  <p:childTnLst>
+                                    <p:animEffect transition="out" filter="fade">
+                                      <p:cBhvr>
+                                        <p:cTn id="68" dur="500"/>
+                                        <p:tgtEl>
+                                          <p:spTgt spid="28"/>
+                                        </p:tgtEl>
+                                      </p:cBhvr>
+                                    </p:animEffect>
+                                    <p:set>
+                                      <p:cBhvr>
+                                        <p:cTn id="69" dur="1" fill="hold">
+                                          <p:stCondLst>
+                                            <p:cond delay="499"/>
+                                          </p:stCondLst>
+                                        </p:cTn>
+                                        <p:tgtEl>
+                                          <p:spTgt spid="28"/>
+                                        </p:tgtEl>
+                                        <p:attrNameLst>
+                                          <p:attrName>style.visibility</p:attrName>
+                                        </p:attrNameLst>
+                                      </p:cBhvr>
+                                      <p:to>
+                                        <p:strVal val="hidden"/>
+                                      </p:to>
+                                    </p:set>
+                                  </p:childTnLst>
+                                </p:cTn>
+                              </p:par>
+                              <p:par>
+                                <p:cTn id="70" presetID="10" presetClass="exit" presetSubtype="0" fill="hold" nodeType="withEffect">
+                                  <p:stCondLst>
+                                    <p:cond delay="1000"/>
+                                  </p:stCondLst>
+                                  <p:childTnLst>
+                                    <p:animEffect transition="out" filter="fade">
+                                      <p:cBhvr>
+                                        <p:cTn id="71" dur="500"/>
                                         <p:tgtEl>
                                           <p:spTgt spid="4"/>
                                         </p:tgtEl>
@@ -27260,7 +27902,7 @@
                                     </p:animEffect>
                                     <p:set>
                                       <p:cBhvr>
-                                        <p:cTn id="66" dur="1" fill="hold">
+                                        <p:cTn id="72" dur="1" fill="hold">
                                           <p:stCondLst>
                                             <p:cond delay="499"/>
                                           </p:stCondLst>
@@ -27313,6 +27955,7 @@
       <p:bldP spid="20" grpId="0" animBg="1"/>
       <p:bldP spid="20" grpId="1" animBg="1"/>
       <p:bldP spid="20" grpId="2" animBg="1"/>
+      <p:bldP spid="20" grpId="3" animBg="1"/>
     </p:bldLst>
   </p:timing>
 </p:sld>

</xml_diff>

<commit_message>
Presentacion - Mas animaciones, casi ya está, falta video y Foda
</commit_message>
<xml_diff>
--- a/- Presentacion/Filminas.pptx
+++ b/- Presentacion/Filminas.pptx
@@ -5,10 +5,10 @@
     <p:sldMasterId id="2147483648" r:id="rId1"/>
   </p:sldMasterIdLst>
   <p:notesMasterIdLst>
-    <p:notesMasterId r:id="rId22"/>
+    <p:notesMasterId r:id="rId24"/>
   </p:notesMasterIdLst>
   <p:handoutMasterIdLst>
-    <p:handoutMasterId r:id="rId23"/>
+    <p:handoutMasterId r:id="rId25"/>
   </p:handoutMasterIdLst>
   <p:sldIdLst>
     <p:sldId id="256" r:id="rId2"/>
@@ -22,15 +22,17 @@
     <p:sldId id="274" r:id="rId10"/>
     <p:sldId id="275" r:id="rId11"/>
     <p:sldId id="276" r:id="rId12"/>
-    <p:sldId id="266" r:id="rId13"/>
-    <p:sldId id="259" r:id="rId14"/>
-    <p:sldId id="261" r:id="rId15"/>
-    <p:sldId id="267" r:id="rId16"/>
-    <p:sldId id="269" r:id="rId17"/>
-    <p:sldId id="273" r:id="rId18"/>
-    <p:sldId id="270" r:id="rId19"/>
-    <p:sldId id="272" r:id="rId20"/>
-    <p:sldId id="271" r:id="rId21"/>
+    <p:sldId id="277" r:id="rId13"/>
+    <p:sldId id="278" r:id="rId14"/>
+    <p:sldId id="266" r:id="rId15"/>
+    <p:sldId id="259" r:id="rId16"/>
+    <p:sldId id="261" r:id="rId17"/>
+    <p:sldId id="267" r:id="rId18"/>
+    <p:sldId id="269" r:id="rId19"/>
+    <p:sldId id="273" r:id="rId20"/>
+    <p:sldId id="270" r:id="rId21"/>
+    <p:sldId id="272" r:id="rId22"/>
+    <p:sldId id="271" r:id="rId23"/>
   </p:sldIdLst>
   <p:sldSz cx="12192000" cy="6858000"/>
   <p:notesSz cx="6858000" cy="9144000"/>
@@ -19219,6 +19221,883 @@
       </p:grpSpPr>
       <p:sp>
         <p:nvSpPr>
+          <p:cNvPr id="15" name="Título 1">
+            <a:extLst>
+              <a:ext uri="{FF2B5EF4-FFF2-40B4-BE49-F238E27FC236}">
+                <a16:creationId xmlns:a16="http://schemas.microsoft.com/office/drawing/2014/main" id="{99A678E9-33D2-4CFD-80EC-CD69DA4F3997}"/>
+              </a:ext>
+            </a:extLst>
+          </p:cNvPr>
+          <p:cNvSpPr>
+            <a:spLocks noGrp="1"/>
+          </p:cNvSpPr>
+          <p:nvPr>
+            <p:ph type="ctrTitle"/>
+          </p:nvPr>
+        </p:nvSpPr>
+        <p:spPr>
+          <a:xfrm>
+            <a:off x="1007004" y="0"/>
+            <a:ext cx="10859035" cy="1440000"/>
+          </a:xfrm>
+        </p:spPr>
+        <p:txBody>
+          <a:bodyPr anchor="ctr"/>
+          <a:lstStyle/>
+          <a:p>
+            <a:pPr lvl="0" algn="l"/>
+            <a:r>
+              <a:rPr lang="es-ES" dirty="0"/>
+              <a:t>Diseño y Maquetado: Asistencias</a:t>
+            </a:r>
+          </a:p>
+        </p:txBody>
+      </p:sp>
+      <p:pic>
+        <p:nvPicPr>
+          <p:cNvPr id="27" name="Imagen 26 - Asistencias"/>
+          <p:cNvPicPr>
+            <a:picLocks noChangeAspect="1"/>
+          </p:cNvPicPr>
+          <p:nvPr/>
+        </p:nvPicPr>
+        <p:blipFill>
+          <a:blip r:embed="rId2"/>
+          <a:stretch>
+            <a:fillRect/>
+          </a:stretch>
+        </p:blipFill>
+        <p:spPr>
+          <a:xfrm>
+            <a:off x="221772" y="594345"/>
+            <a:ext cx="11748456" cy="5669312"/>
+          </a:xfrm>
+          <a:prstGeom prst="rect">
+            <a:avLst/>
+          </a:prstGeom>
+        </p:spPr>
+      </p:pic>
+      <p:sp>
+        <p:nvSpPr>
+          <p:cNvPr id="18" name="Elipse 17">
+            <a:extLst>
+              <a:ext uri="{FF2B5EF4-FFF2-40B4-BE49-F238E27FC236}">
+                <a16:creationId xmlns:a16="http://schemas.microsoft.com/office/drawing/2014/main" id="{063347B0-F7E2-4FE6-A56A-B788991375EC}"/>
+              </a:ext>
+            </a:extLst>
+          </p:cNvPr>
+          <p:cNvSpPr/>
+          <p:nvPr/>
+        </p:nvSpPr>
+        <p:spPr>
+          <a:xfrm>
+            <a:off x="9306572" y="1978091"/>
+            <a:ext cx="2318228" cy="1082044"/>
+          </a:xfrm>
+          <a:prstGeom prst="ellipse">
+            <a:avLst/>
+          </a:prstGeom>
+          <a:noFill/>
+          <a:ln w="38100">
+            <a:solidFill>
+              <a:srgbClr val="FF0000"/>
+            </a:solidFill>
+          </a:ln>
+        </p:spPr>
+        <p:style>
+          <a:lnRef idx="2">
+            <a:schemeClr val="accent1">
+              <a:shade val="50000"/>
+            </a:schemeClr>
+          </a:lnRef>
+          <a:fillRef idx="1">
+            <a:schemeClr val="accent1"/>
+          </a:fillRef>
+          <a:effectRef idx="0">
+            <a:schemeClr val="accent1"/>
+          </a:effectRef>
+          <a:fontRef idx="minor">
+            <a:schemeClr val="lt1"/>
+          </a:fontRef>
+        </p:style>
+        <p:txBody>
+          <a:bodyPr rtlCol="0" anchor="ctr"/>
+          <a:lstStyle/>
+          <a:p>
+            <a:pPr algn="ctr"/>
+            <a:endParaRPr lang="es-AR"/>
+          </a:p>
+        </p:txBody>
+      </p:sp>
+    </p:spTree>
+    <p:extLst>
+      <p:ext uri="{BB962C8B-B14F-4D97-AF65-F5344CB8AC3E}">
+        <p14:creationId xmlns:p14="http://schemas.microsoft.com/office/powerpoint/2010/main" val="3793402562"/>
+      </p:ext>
+    </p:extLst>
+  </p:cSld>
+  <p:clrMapOvr>
+    <a:masterClrMapping/>
+  </p:clrMapOvr>
+  <p:timing>
+    <p:tnLst>
+      <p:par>
+        <p:cTn id="1" dur="indefinite" restart="never" nodeType="tmRoot">
+          <p:childTnLst>
+            <p:seq concurrent="1" nextAc="seek">
+              <p:cTn id="2" dur="indefinite" nodeType="mainSeq">
+                <p:childTnLst>
+                  <p:par>
+                    <p:cTn id="3" fill="hold">
+                      <p:stCondLst>
+                        <p:cond delay="indefinite"/>
+                        <p:cond evt="onBegin" delay="0">
+                          <p:tn val="2"/>
+                        </p:cond>
+                      </p:stCondLst>
+                      <p:childTnLst>
+                        <p:par>
+                          <p:cTn id="4" fill="hold">
+                            <p:stCondLst>
+                              <p:cond delay="0"/>
+                            </p:stCondLst>
+                            <p:childTnLst>
+                              <p:par>
+                                <p:cTn id="5" presetID="10" presetClass="entr" presetSubtype="0" fill="hold" grpId="0" nodeType="afterEffect">
+                                  <p:stCondLst>
+                                    <p:cond delay="0"/>
+                                  </p:stCondLst>
+                                  <p:childTnLst>
+                                    <p:set>
+                                      <p:cBhvr>
+                                        <p:cTn id="6" dur="1" fill="hold">
+                                          <p:stCondLst>
+                                            <p:cond delay="0"/>
+                                          </p:stCondLst>
+                                        </p:cTn>
+                                        <p:tgtEl>
+                                          <p:spTgt spid="15"/>
+                                        </p:tgtEl>
+                                        <p:attrNameLst>
+                                          <p:attrName>style.visibility</p:attrName>
+                                        </p:attrNameLst>
+                                      </p:cBhvr>
+                                      <p:to>
+                                        <p:strVal val="visible"/>
+                                      </p:to>
+                                    </p:set>
+                                    <p:animEffect transition="in" filter="fade">
+                                      <p:cBhvr>
+                                        <p:cTn id="7" dur="1000"/>
+                                        <p:tgtEl>
+                                          <p:spTgt spid="15"/>
+                                        </p:tgtEl>
+                                      </p:cBhvr>
+                                    </p:animEffect>
+                                  </p:childTnLst>
+                                </p:cTn>
+                              </p:par>
+                            </p:childTnLst>
+                          </p:cTn>
+                        </p:par>
+                        <p:par>
+                          <p:cTn id="8" fill="hold">
+                            <p:stCondLst>
+                              <p:cond delay="1000"/>
+                            </p:stCondLst>
+                            <p:childTnLst>
+                              <p:par>
+                                <p:cTn id="9" presetID="53" presetClass="entr" presetSubtype="16" fill="hold" nodeType="afterEffect">
+                                  <p:stCondLst>
+                                    <p:cond delay="1000"/>
+                                  </p:stCondLst>
+                                  <p:childTnLst>
+                                    <p:set>
+                                      <p:cBhvr>
+                                        <p:cTn id="10" dur="1" fill="hold">
+                                          <p:stCondLst>
+                                            <p:cond delay="0"/>
+                                          </p:stCondLst>
+                                        </p:cTn>
+                                        <p:tgtEl>
+                                          <p:spTgt spid="27"/>
+                                        </p:tgtEl>
+                                        <p:attrNameLst>
+                                          <p:attrName>style.visibility</p:attrName>
+                                        </p:attrNameLst>
+                                      </p:cBhvr>
+                                      <p:to>
+                                        <p:strVal val="visible"/>
+                                      </p:to>
+                                    </p:set>
+                                    <p:anim calcmode="lin" valueType="num">
+                                      <p:cBhvr>
+                                        <p:cTn id="11" dur="1500" fill="hold"/>
+                                        <p:tgtEl>
+                                          <p:spTgt spid="27"/>
+                                        </p:tgtEl>
+                                        <p:attrNameLst>
+                                          <p:attrName>ppt_w</p:attrName>
+                                        </p:attrNameLst>
+                                      </p:cBhvr>
+                                      <p:tavLst>
+                                        <p:tav tm="0">
+                                          <p:val>
+                                            <p:fltVal val="0"/>
+                                          </p:val>
+                                        </p:tav>
+                                        <p:tav tm="100000">
+                                          <p:val>
+                                            <p:strVal val="#ppt_w"/>
+                                          </p:val>
+                                        </p:tav>
+                                      </p:tavLst>
+                                    </p:anim>
+                                    <p:anim calcmode="lin" valueType="num">
+                                      <p:cBhvr>
+                                        <p:cTn id="12" dur="1500" fill="hold"/>
+                                        <p:tgtEl>
+                                          <p:spTgt spid="27"/>
+                                        </p:tgtEl>
+                                        <p:attrNameLst>
+                                          <p:attrName>ppt_h</p:attrName>
+                                        </p:attrNameLst>
+                                      </p:cBhvr>
+                                      <p:tavLst>
+                                        <p:tav tm="0">
+                                          <p:val>
+                                            <p:fltVal val="0"/>
+                                          </p:val>
+                                        </p:tav>
+                                        <p:tav tm="100000">
+                                          <p:val>
+                                            <p:strVal val="#ppt_h"/>
+                                          </p:val>
+                                        </p:tav>
+                                      </p:tavLst>
+                                    </p:anim>
+                                    <p:animEffect transition="in" filter="fade">
+                                      <p:cBhvr>
+                                        <p:cTn id="13" dur="1500"/>
+                                        <p:tgtEl>
+                                          <p:spTgt spid="27"/>
+                                        </p:tgtEl>
+                                      </p:cBhvr>
+                                    </p:animEffect>
+                                  </p:childTnLst>
+                                </p:cTn>
+                              </p:par>
+                            </p:childTnLst>
+                          </p:cTn>
+                        </p:par>
+                        <p:par>
+                          <p:cTn id="14" fill="hold">
+                            <p:stCondLst>
+                              <p:cond delay="3500"/>
+                            </p:stCondLst>
+                            <p:childTnLst>
+                              <p:par>
+                                <p:cTn id="15" presetID="53" presetClass="entr" presetSubtype="16" fill="hold" grpId="0" nodeType="afterEffect">
+                                  <p:stCondLst>
+                                    <p:cond delay="2000"/>
+                                  </p:stCondLst>
+                                  <p:childTnLst>
+                                    <p:set>
+                                      <p:cBhvr>
+                                        <p:cTn id="16" dur="1" fill="hold">
+                                          <p:stCondLst>
+                                            <p:cond delay="0"/>
+                                          </p:stCondLst>
+                                        </p:cTn>
+                                        <p:tgtEl>
+                                          <p:spTgt spid="18"/>
+                                        </p:tgtEl>
+                                        <p:attrNameLst>
+                                          <p:attrName>style.visibility</p:attrName>
+                                        </p:attrNameLst>
+                                      </p:cBhvr>
+                                      <p:to>
+                                        <p:strVal val="visible"/>
+                                      </p:to>
+                                    </p:set>
+                                    <p:anim calcmode="lin" valueType="num">
+                                      <p:cBhvr>
+                                        <p:cTn id="17" dur="500" fill="hold"/>
+                                        <p:tgtEl>
+                                          <p:spTgt spid="18"/>
+                                        </p:tgtEl>
+                                        <p:attrNameLst>
+                                          <p:attrName>ppt_w</p:attrName>
+                                        </p:attrNameLst>
+                                      </p:cBhvr>
+                                      <p:tavLst>
+                                        <p:tav tm="0">
+                                          <p:val>
+                                            <p:fltVal val="0"/>
+                                          </p:val>
+                                        </p:tav>
+                                        <p:tav tm="100000">
+                                          <p:val>
+                                            <p:strVal val="#ppt_w"/>
+                                          </p:val>
+                                        </p:tav>
+                                      </p:tavLst>
+                                    </p:anim>
+                                    <p:anim calcmode="lin" valueType="num">
+                                      <p:cBhvr>
+                                        <p:cTn id="18" dur="500" fill="hold"/>
+                                        <p:tgtEl>
+                                          <p:spTgt spid="18"/>
+                                        </p:tgtEl>
+                                        <p:attrNameLst>
+                                          <p:attrName>ppt_h</p:attrName>
+                                        </p:attrNameLst>
+                                      </p:cBhvr>
+                                      <p:tavLst>
+                                        <p:tav tm="0">
+                                          <p:val>
+                                            <p:fltVal val="0"/>
+                                          </p:val>
+                                        </p:tav>
+                                        <p:tav tm="100000">
+                                          <p:val>
+                                            <p:strVal val="#ppt_h"/>
+                                          </p:val>
+                                        </p:tav>
+                                      </p:tavLst>
+                                    </p:anim>
+                                    <p:animEffect transition="in" filter="fade">
+                                      <p:cBhvr>
+                                        <p:cTn id="19" dur="500"/>
+                                        <p:tgtEl>
+                                          <p:spTgt spid="18"/>
+                                        </p:tgtEl>
+                                      </p:cBhvr>
+                                    </p:animEffect>
+                                  </p:childTnLst>
+                                </p:cTn>
+                              </p:par>
+                            </p:childTnLst>
+                          </p:cTn>
+                        </p:par>
+                        <p:par>
+                          <p:cTn id="20" fill="hold">
+                            <p:stCondLst>
+                              <p:cond delay="6000"/>
+                            </p:stCondLst>
+                            <p:childTnLst>
+                              <p:par>
+                                <p:cTn id="21" presetID="10" presetClass="exit" presetSubtype="0" fill="hold" grpId="1" nodeType="afterEffect">
+                                  <p:stCondLst>
+                                    <p:cond delay="1500"/>
+                                  </p:stCondLst>
+                                  <p:childTnLst>
+                                    <p:animEffect transition="out" filter="fade">
+                                      <p:cBhvr>
+                                        <p:cTn id="22" dur="500"/>
+                                        <p:tgtEl>
+                                          <p:spTgt spid="18"/>
+                                        </p:tgtEl>
+                                      </p:cBhvr>
+                                    </p:animEffect>
+                                    <p:set>
+                                      <p:cBhvr>
+                                        <p:cTn id="23" dur="1" fill="hold">
+                                          <p:stCondLst>
+                                            <p:cond delay="499"/>
+                                          </p:stCondLst>
+                                        </p:cTn>
+                                        <p:tgtEl>
+                                          <p:spTgt spid="18"/>
+                                        </p:tgtEl>
+                                        <p:attrNameLst>
+                                          <p:attrName>style.visibility</p:attrName>
+                                        </p:attrNameLst>
+                                      </p:cBhvr>
+                                      <p:to>
+                                        <p:strVal val="hidden"/>
+                                      </p:to>
+                                    </p:set>
+                                  </p:childTnLst>
+                                </p:cTn>
+                              </p:par>
+                              <p:par>
+                                <p:cTn id="24" presetID="10" presetClass="exit" presetSubtype="0" fill="hold" nodeType="withEffect">
+                                  <p:stCondLst>
+                                    <p:cond delay="1500"/>
+                                  </p:stCondLst>
+                                  <p:childTnLst>
+                                    <p:animEffect transition="out" filter="fade">
+                                      <p:cBhvr>
+                                        <p:cTn id="25" dur="500"/>
+                                        <p:tgtEl>
+                                          <p:spTgt spid="27"/>
+                                        </p:tgtEl>
+                                      </p:cBhvr>
+                                    </p:animEffect>
+                                    <p:set>
+                                      <p:cBhvr>
+                                        <p:cTn id="26" dur="1" fill="hold">
+                                          <p:stCondLst>
+                                            <p:cond delay="499"/>
+                                          </p:stCondLst>
+                                        </p:cTn>
+                                        <p:tgtEl>
+                                          <p:spTgt spid="27"/>
+                                        </p:tgtEl>
+                                        <p:attrNameLst>
+                                          <p:attrName>style.visibility</p:attrName>
+                                        </p:attrNameLst>
+                                      </p:cBhvr>
+                                      <p:to>
+                                        <p:strVal val="hidden"/>
+                                      </p:to>
+                                    </p:set>
+                                  </p:childTnLst>
+                                </p:cTn>
+                              </p:par>
+                            </p:childTnLst>
+                          </p:cTn>
+                        </p:par>
+                      </p:childTnLst>
+                    </p:cTn>
+                  </p:par>
+                </p:childTnLst>
+              </p:cTn>
+              <p:prevCondLst>
+                <p:cond evt="onPrev" delay="0">
+                  <p:tgtEl>
+                    <p:sldTgt/>
+                  </p:tgtEl>
+                </p:cond>
+              </p:prevCondLst>
+              <p:nextCondLst>
+                <p:cond evt="onNext" delay="0">
+                  <p:tgtEl>
+                    <p:sldTgt/>
+                  </p:tgtEl>
+                </p:cond>
+              </p:nextCondLst>
+            </p:seq>
+          </p:childTnLst>
+        </p:cTn>
+      </p:par>
+    </p:tnLst>
+    <p:bldLst>
+      <p:bldP spid="15" grpId="0"/>
+      <p:bldP spid="18" grpId="0" animBg="1"/>
+      <p:bldP spid="18" grpId="1" animBg="1"/>
+    </p:bldLst>
+  </p:timing>
+</p:sld>
+</file>
+
+<file path=ppt/slides/slide13.xml><?xml version="1.0" encoding="utf-8"?>
+<p:sld xmlns:a="http://schemas.openxmlformats.org/drawingml/2006/main" xmlns:r="http://schemas.openxmlformats.org/officeDocument/2006/relationships" xmlns:p="http://schemas.openxmlformats.org/presentationml/2006/main">
+  <p:cSld>
+    <p:spTree>
+      <p:nvGrpSpPr>
+        <p:cNvPr id="1" name=""/>
+        <p:cNvGrpSpPr/>
+        <p:nvPr/>
+      </p:nvGrpSpPr>
+      <p:grpSpPr>
+        <a:xfrm>
+          <a:off x="0" y="0"/>
+          <a:ext cx="0" cy="0"/>
+          <a:chOff x="0" y="0"/>
+          <a:chExt cx="0" cy="0"/>
+        </a:xfrm>
+      </p:grpSpPr>
+      <p:sp>
+        <p:nvSpPr>
+          <p:cNvPr id="15" name="Título 1">
+            <a:extLst>
+              <a:ext uri="{FF2B5EF4-FFF2-40B4-BE49-F238E27FC236}">
+                <a16:creationId xmlns:a16="http://schemas.microsoft.com/office/drawing/2014/main" id="{99A678E9-33D2-4CFD-80EC-CD69DA4F3997}"/>
+              </a:ext>
+            </a:extLst>
+          </p:cNvPr>
+          <p:cNvSpPr>
+            <a:spLocks noGrp="1"/>
+          </p:cNvSpPr>
+          <p:nvPr>
+            <p:ph type="ctrTitle"/>
+          </p:nvPr>
+        </p:nvSpPr>
+        <p:spPr>
+          <a:xfrm>
+            <a:off x="1007004" y="0"/>
+            <a:ext cx="10859035" cy="1440000"/>
+          </a:xfrm>
+        </p:spPr>
+        <p:txBody>
+          <a:bodyPr anchor="ctr"/>
+          <a:lstStyle/>
+          <a:p>
+            <a:pPr lvl="0" algn="l"/>
+            <a:r>
+              <a:rPr lang="es-ES" dirty="0"/>
+              <a:t>Diseño y Maquetado: Asistencias</a:t>
+            </a:r>
+          </a:p>
+        </p:txBody>
+      </p:sp>
+      <p:pic>
+        <p:nvPicPr>
+          <p:cNvPr id="29" name="Imagen 1 - Crear Clase"/>
+          <p:cNvPicPr>
+            <a:picLocks noChangeAspect="1"/>
+          </p:cNvPicPr>
+          <p:nvPr/>
+        </p:nvPicPr>
+        <p:blipFill>
+          <a:blip r:embed="rId2">
+            <a:extLst>
+              <a:ext uri="{28A0092B-C50C-407E-A947-70E740481C1C}">
+                <a14:useLocalDpi xmlns:a14="http://schemas.microsoft.com/office/drawing/2010/main" val="0"/>
+              </a:ext>
+            </a:extLst>
+          </a:blip>
+          <a:stretch>
+            <a:fillRect/>
+          </a:stretch>
+        </p:blipFill>
+        <p:spPr>
+          <a:xfrm>
+            <a:off x="221773" y="0"/>
+            <a:ext cx="11748455" cy="17580296"/>
+          </a:xfrm>
+          <a:prstGeom prst="rect">
+            <a:avLst/>
+          </a:prstGeom>
+        </p:spPr>
+      </p:pic>
+      <p:sp>
+        <p:nvSpPr>
+          <p:cNvPr id="20" name="Elipse 19">
+            <a:extLst>
+              <a:ext uri="{FF2B5EF4-FFF2-40B4-BE49-F238E27FC236}">
+                <a16:creationId xmlns:a16="http://schemas.microsoft.com/office/drawing/2014/main" id="{F6860F56-8B64-4875-A2BC-8DA4F2FFAA9E}"/>
+              </a:ext>
+            </a:extLst>
+          </p:cNvPr>
+          <p:cNvSpPr/>
+          <p:nvPr/>
+        </p:nvSpPr>
+        <p:spPr>
+          <a:xfrm>
+            <a:off x="10096499" y="2609850"/>
+            <a:ext cx="787461" cy="1885950"/>
+          </a:xfrm>
+          <a:prstGeom prst="ellipse">
+            <a:avLst/>
+          </a:prstGeom>
+          <a:noFill/>
+          <a:ln w="38100">
+            <a:solidFill>
+              <a:srgbClr val="FF0000"/>
+            </a:solidFill>
+          </a:ln>
+        </p:spPr>
+        <p:style>
+          <a:lnRef idx="2">
+            <a:schemeClr val="accent1">
+              <a:shade val="50000"/>
+            </a:schemeClr>
+          </a:lnRef>
+          <a:fillRef idx="1">
+            <a:schemeClr val="accent1"/>
+          </a:fillRef>
+          <a:effectRef idx="0">
+            <a:schemeClr val="accent1"/>
+          </a:effectRef>
+          <a:fontRef idx="minor">
+            <a:schemeClr val="lt1"/>
+          </a:fontRef>
+        </p:style>
+        <p:txBody>
+          <a:bodyPr rtlCol="0" anchor="ctr"/>
+          <a:lstStyle/>
+          <a:p>
+            <a:pPr algn="ctr"/>
+            <a:endParaRPr lang="es-AR"/>
+          </a:p>
+        </p:txBody>
+      </p:sp>
+    </p:spTree>
+    <p:extLst>
+      <p:ext uri="{BB962C8B-B14F-4D97-AF65-F5344CB8AC3E}">
+        <p14:creationId xmlns:p14="http://schemas.microsoft.com/office/powerpoint/2010/main" val="869348909"/>
+      </p:ext>
+    </p:extLst>
+  </p:cSld>
+  <p:clrMapOvr>
+    <a:masterClrMapping/>
+  </p:clrMapOvr>
+  <p:timing>
+    <p:tnLst>
+      <p:par>
+        <p:cTn id="1" dur="indefinite" restart="never" nodeType="tmRoot">
+          <p:childTnLst>
+            <p:seq concurrent="1" nextAc="seek">
+              <p:cTn id="2" dur="indefinite" nodeType="mainSeq">
+                <p:childTnLst>
+                  <p:par>
+                    <p:cTn id="3" fill="hold">
+                      <p:stCondLst>
+                        <p:cond delay="indefinite"/>
+                        <p:cond evt="onBegin" delay="0">
+                          <p:tn val="2"/>
+                        </p:cond>
+                      </p:stCondLst>
+                      <p:childTnLst>
+                        <p:par>
+                          <p:cTn id="4" fill="hold">
+                            <p:stCondLst>
+                              <p:cond delay="0"/>
+                            </p:stCondLst>
+                            <p:childTnLst>
+                              <p:par>
+                                <p:cTn id="5" presetID="10" presetClass="entr" presetSubtype="0" fill="hold" nodeType="afterEffect">
+                                  <p:stCondLst>
+                                    <p:cond delay="0"/>
+                                  </p:stCondLst>
+                                  <p:childTnLst>
+                                    <p:set>
+                                      <p:cBhvr>
+                                        <p:cTn id="6" dur="1" fill="hold">
+                                          <p:stCondLst>
+                                            <p:cond delay="0"/>
+                                          </p:stCondLst>
+                                        </p:cTn>
+                                        <p:tgtEl>
+                                          <p:spTgt spid="29"/>
+                                        </p:tgtEl>
+                                        <p:attrNameLst>
+                                          <p:attrName>style.visibility</p:attrName>
+                                        </p:attrNameLst>
+                                      </p:cBhvr>
+                                      <p:to>
+                                        <p:strVal val="visible"/>
+                                      </p:to>
+                                    </p:set>
+                                    <p:animEffect transition="in" filter="fade">
+                                      <p:cBhvr>
+                                        <p:cTn id="7" dur="1000"/>
+                                        <p:tgtEl>
+                                          <p:spTgt spid="29"/>
+                                        </p:tgtEl>
+                                      </p:cBhvr>
+                                    </p:animEffect>
+                                  </p:childTnLst>
+                                </p:cTn>
+                              </p:par>
+                            </p:childTnLst>
+                          </p:cTn>
+                        </p:par>
+                        <p:par>
+                          <p:cTn id="8" fill="hold">
+                            <p:stCondLst>
+                              <p:cond delay="1000"/>
+                            </p:stCondLst>
+                            <p:childTnLst>
+                              <p:par>
+                                <p:cTn id="9" presetID="42" presetClass="path" presetSubtype="0" accel="50000" decel="50000" fill="hold" nodeType="afterEffect">
+                                  <p:stCondLst>
+                                    <p:cond delay="0"/>
+                                  </p:stCondLst>
+                                  <p:childTnLst>
+                                    <p:animMotion origin="layout" path="M 0 -2.96296E-6 L 0 -1.56111 " pathEditMode="relative" rAng="0" ptsTypes="AA">
+                                      <p:cBhvr>
+                                        <p:cTn id="10" dur="5000" fill="hold"/>
+                                        <p:tgtEl>
+                                          <p:spTgt spid="29"/>
+                                        </p:tgtEl>
+                                        <p:attrNameLst>
+                                          <p:attrName>ppt_x</p:attrName>
+                                          <p:attrName>ppt_y</p:attrName>
+                                        </p:attrNameLst>
+                                      </p:cBhvr>
+                                      <p:rCtr x="0" y="-78056"/>
+                                    </p:animMotion>
+                                  </p:childTnLst>
+                                </p:cTn>
+                              </p:par>
+                            </p:childTnLst>
+                          </p:cTn>
+                        </p:par>
+                        <p:par>
+                          <p:cTn id="11" fill="hold">
+                            <p:stCondLst>
+                              <p:cond delay="6000"/>
+                            </p:stCondLst>
+                            <p:childTnLst>
+                              <p:par>
+                                <p:cTn id="12" presetID="42" presetClass="path" presetSubtype="0" accel="50000" decel="50000" fill="hold" nodeType="afterEffect">
+                                  <p:stCondLst>
+                                    <p:cond delay="0"/>
+                                  </p:stCondLst>
+                                  <p:childTnLst>
+                                    <p:animMotion origin="layout" path="M 0 -1.56111 L 0 -0.34004 " pathEditMode="relative" rAng="0" ptsTypes="AA">
+                                      <p:cBhvr>
+                                        <p:cTn id="13" dur="2000" fill="hold"/>
+                                        <p:tgtEl>
+                                          <p:spTgt spid="29"/>
+                                        </p:tgtEl>
+                                        <p:attrNameLst>
+                                          <p:attrName>ppt_x</p:attrName>
+                                          <p:attrName>ppt_y</p:attrName>
+                                        </p:attrNameLst>
+                                      </p:cBhvr>
+                                      <p:rCtr x="0" y="61042"/>
+                                    </p:animMotion>
+                                  </p:childTnLst>
+                                </p:cTn>
+                              </p:par>
+                            </p:childTnLst>
+                          </p:cTn>
+                        </p:par>
+                        <p:par>
+                          <p:cTn id="14" fill="hold">
+                            <p:stCondLst>
+                              <p:cond delay="8000"/>
+                            </p:stCondLst>
+                            <p:childTnLst>
+                              <p:par>
+                                <p:cTn id="15" presetID="53" presetClass="entr" presetSubtype="16" fill="hold" grpId="0" nodeType="afterEffect">
+                                  <p:stCondLst>
+                                    <p:cond delay="0"/>
+                                  </p:stCondLst>
+                                  <p:childTnLst>
+                                    <p:set>
+                                      <p:cBhvr>
+                                        <p:cTn id="16" dur="1" fill="hold">
+                                          <p:stCondLst>
+                                            <p:cond delay="0"/>
+                                          </p:stCondLst>
+                                        </p:cTn>
+                                        <p:tgtEl>
+                                          <p:spTgt spid="20"/>
+                                        </p:tgtEl>
+                                        <p:attrNameLst>
+                                          <p:attrName>style.visibility</p:attrName>
+                                        </p:attrNameLst>
+                                      </p:cBhvr>
+                                      <p:to>
+                                        <p:strVal val="visible"/>
+                                      </p:to>
+                                    </p:set>
+                                    <p:anim calcmode="lin" valueType="num">
+                                      <p:cBhvr>
+                                        <p:cTn id="17" dur="500" fill="hold"/>
+                                        <p:tgtEl>
+                                          <p:spTgt spid="20"/>
+                                        </p:tgtEl>
+                                        <p:attrNameLst>
+                                          <p:attrName>ppt_w</p:attrName>
+                                        </p:attrNameLst>
+                                      </p:cBhvr>
+                                      <p:tavLst>
+                                        <p:tav tm="0">
+                                          <p:val>
+                                            <p:fltVal val="0"/>
+                                          </p:val>
+                                        </p:tav>
+                                        <p:tav tm="100000">
+                                          <p:val>
+                                            <p:strVal val="#ppt_w"/>
+                                          </p:val>
+                                        </p:tav>
+                                      </p:tavLst>
+                                    </p:anim>
+                                    <p:anim calcmode="lin" valueType="num">
+                                      <p:cBhvr>
+                                        <p:cTn id="18" dur="500" fill="hold"/>
+                                        <p:tgtEl>
+                                          <p:spTgt spid="20"/>
+                                        </p:tgtEl>
+                                        <p:attrNameLst>
+                                          <p:attrName>ppt_h</p:attrName>
+                                        </p:attrNameLst>
+                                      </p:cBhvr>
+                                      <p:tavLst>
+                                        <p:tav tm="0">
+                                          <p:val>
+                                            <p:fltVal val="0"/>
+                                          </p:val>
+                                        </p:tav>
+                                        <p:tav tm="100000">
+                                          <p:val>
+                                            <p:strVal val="#ppt_h"/>
+                                          </p:val>
+                                        </p:tav>
+                                      </p:tavLst>
+                                    </p:anim>
+                                    <p:animEffect transition="in" filter="fade">
+                                      <p:cBhvr>
+                                        <p:cTn id="19" dur="500"/>
+                                        <p:tgtEl>
+                                          <p:spTgt spid="20"/>
+                                        </p:tgtEl>
+                                      </p:cBhvr>
+                                    </p:animEffect>
+                                  </p:childTnLst>
+                                </p:cTn>
+                              </p:par>
+                            </p:childTnLst>
+                          </p:cTn>
+                        </p:par>
+                      </p:childTnLst>
+                    </p:cTn>
+                  </p:par>
+                </p:childTnLst>
+              </p:cTn>
+              <p:prevCondLst>
+                <p:cond evt="onPrev" delay="0">
+                  <p:tgtEl>
+                    <p:sldTgt/>
+                  </p:tgtEl>
+                </p:cond>
+              </p:prevCondLst>
+              <p:nextCondLst>
+                <p:cond evt="onNext" delay="0">
+                  <p:tgtEl>
+                    <p:sldTgt/>
+                  </p:tgtEl>
+                </p:cond>
+              </p:nextCondLst>
+            </p:seq>
+          </p:childTnLst>
+        </p:cTn>
+      </p:par>
+    </p:tnLst>
+    <p:bldLst>
+      <p:bldP spid="20" grpId="0" animBg="1"/>
+    </p:bldLst>
+  </p:timing>
+</p:sld>
+</file>
+
+<file path=ppt/slides/slide14.xml><?xml version="1.0" encoding="utf-8"?>
+<p:sld xmlns:a="http://schemas.openxmlformats.org/drawingml/2006/main" xmlns:r="http://schemas.openxmlformats.org/officeDocument/2006/relationships" xmlns:p="http://schemas.openxmlformats.org/presentationml/2006/main">
+  <p:cSld>
+    <p:spTree>
+      <p:nvGrpSpPr>
+        <p:cNvPr id="1" name=""/>
+        <p:cNvGrpSpPr/>
+        <p:nvPr/>
+      </p:nvGrpSpPr>
+      <p:grpSpPr>
+        <a:xfrm>
+          <a:off x="0" y="0"/>
+          <a:ext cx="0" cy="0"/>
+          <a:chOff x="0" y="0"/>
+          <a:chExt cx="0" cy="0"/>
+        </a:xfrm>
+      </p:grpSpPr>
+      <p:sp>
+        <p:nvSpPr>
           <p:cNvPr id="2" name="Título 1"/>
           <p:cNvSpPr>
             <a:spLocks noGrp="1"/>
@@ -19773,7 +20652,7 @@
 </p:sld>
 </file>
 
-<file path=ppt/slides/slide13.xml><?xml version="1.0" encoding="utf-8"?>
+<file path=ppt/slides/slide15.xml><?xml version="1.0" encoding="utf-8"?>
 <p:sld xmlns:a="http://schemas.openxmlformats.org/drawingml/2006/main" xmlns:r="http://schemas.openxmlformats.org/officeDocument/2006/relationships" xmlns:p="http://schemas.openxmlformats.org/presentationml/2006/main">
   <p:cSld>
     <p:spTree>
@@ -20465,7 +21344,7 @@
 </p:sld>
 </file>
 
-<file path=ppt/slides/slide14.xml><?xml version="1.0" encoding="utf-8"?>
+<file path=ppt/slides/slide16.xml><?xml version="1.0" encoding="utf-8"?>
 <p:sld xmlns:a="http://schemas.openxmlformats.org/drawingml/2006/main" xmlns:r="http://schemas.openxmlformats.org/officeDocument/2006/relationships" xmlns:p="http://schemas.openxmlformats.org/presentationml/2006/main">
   <p:cSld>
     <p:spTree>
@@ -20743,7 +21622,7 @@
 </p:sld>
 </file>
 
-<file path=ppt/slides/slide15.xml><?xml version="1.0" encoding="utf-8"?>
+<file path=ppt/slides/slide17.xml><?xml version="1.0" encoding="utf-8"?>
 <p:sld xmlns:a="http://schemas.openxmlformats.org/drawingml/2006/main" xmlns:r="http://schemas.openxmlformats.org/officeDocument/2006/relationships" xmlns:p="http://schemas.openxmlformats.org/presentationml/2006/main">
   <p:cSld>
     <p:spTree>
@@ -20890,7 +21769,7 @@
 </p:sld>
 </file>
 
-<file path=ppt/slides/slide16.xml><?xml version="1.0" encoding="utf-8"?>
+<file path=ppt/slides/slide18.xml><?xml version="1.0" encoding="utf-8"?>
 <p:sld xmlns:a="http://schemas.openxmlformats.org/drawingml/2006/main" xmlns:r="http://schemas.openxmlformats.org/officeDocument/2006/relationships" xmlns:p="http://schemas.openxmlformats.org/presentationml/2006/main">
   <p:cSld>
     <p:spTree>
@@ -21273,7 +22152,7 @@
 </p:sld>
 </file>
 
-<file path=ppt/slides/slide17.xml><?xml version="1.0" encoding="utf-8"?>
+<file path=ppt/slides/slide19.xml><?xml version="1.0" encoding="utf-8"?>
 <p:sld xmlns:a="http://schemas.openxmlformats.org/drawingml/2006/main" xmlns:r="http://schemas.openxmlformats.org/officeDocument/2006/relationships" xmlns:p="http://schemas.openxmlformats.org/presentationml/2006/main">
   <p:cSld>
     <p:spTree>
@@ -21322,300 +22201,6 @@
     <p:extLst>
       <p:ext uri="{BB962C8B-B14F-4D97-AF65-F5344CB8AC3E}">
         <p14:creationId xmlns:p14="http://schemas.microsoft.com/office/powerpoint/2010/main" val="3347057538"/>
-      </p:ext>
-    </p:extLst>
-  </p:cSld>
-  <p:clrMapOvr>
-    <a:masterClrMapping/>
-  </p:clrMapOvr>
-  <p:timing>
-    <p:tnLst>
-      <p:par>
-        <p:cTn id="1" dur="indefinite" restart="never" nodeType="tmRoot">
-          <p:childTnLst>
-            <p:seq concurrent="1" nextAc="seek">
-              <p:cTn id="2" dur="indefinite" nodeType="mainSeq">
-                <p:childTnLst>
-                  <p:par>
-                    <p:cTn id="3" fill="hold">
-                      <p:stCondLst>
-                        <p:cond delay="indefinite"/>
-                        <p:cond evt="onBegin" delay="0">
-                          <p:tn val="2"/>
-                        </p:cond>
-                      </p:stCondLst>
-                      <p:childTnLst>
-                        <p:par>
-                          <p:cTn id="4" fill="hold">
-                            <p:stCondLst>
-                              <p:cond delay="0"/>
-                            </p:stCondLst>
-                            <p:childTnLst>
-                              <p:par>
-                                <p:cTn id="5" presetID="10" presetClass="entr" presetSubtype="0" fill="hold" grpId="0" nodeType="afterEffect">
-                                  <p:stCondLst>
-                                    <p:cond delay="0"/>
-                                  </p:stCondLst>
-                                  <p:childTnLst>
-                                    <p:set>
-                                      <p:cBhvr>
-                                        <p:cTn id="6" dur="1" fill="hold">
-                                          <p:stCondLst>
-                                            <p:cond delay="0"/>
-                                          </p:stCondLst>
-                                        </p:cTn>
-                                        <p:tgtEl>
-                                          <p:spTgt spid="2"/>
-                                        </p:tgtEl>
-                                        <p:attrNameLst>
-                                          <p:attrName>style.visibility</p:attrName>
-                                        </p:attrNameLst>
-                                      </p:cBhvr>
-                                      <p:to>
-                                        <p:strVal val="visible"/>
-                                      </p:to>
-                                    </p:set>
-                                    <p:animEffect transition="in" filter="fade">
-                                      <p:cBhvr>
-                                        <p:cTn id="7" dur="1000"/>
-                                        <p:tgtEl>
-                                          <p:spTgt spid="2"/>
-                                        </p:tgtEl>
-                                      </p:cBhvr>
-                                    </p:animEffect>
-                                  </p:childTnLst>
-                                </p:cTn>
-                              </p:par>
-                            </p:childTnLst>
-                          </p:cTn>
-                        </p:par>
-                      </p:childTnLst>
-                    </p:cTn>
-                  </p:par>
-                </p:childTnLst>
-              </p:cTn>
-              <p:prevCondLst>
-                <p:cond evt="onPrev" delay="0">
-                  <p:tgtEl>
-                    <p:sldTgt/>
-                  </p:tgtEl>
-                </p:cond>
-              </p:prevCondLst>
-              <p:nextCondLst>
-                <p:cond evt="onNext" delay="0">
-                  <p:tgtEl>
-                    <p:sldTgt/>
-                  </p:tgtEl>
-                </p:cond>
-              </p:nextCondLst>
-            </p:seq>
-          </p:childTnLst>
-        </p:cTn>
-      </p:par>
-    </p:tnLst>
-    <p:bldLst>
-      <p:bldP spid="2" grpId="0"/>
-    </p:bldLst>
-  </p:timing>
-</p:sld>
-</file>
-
-<file path=ppt/slides/slide18.xml><?xml version="1.0" encoding="utf-8"?>
-<p:sld xmlns:a="http://schemas.openxmlformats.org/drawingml/2006/main" xmlns:r="http://schemas.openxmlformats.org/officeDocument/2006/relationships" xmlns:p="http://schemas.openxmlformats.org/presentationml/2006/main">
-  <p:cSld>
-    <p:spTree>
-      <p:nvGrpSpPr>
-        <p:cNvPr id="1" name=""/>
-        <p:cNvGrpSpPr/>
-        <p:nvPr/>
-      </p:nvGrpSpPr>
-      <p:grpSpPr>
-        <a:xfrm>
-          <a:off x="0" y="0"/>
-          <a:ext cx="0" cy="0"/>
-          <a:chOff x="0" y="0"/>
-          <a:chExt cx="0" cy="0"/>
-        </a:xfrm>
-      </p:grpSpPr>
-      <p:sp>
-        <p:nvSpPr>
-          <p:cNvPr id="2" name="Título 1"/>
-          <p:cNvSpPr>
-            <a:spLocks noGrp="1"/>
-          </p:cNvSpPr>
-          <p:nvPr>
-            <p:ph type="ctrTitle"/>
-          </p:nvPr>
-        </p:nvSpPr>
-        <p:spPr>
-          <a:xfrm>
-            <a:off x="1007005" y="0"/>
-            <a:ext cx="7766936" cy="1300163"/>
-          </a:xfrm>
-        </p:spPr>
-        <p:txBody>
-          <a:bodyPr/>
-          <a:lstStyle/>
-          <a:p>
-            <a:pPr lvl="0" algn="l"/>
-            <a:r>
-              <a:rPr lang="es-ES" dirty="0"/>
-              <a:t>Debilidades:</a:t>
-            </a:r>
-          </a:p>
-        </p:txBody>
-      </p:sp>
-    </p:spTree>
-    <p:extLst>
-      <p:ext uri="{BB962C8B-B14F-4D97-AF65-F5344CB8AC3E}">
-        <p14:creationId xmlns:p14="http://schemas.microsoft.com/office/powerpoint/2010/main" val="1303370624"/>
-      </p:ext>
-    </p:extLst>
-  </p:cSld>
-  <p:clrMapOvr>
-    <a:masterClrMapping/>
-  </p:clrMapOvr>
-  <p:timing>
-    <p:tnLst>
-      <p:par>
-        <p:cTn id="1" dur="indefinite" restart="never" nodeType="tmRoot">
-          <p:childTnLst>
-            <p:seq concurrent="1" nextAc="seek">
-              <p:cTn id="2" dur="indefinite" nodeType="mainSeq">
-                <p:childTnLst>
-                  <p:par>
-                    <p:cTn id="3" fill="hold">
-                      <p:stCondLst>
-                        <p:cond delay="indefinite"/>
-                        <p:cond evt="onBegin" delay="0">
-                          <p:tn val="2"/>
-                        </p:cond>
-                      </p:stCondLst>
-                      <p:childTnLst>
-                        <p:par>
-                          <p:cTn id="4" fill="hold">
-                            <p:stCondLst>
-                              <p:cond delay="0"/>
-                            </p:stCondLst>
-                            <p:childTnLst>
-                              <p:par>
-                                <p:cTn id="5" presetID="10" presetClass="entr" presetSubtype="0" fill="hold" grpId="0" nodeType="afterEffect">
-                                  <p:stCondLst>
-                                    <p:cond delay="0"/>
-                                  </p:stCondLst>
-                                  <p:childTnLst>
-                                    <p:set>
-                                      <p:cBhvr>
-                                        <p:cTn id="6" dur="1" fill="hold">
-                                          <p:stCondLst>
-                                            <p:cond delay="0"/>
-                                          </p:stCondLst>
-                                        </p:cTn>
-                                        <p:tgtEl>
-                                          <p:spTgt spid="2"/>
-                                        </p:tgtEl>
-                                        <p:attrNameLst>
-                                          <p:attrName>style.visibility</p:attrName>
-                                        </p:attrNameLst>
-                                      </p:cBhvr>
-                                      <p:to>
-                                        <p:strVal val="visible"/>
-                                      </p:to>
-                                    </p:set>
-                                    <p:animEffect transition="in" filter="fade">
-                                      <p:cBhvr>
-                                        <p:cTn id="7" dur="1000"/>
-                                        <p:tgtEl>
-                                          <p:spTgt spid="2"/>
-                                        </p:tgtEl>
-                                      </p:cBhvr>
-                                    </p:animEffect>
-                                  </p:childTnLst>
-                                </p:cTn>
-                              </p:par>
-                            </p:childTnLst>
-                          </p:cTn>
-                        </p:par>
-                      </p:childTnLst>
-                    </p:cTn>
-                  </p:par>
-                </p:childTnLst>
-              </p:cTn>
-              <p:prevCondLst>
-                <p:cond evt="onPrev" delay="0">
-                  <p:tgtEl>
-                    <p:sldTgt/>
-                  </p:tgtEl>
-                </p:cond>
-              </p:prevCondLst>
-              <p:nextCondLst>
-                <p:cond evt="onNext" delay="0">
-                  <p:tgtEl>
-                    <p:sldTgt/>
-                  </p:tgtEl>
-                </p:cond>
-              </p:nextCondLst>
-            </p:seq>
-          </p:childTnLst>
-        </p:cTn>
-      </p:par>
-    </p:tnLst>
-    <p:bldLst>
-      <p:bldP spid="2" grpId="0"/>
-    </p:bldLst>
-  </p:timing>
-</p:sld>
-</file>
-
-<file path=ppt/slides/slide19.xml><?xml version="1.0" encoding="utf-8"?>
-<p:sld xmlns:a="http://schemas.openxmlformats.org/drawingml/2006/main" xmlns:r="http://schemas.openxmlformats.org/officeDocument/2006/relationships" xmlns:p="http://schemas.openxmlformats.org/presentationml/2006/main">
-  <p:cSld>
-    <p:spTree>
-      <p:nvGrpSpPr>
-        <p:cNvPr id="1" name=""/>
-        <p:cNvGrpSpPr/>
-        <p:nvPr/>
-      </p:nvGrpSpPr>
-      <p:grpSpPr>
-        <a:xfrm>
-          <a:off x="0" y="0"/>
-          <a:ext cx="0" cy="0"/>
-          <a:chOff x="0" y="0"/>
-          <a:chExt cx="0" cy="0"/>
-        </a:xfrm>
-      </p:grpSpPr>
-      <p:sp>
-        <p:nvSpPr>
-          <p:cNvPr id="2" name="Título 1"/>
-          <p:cNvSpPr>
-            <a:spLocks noGrp="1"/>
-          </p:cNvSpPr>
-          <p:nvPr>
-            <p:ph type="ctrTitle"/>
-          </p:nvPr>
-        </p:nvSpPr>
-        <p:spPr>
-          <a:xfrm>
-            <a:off x="1007005" y="0"/>
-            <a:ext cx="7766936" cy="1300163"/>
-          </a:xfrm>
-        </p:spPr>
-        <p:txBody>
-          <a:bodyPr/>
-          <a:lstStyle/>
-          <a:p>
-            <a:pPr lvl="0" algn="l"/>
-            <a:r>
-              <a:rPr lang="es-ES" dirty="0"/>
-              <a:t>Oportunidades:</a:t>
-            </a:r>
-          </a:p>
-        </p:txBody>
-      </p:sp>
-    </p:spTree>
-    <p:extLst>
-      <p:ext uri="{BB962C8B-B14F-4D97-AF65-F5344CB8AC3E}">
-        <p14:creationId xmlns:p14="http://schemas.microsoft.com/office/powerpoint/2010/main" val="59585241"/>
       </p:ext>
     </p:extLst>
   </p:cSld>
@@ -22413,6 +22998,300 @@
 </file>
 
 <file path=ppt/slides/slide20.xml><?xml version="1.0" encoding="utf-8"?>
+<p:sld xmlns:a="http://schemas.openxmlformats.org/drawingml/2006/main" xmlns:r="http://schemas.openxmlformats.org/officeDocument/2006/relationships" xmlns:p="http://schemas.openxmlformats.org/presentationml/2006/main">
+  <p:cSld>
+    <p:spTree>
+      <p:nvGrpSpPr>
+        <p:cNvPr id="1" name=""/>
+        <p:cNvGrpSpPr/>
+        <p:nvPr/>
+      </p:nvGrpSpPr>
+      <p:grpSpPr>
+        <a:xfrm>
+          <a:off x="0" y="0"/>
+          <a:ext cx="0" cy="0"/>
+          <a:chOff x="0" y="0"/>
+          <a:chExt cx="0" cy="0"/>
+        </a:xfrm>
+      </p:grpSpPr>
+      <p:sp>
+        <p:nvSpPr>
+          <p:cNvPr id="2" name="Título 1"/>
+          <p:cNvSpPr>
+            <a:spLocks noGrp="1"/>
+          </p:cNvSpPr>
+          <p:nvPr>
+            <p:ph type="ctrTitle"/>
+          </p:nvPr>
+        </p:nvSpPr>
+        <p:spPr>
+          <a:xfrm>
+            <a:off x="1007005" y="0"/>
+            <a:ext cx="7766936" cy="1300163"/>
+          </a:xfrm>
+        </p:spPr>
+        <p:txBody>
+          <a:bodyPr/>
+          <a:lstStyle/>
+          <a:p>
+            <a:pPr lvl="0" algn="l"/>
+            <a:r>
+              <a:rPr lang="es-ES" dirty="0"/>
+              <a:t>Debilidades:</a:t>
+            </a:r>
+          </a:p>
+        </p:txBody>
+      </p:sp>
+    </p:spTree>
+    <p:extLst>
+      <p:ext uri="{BB962C8B-B14F-4D97-AF65-F5344CB8AC3E}">
+        <p14:creationId xmlns:p14="http://schemas.microsoft.com/office/powerpoint/2010/main" val="1303370624"/>
+      </p:ext>
+    </p:extLst>
+  </p:cSld>
+  <p:clrMapOvr>
+    <a:masterClrMapping/>
+  </p:clrMapOvr>
+  <p:timing>
+    <p:tnLst>
+      <p:par>
+        <p:cTn id="1" dur="indefinite" restart="never" nodeType="tmRoot">
+          <p:childTnLst>
+            <p:seq concurrent="1" nextAc="seek">
+              <p:cTn id="2" dur="indefinite" nodeType="mainSeq">
+                <p:childTnLst>
+                  <p:par>
+                    <p:cTn id="3" fill="hold">
+                      <p:stCondLst>
+                        <p:cond delay="indefinite"/>
+                        <p:cond evt="onBegin" delay="0">
+                          <p:tn val="2"/>
+                        </p:cond>
+                      </p:stCondLst>
+                      <p:childTnLst>
+                        <p:par>
+                          <p:cTn id="4" fill="hold">
+                            <p:stCondLst>
+                              <p:cond delay="0"/>
+                            </p:stCondLst>
+                            <p:childTnLst>
+                              <p:par>
+                                <p:cTn id="5" presetID="10" presetClass="entr" presetSubtype="0" fill="hold" grpId="0" nodeType="afterEffect">
+                                  <p:stCondLst>
+                                    <p:cond delay="0"/>
+                                  </p:stCondLst>
+                                  <p:childTnLst>
+                                    <p:set>
+                                      <p:cBhvr>
+                                        <p:cTn id="6" dur="1" fill="hold">
+                                          <p:stCondLst>
+                                            <p:cond delay="0"/>
+                                          </p:stCondLst>
+                                        </p:cTn>
+                                        <p:tgtEl>
+                                          <p:spTgt spid="2"/>
+                                        </p:tgtEl>
+                                        <p:attrNameLst>
+                                          <p:attrName>style.visibility</p:attrName>
+                                        </p:attrNameLst>
+                                      </p:cBhvr>
+                                      <p:to>
+                                        <p:strVal val="visible"/>
+                                      </p:to>
+                                    </p:set>
+                                    <p:animEffect transition="in" filter="fade">
+                                      <p:cBhvr>
+                                        <p:cTn id="7" dur="1000"/>
+                                        <p:tgtEl>
+                                          <p:spTgt spid="2"/>
+                                        </p:tgtEl>
+                                      </p:cBhvr>
+                                    </p:animEffect>
+                                  </p:childTnLst>
+                                </p:cTn>
+                              </p:par>
+                            </p:childTnLst>
+                          </p:cTn>
+                        </p:par>
+                      </p:childTnLst>
+                    </p:cTn>
+                  </p:par>
+                </p:childTnLst>
+              </p:cTn>
+              <p:prevCondLst>
+                <p:cond evt="onPrev" delay="0">
+                  <p:tgtEl>
+                    <p:sldTgt/>
+                  </p:tgtEl>
+                </p:cond>
+              </p:prevCondLst>
+              <p:nextCondLst>
+                <p:cond evt="onNext" delay="0">
+                  <p:tgtEl>
+                    <p:sldTgt/>
+                  </p:tgtEl>
+                </p:cond>
+              </p:nextCondLst>
+            </p:seq>
+          </p:childTnLst>
+        </p:cTn>
+      </p:par>
+    </p:tnLst>
+    <p:bldLst>
+      <p:bldP spid="2" grpId="0"/>
+    </p:bldLst>
+  </p:timing>
+</p:sld>
+</file>
+
+<file path=ppt/slides/slide21.xml><?xml version="1.0" encoding="utf-8"?>
+<p:sld xmlns:a="http://schemas.openxmlformats.org/drawingml/2006/main" xmlns:r="http://schemas.openxmlformats.org/officeDocument/2006/relationships" xmlns:p="http://schemas.openxmlformats.org/presentationml/2006/main">
+  <p:cSld>
+    <p:spTree>
+      <p:nvGrpSpPr>
+        <p:cNvPr id="1" name=""/>
+        <p:cNvGrpSpPr/>
+        <p:nvPr/>
+      </p:nvGrpSpPr>
+      <p:grpSpPr>
+        <a:xfrm>
+          <a:off x="0" y="0"/>
+          <a:ext cx="0" cy="0"/>
+          <a:chOff x="0" y="0"/>
+          <a:chExt cx="0" cy="0"/>
+        </a:xfrm>
+      </p:grpSpPr>
+      <p:sp>
+        <p:nvSpPr>
+          <p:cNvPr id="2" name="Título 1"/>
+          <p:cNvSpPr>
+            <a:spLocks noGrp="1"/>
+          </p:cNvSpPr>
+          <p:nvPr>
+            <p:ph type="ctrTitle"/>
+          </p:nvPr>
+        </p:nvSpPr>
+        <p:spPr>
+          <a:xfrm>
+            <a:off x="1007005" y="0"/>
+            <a:ext cx="7766936" cy="1300163"/>
+          </a:xfrm>
+        </p:spPr>
+        <p:txBody>
+          <a:bodyPr/>
+          <a:lstStyle/>
+          <a:p>
+            <a:pPr lvl="0" algn="l"/>
+            <a:r>
+              <a:rPr lang="es-ES" dirty="0"/>
+              <a:t>Oportunidades:</a:t>
+            </a:r>
+          </a:p>
+        </p:txBody>
+      </p:sp>
+    </p:spTree>
+    <p:extLst>
+      <p:ext uri="{BB962C8B-B14F-4D97-AF65-F5344CB8AC3E}">
+        <p14:creationId xmlns:p14="http://schemas.microsoft.com/office/powerpoint/2010/main" val="59585241"/>
+      </p:ext>
+    </p:extLst>
+  </p:cSld>
+  <p:clrMapOvr>
+    <a:masterClrMapping/>
+  </p:clrMapOvr>
+  <p:timing>
+    <p:tnLst>
+      <p:par>
+        <p:cTn id="1" dur="indefinite" restart="never" nodeType="tmRoot">
+          <p:childTnLst>
+            <p:seq concurrent="1" nextAc="seek">
+              <p:cTn id="2" dur="indefinite" nodeType="mainSeq">
+                <p:childTnLst>
+                  <p:par>
+                    <p:cTn id="3" fill="hold">
+                      <p:stCondLst>
+                        <p:cond delay="indefinite"/>
+                        <p:cond evt="onBegin" delay="0">
+                          <p:tn val="2"/>
+                        </p:cond>
+                      </p:stCondLst>
+                      <p:childTnLst>
+                        <p:par>
+                          <p:cTn id="4" fill="hold">
+                            <p:stCondLst>
+                              <p:cond delay="0"/>
+                            </p:stCondLst>
+                            <p:childTnLst>
+                              <p:par>
+                                <p:cTn id="5" presetID="10" presetClass="entr" presetSubtype="0" fill="hold" grpId="0" nodeType="afterEffect">
+                                  <p:stCondLst>
+                                    <p:cond delay="0"/>
+                                  </p:stCondLst>
+                                  <p:childTnLst>
+                                    <p:set>
+                                      <p:cBhvr>
+                                        <p:cTn id="6" dur="1" fill="hold">
+                                          <p:stCondLst>
+                                            <p:cond delay="0"/>
+                                          </p:stCondLst>
+                                        </p:cTn>
+                                        <p:tgtEl>
+                                          <p:spTgt spid="2"/>
+                                        </p:tgtEl>
+                                        <p:attrNameLst>
+                                          <p:attrName>style.visibility</p:attrName>
+                                        </p:attrNameLst>
+                                      </p:cBhvr>
+                                      <p:to>
+                                        <p:strVal val="visible"/>
+                                      </p:to>
+                                    </p:set>
+                                    <p:animEffect transition="in" filter="fade">
+                                      <p:cBhvr>
+                                        <p:cTn id="7" dur="1000"/>
+                                        <p:tgtEl>
+                                          <p:spTgt spid="2"/>
+                                        </p:tgtEl>
+                                      </p:cBhvr>
+                                    </p:animEffect>
+                                  </p:childTnLst>
+                                </p:cTn>
+                              </p:par>
+                            </p:childTnLst>
+                          </p:cTn>
+                        </p:par>
+                      </p:childTnLst>
+                    </p:cTn>
+                  </p:par>
+                </p:childTnLst>
+              </p:cTn>
+              <p:prevCondLst>
+                <p:cond evt="onPrev" delay="0">
+                  <p:tgtEl>
+                    <p:sldTgt/>
+                  </p:tgtEl>
+                </p:cond>
+              </p:prevCondLst>
+              <p:nextCondLst>
+                <p:cond evt="onNext" delay="0">
+                  <p:tgtEl>
+                    <p:sldTgt/>
+                  </p:tgtEl>
+                </p:cond>
+              </p:nextCondLst>
+            </p:seq>
+          </p:childTnLst>
+        </p:cTn>
+      </p:par>
+    </p:tnLst>
+    <p:bldLst>
+      <p:bldP spid="2" grpId="0"/>
+    </p:bldLst>
+  </p:timing>
+</p:sld>
+</file>
+
+<file path=ppt/slides/slide22.xml><?xml version="1.0" encoding="utf-8"?>
 <p:sld xmlns:a="http://schemas.openxmlformats.org/drawingml/2006/main" xmlns:r="http://schemas.openxmlformats.org/officeDocument/2006/relationships" xmlns:p="http://schemas.openxmlformats.org/presentationml/2006/main">
   <p:cSld>
     <p:spTree>

</xml_diff>

<commit_message>
Completado de borrador en filminas de FODA
</commit_message>
<xml_diff>
--- a/- Presentacion/Filminas.pptx
+++ b/- Presentacion/Filminas.pptx
@@ -134,6 +134,9 @@
   <p:extLst>
     <p:ext uri="{EFAFB233-063F-42B5-8137-9DF3F51BA10A}">
       <p15:sldGuideLst xmlns:p15="http://schemas.microsoft.com/office/powerpoint/2012/main"/>
+    </p:ext>
+    <p:ext uri="{2D200454-40CA-4A62-9FC3-DE9A4176ACB9}">
+      <p15:notesGuideLst xmlns:p15="http://schemas.microsoft.com/office/powerpoint/2012/main"/>
     </p:ext>
   </p:extLst>
 </p:presentation>
@@ -2768,6 +2771,13 @@
         </dgm:presLayoutVars>
       </dgm:prSet>
       <dgm:spPr/>
+      <dgm:t>
+        <a:bodyPr/>
+        <a:lstStyle/>
+        <a:p>
+          <a:endParaRPr lang="es-ES"/>
+        </a:p>
+      </dgm:t>
     </dgm:pt>
     <dgm:pt modelId="{266400AB-999E-488C-9733-2599CA5CD9A8}" type="pres">
       <dgm:prSet presAssocID="{D29DDFF6-6BFF-4F3B-97FB-031A18D807F2}" presName="Name1" presStyleCnt="0"/>
@@ -2784,6 +2794,13 @@
     <dgm:pt modelId="{9A29400E-D447-4998-A023-B0F9B967EC93}" type="pres">
       <dgm:prSet presAssocID="{D29DDFF6-6BFF-4F3B-97FB-031A18D807F2}" presName="conn" presStyleLbl="parChTrans1D2" presStyleIdx="0" presStyleCnt="1"/>
       <dgm:spPr/>
+      <dgm:t>
+        <a:bodyPr/>
+        <a:lstStyle/>
+        <a:p>
+          <a:endParaRPr lang="es-ES"/>
+        </a:p>
+      </dgm:t>
     </dgm:pt>
     <dgm:pt modelId="{168EE675-8819-4FC2-8D86-5B193AC212FA}" type="pres">
       <dgm:prSet presAssocID="{D29DDFF6-6BFF-4F3B-97FB-031A18D807F2}" presName="extraNode" presStyleLbl="node1" presStyleIdx="0" presStyleCnt="5"/>
@@ -2800,6 +2817,13 @@
         </dgm:presLayoutVars>
       </dgm:prSet>
       <dgm:spPr/>
+      <dgm:t>
+        <a:bodyPr/>
+        <a:lstStyle/>
+        <a:p>
+          <a:endParaRPr lang="es-ES"/>
+        </a:p>
+      </dgm:t>
     </dgm:pt>
     <dgm:pt modelId="{25CA5261-6505-4EDE-B820-DD807819A45E}" type="pres">
       <dgm:prSet presAssocID="{474EF926-BC84-4665-BA3E-A7AEBCE4534F}" presName="accent_1" presStyleCnt="0"/>
@@ -2816,6 +2840,13 @@
         </dgm:presLayoutVars>
       </dgm:prSet>
       <dgm:spPr/>
+      <dgm:t>
+        <a:bodyPr/>
+        <a:lstStyle/>
+        <a:p>
+          <a:endParaRPr lang="es-ES"/>
+        </a:p>
+      </dgm:t>
     </dgm:pt>
     <dgm:pt modelId="{02A6DA82-50F5-4670-8711-15C77618828F}" type="pres">
       <dgm:prSet presAssocID="{16E1718A-744A-4C85-9110-553C9D344CBD}" presName="accent_2" presStyleCnt="0"/>
@@ -2832,6 +2863,13 @@
         </dgm:presLayoutVars>
       </dgm:prSet>
       <dgm:spPr/>
+      <dgm:t>
+        <a:bodyPr/>
+        <a:lstStyle/>
+        <a:p>
+          <a:endParaRPr lang="es-ES"/>
+        </a:p>
+      </dgm:t>
     </dgm:pt>
     <dgm:pt modelId="{222FEF30-414A-4B06-877D-B319023E74BC}" type="pres">
       <dgm:prSet presAssocID="{43ED8219-4325-4679-A414-952FE86A7625}" presName="accent_3" presStyleCnt="0"/>
@@ -2848,6 +2886,13 @@
         </dgm:presLayoutVars>
       </dgm:prSet>
       <dgm:spPr/>
+      <dgm:t>
+        <a:bodyPr/>
+        <a:lstStyle/>
+        <a:p>
+          <a:endParaRPr lang="es-ES"/>
+        </a:p>
+      </dgm:t>
     </dgm:pt>
     <dgm:pt modelId="{F3E82B52-5B49-4CB9-8667-146C05C691E7}" type="pres">
       <dgm:prSet presAssocID="{7557B5CD-A45A-4B7A-A911-4DBA263D466E}" presName="accent_4" presStyleCnt="0"/>
@@ -2864,6 +2909,13 @@
         </dgm:presLayoutVars>
       </dgm:prSet>
       <dgm:spPr/>
+      <dgm:t>
+        <a:bodyPr/>
+        <a:lstStyle/>
+        <a:p>
+          <a:endParaRPr lang="es-ES"/>
+        </a:p>
+      </dgm:t>
     </dgm:pt>
     <dgm:pt modelId="{25ED8965-16C8-46D3-89CE-BFED3CEB1272}" type="pres">
       <dgm:prSet presAssocID="{0D6D3344-6969-4E4A-9BD6-4D72F65255C9}" presName="accent_5" presStyleCnt="0"/>
@@ -2875,18 +2927,18 @@
     </dgm:pt>
   </dgm:ptLst>
   <dgm:cxnLst>
+    <dgm:cxn modelId="{A1B12BED-E291-489F-906B-2F754C8790DB}" srcId="{D29DDFF6-6BFF-4F3B-97FB-031A18D807F2}" destId="{16E1718A-744A-4C85-9110-553C9D344CBD}" srcOrd="1" destOrd="0" parTransId="{4F3A8392-7B3B-4CB8-BF89-90392BA6780D}" sibTransId="{ED773497-637F-4021-B7FC-D0C33D87B378}"/>
+    <dgm:cxn modelId="{F077CB2F-4D30-406E-80E3-54042DAF1B6E}" type="presOf" srcId="{43ED8219-4325-4679-A414-952FE86A7625}" destId="{463998AF-51E3-49F0-A2E0-474149259F51}" srcOrd="0" destOrd="0" presId="urn:microsoft.com/office/officeart/2008/layout/VerticalCurvedList"/>
+    <dgm:cxn modelId="{3A232769-196F-465E-BC37-BC950AC7D570}" type="presOf" srcId="{DF4AA762-2657-4659-9A20-B18288B3EC60}" destId="{9A29400E-D447-4998-A023-B0F9B967EC93}" srcOrd="0" destOrd="0" presId="urn:microsoft.com/office/officeart/2008/layout/VerticalCurvedList"/>
     <dgm:cxn modelId="{24E96423-D4AA-470F-B058-A150EF0F3E61}" srcId="{D29DDFF6-6BFF-4F3B-97FB-031A18D807F2}" destId="{43ED8219-4325-4679-A414-952FE86A7625}" srcOrd="2" destOrd="0" parTransId="{31C86FFB-F811-44F1-A316-6C34B372794A}" sibTransId="{03C9A937-D134-459B-90EB-446941E3FAFA}"/>
-    <dgm:cxn modelId="{F077CB2F-4D30-406E-80E3-54042DAF1B6E}" type="presOf" srcId="{43ED8219-4325-4679-A414-952FE86A7625}" destId="{463998AF-51E3-49F0-A2E0-474149259F51}" srcOrd="0" destOrd="0" presId="urn:microsoft.com/office/officeart/2008/layout/VerticalCurvedList"/>
-    <dgm:cxn modelId="{FB7B355D-2D70-413A-91F1-3EB1F1017C61}" type="presOf" srcId="{D29DDFF6-6BFF-4F3B-97FB-031A18D807F2}" destId="{FC2EFB32-545C-42E6-9B4D-394D6163170F}" srcOrd="0" destOrd="0" presId="urn:microsoft.com/office/officeart/2008/layout/VerticalCurvedList"/>
-    <dgm:cxn modelId="{3A232769-196F-465E-BC37-BC950AC7D570}" type="presOf" srcId="{DF4AA762-2657-4659-9A20-B18288B3EC60}" destId="{9A29400E-D447-4998-A023-B0F9B967EC93}" srcOrd="0" destOrd="0" presId="urn:microsoft.com/office/officeart/2008/layout/VerticalCurvedList"/>
-    <dgm:cxn modelId="{31FE634D-47D5-4E22-9EF8-6E744FB21A95}" type="presOf" srcId="{474EF926-BC84-4665-BA3E-A7AEBCE4534F}" destId="{8140F5BC-68DF-400F-A176-F616C8093151}" srcOrd="0" destOrd="0" presId="urn:microsoft.com/office/officeart/2008/layout/VerticalCurvedList"/>
+    <dgm:cxn modelId="{3FC637D9-3099-4112-83F5-B5F245D18BA8}" srcId="{D29DDFF6-6BFF-4F3B-97FB-031A18D807F2}" destId="{7557B5CD-A45A-4B7A-A911-4DBA263D466E}" srcOrd="3" destOrd="0" parTransId="{304E3DDF-201A-4F99-A716-47C2DB324309}" sibTransId="{09EF13FF-A099-4E36-BF55-B08C23FAB338}"/>
+    <dgm:cxn modelId="{8C399EE3-60DD-4BBE-93AA-9061B7508553}" srcId="{D29DDFF6-6BFF-4F3B-97FB-031A18D807F2}" destId="{0D6D3344-6969-4E4A-9BD6-4D72F65255C9}" srcOrd="4" destOrd="0" parTransId="{A9E002E1-C8C0-44FA-BD14-A97B39DF1E04}" sibTransId="{064AA767-E3A4-473E-9710-8CEC2D109231}"/>
     <dgm:cxn modelId="{A3D90C51-DE5F-4B15-9611-4B84BE57E611}" type="presOf" srcId="{16E1718A-744A-4C85-9110-553C9D344CBD}" destId="{E72A1AB4-5CC1-41F6-BC90-E254B003E12B}" srcOrd="0" destOrd="0" presId="urn:microsoft.com/office/officeart/2008/layout/VerticalCurvedList"/>
     <dgm:cxn modelId="{17B66F51-5EE6-46CC-A710-538838463045}" srcId="{D29DDFF6-6BFF-4F3B-97FB-031A18D807F2}" destId="{474EF926-BC84-4665-BA3E-A7AEBCE4534F}" srcOrd="0" destOrd="0" parTransId="{B6E6848A-1894-4FF2-989D-FEB7915DE88D}" sibTransId="{DF4AA762-2657-4659-9A20-B18288B3EC60}"/>
+    <dgm:cxn modelId="{FB7B355D-2D70-413A-91F1-3EB1F1017C61}" type="presOf" srcId="{D29DDFF6-6BFF-4F3B-97FB-031A18D807F2}" destId="{FC2EFB32-545C-42E6-9B4D-394D6163170F}" srcOrd="0" destOrd="0" presId="urn:microsoft.com/office/officeart/2008/layout/VerticalCurvedList"/>
+    <dgm:cxn modelId="{31FE634D-47D5-4E22-9EF8-6E744FB21A95}" type="presOf" srcId="{474EF926-BC84-4665-BA3E-A7AEBCE4534F}" destId="{8140F5BC-68DF-400F-A176-F616C8093151}" srcOrd="0" destOrd="0" presId="urn:microsoft.com/office/officeart/2008/layout/VerticalCurvedList"/>
+    <dgm:cxn modelId="{72B4EADB-606B-445B-9578-13B768F4312C}" type="presOf" srcId="{0D6D3344-6969-4E4A-9BD6-4D72F65255C9}" destId="{FBE636F6-41A0-4DA0-B810-81152DC828B0}" srcOrd="0" destOrd="0" presId="urn:microsoft.com/office/officeart/2008/layout/VerticalCurvedList"/>
     <dgm:cxn modelId="{E4A7B0D0-0D66-4306-9A48-11ED95E10ADF}" type="presOf" srcId="{7557B5CD-A45A-4B7A-A911-4DBA263D466E}" destId="{619D5A2E-C69E-473C-A3A6-38F4F1A36571}" srcOrd="0" destOrd="0" presId="urn:microsoft.com/office/officeart/2008/layout/VerticalCurvedList"/>
-    <dgm:cxn modelId="{3FC637D9-3099-4112-83F5-B5F245D18BA8}" srcId="{D29DDFF6-6BFF-4F3B-97FB-031A18D807F2}" destId="{7557B5CD-A45A-4B7A-A911-4DBA263D466E}" srcOrd="3" destOrd="0" parTransId="{304E3DDF-201A-4F99-A716-47C2DB324309}" sibTransId="{09EF13FF-A099-4E36-BF55-B08C23FAB338}"/>
-    <dgm:cxn modelId="{72B4EADB-606B-445B-9578-13B768F4312C}" type="presOf" srcId="{0D6D3344-6969-4E4A-9BD6-4D72F65255C9}" destId="{FBE636F6-41A0-4DA0-B810-81152DC828B0}" srcOrd="0" destOrd="0" presId="urn:microsoft.com/office/officeart/2008/layout/VerticalCurvedList"/>
-    <dgm:cxn modelId="{8C399EE3-60DD-4BBE-93AA-9061B7508553}" srcId="{D29DDFF6-6BFF-4F3B-97FB-031A18D807F2}" destId="{0D6D3344-6969-4E4A-9BD6-4D72F65255C9}" srcOrd="4" destOrd="0" parTransId="{A9E002E1-C8C0-44FA-BD14-A97B39DF1E04}" sibTransId="{064AA767-E3A4-473E-9710-8CEC2D109231}"/>
-    <dgm:cxn modelId="{A1B12BED-E291-489F-906B-2F754C8790DB}" srcId="{D29DDFF6-6BFF-4F3B-97FB-031A18D807F2}" destId="{16E1718A-744A-4C85-9110-553C9D344CBD}" srcOrd="1" destOrd="0" parTransId="{4F3A8392-7B3B-4CB8-BF89-90392BA6780D}" sibTransId="{ED773497-637F-4021-B7FC-D0C33D87B378}"/>
     <dgm:cxn modelId="{80038D78-714E-4822-82E7-42EFA5D81A52}" type="presParOf" srcId="{FC2EFB32-545C-42E6-9B4D-394D6163170F}" destId="{266400AB-999E-488C-9733-2599CA5CD9A8}" srcOrd="0" destOrd="0" presId="urn:microsoft.com/office/officeart/2008/layout/VerticalCurvedList"/>
     <dgm:cxn modelId="{43E066C2-8DFA-446C-B4C2-BE0987F7FFC8}" type="presParOf" srcId="{266400AB-999E-488C-9733-2599CA5CD9A8}" destId="{3EF89418-BD60-4E98-BD96-2262FC5C85FF}" srcOrd="0" destOrd="0" presId="urn:microsoft.com/office/officeart/2008/layout/VerticalCurvedList"/>
     <dgm:cxn modelId="{1022710B-17B6-43E4-999A-C8853AD689F4}" type="presParOf" srcId="{3EF89418-BD60-4E98-BD96-2262FC5C85FF}" destId="{CF0A852D-7E95-4F64-9014-DFF348CB77ED}" srcOrd="0" destOrd="0" presId="urn:microsoft.com/office/officeart/2008/layout/VerticalCurvedList"/>
@@ -3013,6 +3065,13 @@
         </dgm:presLayoutVars>
       </dgm:prSet>
       <dgm:spPr/>
+      <dgm:t>
+        <a:bodyPr/>
+        <a:lstStyle/>
+        <a:p>
+          <a:endParaRPr lang="es-ES"/>
+        </a:p>
+      </dgm:t>
     </dgm:pt>
     <dgm:pt modelId="{477B968F-ED23-4FE1-983D-E37B38D4381D}" type="pres">
       <dgm:prSet presAssocID="{E161A3BA-B92C-4D49-B7B1-26F244221AC7}" presName="comp1" presStyleCnt="0"/>
@@ -3021,6 +3080,13 @@
     <dgm:pt modelId="{6698DAAB-CF6A-4902-9FF6-826D17B11C39}" type="pres">
       <dgm:prSet presAssocID="{E161A3BA-B92C-4D49-B7B1-26F244221AC7}" presName="circle1" presStyleLbl="node1" presStyleIdx="0" presStyleCnt="2"/>
       <dgm:spPr/>
+      <dgm:t>
+        <a:bodyPr/>
+        <a:lstStyle/>
+        <a:p>
+          <a:endParaRPr lang="es-ES"/>
+        </a:p>
+      </dgm:t>
     </dgm:pt>
     <dgm:pt modelId="{08D6A8D4-3F43-4C25-8FB9-F9192BDF8A68}" type="pres">
       <dgm:prSet presAssocID="{E161A3BA-B92C-4D49-B7B1-26F244221AC7}" presName="c1text" presStyleLbl="node1" presStyleIdx="0" presStyleCnt="2">
@@ -3029,6 +3095,13 @@
         </dgm:presLayoutVars>
       </dgm:prSet>
       <dgm:spPr/>
+      <dgm:t>
+        <a:bodyPr/>
+        <a:lstStyle/>
+        <a:p>
+          <a:endParaRPr lang="es-ES"/>
+        </a:p>
+      </dgm:t>
     </dgm:pt>
     <dgm:pt modelId="{40548B65-FB2A-4AD5-811C-C166FD08235F}" type="pres">
       <dgm:prSet presAssocID="{E161A3BA-B92C-4D49-B7B1-26F244221AC7}" presName="comp2" presStyleCnt="0"/>
@@ -3037,6 +3110,13 @@
     <dgm:pt modelId="{2D5CAFE2-9B6C-46FA-863F-95C475E14595}" type="pres">
       <dgm:prSet presAssocID="{E161A3BA-B92C-4D49-B7B1-26F244221AC7}" presName="circle2" presStyleLbl="node1" presStyleIdx="1" presStyleCnt="2" custScaleX="86719" custScaleY="84662" custLinFactNeighborX="702" custLinFactNeighborY="7317"/>
       <dgm:spPr/>
+      <dgm:t>
+        <a:bodyPr/>
+        <a:lstStyle/>
+        <a:p>
+          <a:endParaRPr lang="es-ES"/>
+        </a:p>
+      </dgm:t>
     </dgm:pt>
     <dgm:pt modelId="{140CF35C-DB3C-4AFE-B3F9-0312B2436B6C}" type="pres">
       <dgm:prSet presAssocID="{E161A3BA-B92C-4D49-B7B1-26F244221AC7}" presName="c2text" presStyleLbl="node1" presStyleIdx="1" presStyleCnt="2">
@@ -3045,16 +3125,23 @@
         </dgm:presLayoutVars>
       </dgm:prSet>
       <dgm:spPr/>
+      <dgm:t>
+        <a:bodyPr/>
+        <a:lstStyle/>
+        <a:p>
+          <a:endParaRPr lang="es-ES"/>
+        </a:p>
+      </dgm:t>
     </dgm:pt>
   </dgm:ptLst>
   <dgm:cxnLst>
     <dgm:cxn modelId="{41F47C26-6519-4633-A47F-48E4969BCEB6}" type="presOf" srcId="{9CADF758-B7DD-433D-BD45-0D0722CB41E0}" destId="{140CF35C-DB3C-4AFE-B3F9-0312B2436B6C}" srcOrd="1" destOrd="0" presId="urn:microsoft.com/office/officeart/2005/8/layout/venn2"/>
+    <dgm:cxn modelId="{1D796FAD-59F1-422A-8BCB-326E5088018B}" type="presOf" srcId="{9CADF758-B7DD-433D-BD45-0D0722CB41E0}" destId="{2D5CAFE2-9B6C-46FA-863F-95C475E14595}" srcOrd="0" destOrd="0" presId="urn:microsoft.com/office/officeart/2005/8/layout/venn2"/>
+    <dgm:cxn modelId="{3F881661-6AD8-4B3F-9581-5109E59328AE}" type="presOf" srcId="{3BDA3EE9-BF23-4325-B6C1-0DA27FF97C56}" destId="{08D6A8D4-3F43-4C25-8FB9-F9192BDF8A68}" srcOrd="1" destOrd="0" presId="urn:microsoft.com/office/officeart/2005/8/layout/venn2"/>
+    <dgm:cxn modelId="{FB3DFBEE-A527-4281-9A31-AB7871D8C7B5}" srcId="{E161A3BA-B92C-4D49-B7B1-26F244221AC7}" destId="{9CADF758-B7DD-433D-BD45-0D0722CB41E0}" srcOrd="1" destOrd="0" parTransId="{289C0CF0-87C5-40D4-A570-7B87CC886AEB}" sibTransId="{6348AE07-1D97-4223-809E-31629C767324}"/>
+    <dgm:cxn modelId="{D6C466A9-8328-40C3-A409-D2B00539312A}" srcId="{E161A3BA-B92C-4D49-B7B1-26F244221AC7}" destId="{3BDA3EE9-BF23-4325-B6C1-0DA27FF97C56}" srcOrd="0" destOrd="0" parTransId="{4EBE9906-D338-463E-AE32-5ACF331E9F9C}" sibTransId="{1CEC54AA-1684-4E45-8C3B-65A058C79503}"/>
+    <dgm:cxn modelId="{4EB3253F-F9C0-4E9E-97CB-187259B520FC}" type="presOf" srcId="{3BDA3EE9-BF23-4325-B6C1-0DA27FF97C56}" destId="{6698DAAB-CF6A-4902-9FF6-826D17B11C39}" srcOrd="0" destOrd="0" presId="urn:microsoft.com/office/officeart/2005/8/layout/venn2"/>
     <dgm:cxn modelId="{EE5F5632-8428-4B0C-9306-711F9B4862A4}" type="presOf" srcId="{E161A3BA-B92C-4D49-B7B1-26F244221AC7}" destId="{90929A3A-5AD1-478A-A953-67B667ABF761}" srcOrd="0" destOrd="0" presId="urn:microsoft.com/office/officeart/2005/8/layout/venn2"/>
-    <dgm:cxn modelId="{4EB3253F-F9C0-4E9E-97CB-187259B520FC}" type="presOf" srcId="{3BDA3EE9-BF23-4325-B6C1-0DA27FF97C56}" destId="{6698DAAB-CF6A-4902-9FF6-826D17B11C39}" srcOrd="0" destOrd="0" presId="urn:microsoft.com/office/officeart/2005/8/layout/venn2"/>
-    <dgm:cxn modelId="{3F881661-6AD8-4B3F-9581-5109E59328AE}" type="presOf" srcId="{3BDA3EE9-BF23-4325-B6C1-0DA27FF97C56}" destId="{08D6A8D4-3F43-4C25-8FB9-F9192BDF8A68}" srcOrd="1" destOrd="0" presId="urn:microsoft.com/office/officeart/2005/8/layout/venn2"/>
-    <dgm:cxn modelId="{D6C466A9-8328-40C3-A409-D2B00539312A}" srcId="{E161A3BA-B92C-4D49-B7B1-26F244221AC7}" destId="{3BDA3EE9-BF23-4325-B6C1-0DA27FF97C56}" srcOrd="0" destOrd="0" parTransId="{4EBE9906-D338-463E-AE32-5ACF331E9F9C}" sibTransId="{1CEC54AA-1684-4E45-8C3B-65A058C79503}"/>
-    <dgm:cxn modelId="{1D796FAD-59F1-422A-8BCB-326E5088018B}" type="presOf" srcId="{9CADF758-B7DD-433D-BD45-0D0722CB41E0}" destId="{2D5CAFE2-9B6C-46FA-863F-95C475E14595}" srcOrd="0" destOrd="0" presId="urn:microsoft.com/office/officeart/2005/8/layout/venn2"/>
-    <dgm:cxn modelId="{FB3DFBEE-A527-4281-9A31-AB7871D8C7B5}" srcId="{E161A3BA-B92C-4D49-B7B1-26F244221AC7}" destId="{9CADF758-B7DD-433D-BD45-0D0722CB41E0}" srcOrd="1" destOrd="0" parTransId="{289C0CF0-87C5-40D4-A570-7B87CC886AEB}" sibTransId="{6348AE07-1D97-4223-809E-31629C767324}"/>
     <dgm:cxn modelId="{12E4E00C-1D7F-4B4E-ACFE-0C59B03EB36A}" type="presParOf" srcId="{90929A3A-5AD1-478A-A953-67B667ABF761}" destId="{477B968F-ED23-4FE1-983D-E37B38D4381D}" srcOrd="0" destOrd="0" presId="urn:microsoft.com/office/officeart/2005/8/layout/venn2"/>
     <dgm:cxn modelId="{30BD2F6D-0265-4092-BEF5-062B29BCCB7E}" type="presParOf" srcId="{477B968F-ED23-4FE1-983D-E37B38D4381D}" destId="{6698DAAB-CF6A-4902-9FF6-826D17B11C39}" srcOrd="0" destOrd="0" presId="urn:microsoft.com/office/officeart/2005/8/layout/venn2"/>
     <dgm:cxn modelId="{9CD5C0F0-4590-48DF-BCC1-9A060DEAB185}" type="presParOf" srcId="{477B968F-ED23-4FE1-983D-E37B38D4381D}" destId="{08D6A8D4-3F43-4C25-8FB9-F9192BDF8A68}" srcOrd="1" destOrd="0" presId="urn:microsoft.com/office/officeart/2005/8/layout/venn2"/>
@@ -3240,6 +3327,13 @@
         </dgm:presLayoutVars>
       </dgm:prSet>
       <dgm:spPr/>
+      <dgm:t>
+        <a:bodyPr/>
+        <a:lstStyle/>
+        <a:p>
+          <a:endParaRPr lang="es-ES"/>
+        </a:p>
+      </dgm:t>
     </dgm:pt>
     <dgm:pt modelId="{26071CA3-4CC1-48FC-92F1-395D8F27F95D}" type="pres">
       <dgm:prSet presAssocID="{9A6185C8-692E-4711-A23A-B06C4F5F76D9}" presName="children" presStyleCnt="0"/>
@@ -3261,6 +3355,13 @@
         </dgm:presLayoutVars>
       </dgm:prSet>
       <dgm:spPr/>
+      <dgm:t>
+        <a:bodyPr/>
+        <a:lstStyle/>
+        <a:p>
+          <a:endParaRPr lang="es-ES"/>
+        </a:p>
+      </dgm:t>
     </dgm:pt>
     <dgm:pt modelId="{6C391D00-9B94-4E9D-8D99-DA53F95F89C3}" type="pres">
       <dgm:prSet presAssocID="{9A6185C8-692E-4711-A23A-B06C4F5F76D9}" presName="quadrant2" presStyleLbl="node1" presStyleIdx="1" presStyleCnt="4">
@@ -3270,6 +3371,13 @@
         </dgm:presLayoutVars>
       </dgm:prSet>
       <dgm:spPr/>
+      <dgm:t>
+        <a:bodyPr/>
+        <a:lstStyle/>
+        <a:p>
+          <a:endParaRPr lang="es-ES"/>
+        </a:p>
+      </dgm:t>
     </dgm:pt>
     <dgm:pt modelId="{C6ED8E6C-BB74-4F80-A633-83FEC51FA54B}" type="pres">
       <dgm:prSet presAssocID="{9A6185C8-692E-4711-A23A-B06C4F5F76D9}" presName="quadrant3" presStyleLbl="node1" presStyleIdx="2" presStyleCnt="4">
@@ -3279,6 +3387,13 @@
         </dgm:presLayoutVars>
       </dgm:prSet>
       <dgm:spPr/>
+      <dgm:t>
+        <a:bodyPr/>
+        <a:lstStyle/>
+        <a:p>
+          <a:endParaRPr lang="es-ES"/>
+        </a:p>
+      </dgm:t>
     </dgm:pt>
     <dgm:pt modelId="{3F271227-D08B-41D6-8877-C5CB0B95F09C}" type="pres">
       <dgm:prSet presAssocID="{9A6185C8-692E-4711-A23A-B06C4F5F76D9}" presName="quadrant4" presStyleLbl="node1" presStyleIdx="3" presStyleCnt="4">
@@ -3288,6 +3403,13 @@
         </dgm:presLayoutVars>
       </dgm:prSet>
       <dgm:spPr/>
+      <dgm:t>
+        <a:bodyPr/>
+        <a:lstStyle/>
+        <a:p>
+          <a:endParaRPr lang="es-ES"/>
+        </a:p>
+      </dgm:t>
     </dgm:pt>
     <dgm:pt modelId="{30E935CD-9031-490A-AB1A-20E9BE34D334}" type="pres">
       <dgm:prSet presAssocID="{9A6185C8-692E-4711-A23A-B06C4F5F76D9}" presName="quadrantPlaceholder" presStyleCnt="0"/>
@@ -3303,15 +3425,15 @@
     </dgm:pt>
   </dgm:ptLst>
   <dgm:cxnLst>
-    <dgm:cxn modelId="{9ECA6D0C-A32B-47D8-8E4B-E39B1E264124}" type="presOf" srcId="{AA5F531C-51A7-4118-8C6E-850E4E8ECA87}" destId="{6C391D00-9B94-4E9D-8D99-DA53F95F89C3}" srcOrd="0" destOrd="0" presId="urn:microsoft.com/office/officeart/2005/8/layout/cycle4"/>
-    <dgm:cxn modelId="{E6EBFC25-80FA-42BA-BFBE-C11892AE63D8}" srcId="{9A6185C8-692E-4711-A23A-B06C4F5F76D9}" destId="{36A81CF2-35F6-4B8A-9D8B-68E055F8C462}" srcOrd="2" destOrd="0" parTransId="{13FD6E82-F2F2-494F-975A-E3C18FEF1C67}" sibTransId="{DF08B136-7C93-42C6-9014-40C9B6902946}"/>
+    <dgm:cxn modelId="{D736C7B6-DA90-450E-A595-C2D5910E8B0D}" type="presOf" srcId="{9A6185C8-692E-4711-A23A-B06C4F5F76D9}" destId="{E2AB5052-2092-4117-8AF3-672EFD4F2909}" srcOrd="0" destOrd="0" presId="urn:microsoft.com/office/officeart/2005/8/layout/cycle4"/>
+    <dgm:cxn modelId="{B851CF8F-C3EE-4828-93FA-C359082CA04A}" type="presOf" srcId="{C1A4ACB8-DD4A-4D8E-952C-A9720FF7B514}" destId="{3F271227-D08B-41D6-8877-C5CB0B95F09C}" srcOrd="0" destOrd="0" presId="urn:microsoft.com/office/officeart/2005/8/layout/cycle4"/>
     <dgm:cxn modelId="{AC39BC41-3623-4B17-9648-289C4E50E87C}" type="presOf" srcId="{04F31ABC-B013-4122-BCC4-52EFB5B59BAE}" destId="{E39B4477-4D4D-417E-8817-C0705C0264C5}" srcOrd="0" destOrd="0" presId="urn:microsoft.com/office/officeart/2005/8/layout/cycle4"/>
     <dgm:cxn modelId="{EB3E3B7B-831A-402A-A62B-2279A5482D36}" type="presOf" srcId="{36A81CF2-35F6-4B8A-9D8B-68E055F8C462}" destId="{C6ED8E6C-BB74-4F80-A633-83FEC51FA54B}" srcOrd="0" destOrd="0" presId="urn:microsoft.com/office/officeart/2005/8/layout/cycle4"/>
+    <dgm:cxn modelId="{E6EBFC25-80FA-42BA-BFBE-C11892AE63D8}" srcId="{9A6185C8-692E-4711-A23A-B06C4F5F76D9}" destId="{36A81CF2-35F6-4B8A-9D8B-68E055F8C462}" srcOrd="2" destOrd="0" parTransId="{13FD6E82-F2F2-494F-975A-E3C18FEF1C67}" sibTransId="{DF08B136-7C93-42C6-9014-40C9B6902946}"/>
+    <dgm:cxn modelId="{9F6BCBBB-8BAB-4FA3-B96F-B2EB21504608}" srcId="{9A6185C8-692E-4711-A23A-B06C4F5F76D9}" destId="{AA5F531C-51A7-4118-8C6E-850E4E8ECA87}" srcOrd="1" destOrd="0" parTransId="{5D9C9847-35D6-4EC7-B084-A5635C11EB96}" sibTransId="{CF7253A8-4571-477E-892B-7433760F271B}"/>
     <dgm:cxn modelId="{8785BB7B-5FCC-4D06-94E9-7A846D0248C6}" srcId="{9A6185C8-692E-4711-A23A-B06C4F5F76D9}" destId="{04F31ABC-B013-4122-BCC4-52EFB5B59BAE}" srcOrd="0" destOrd="0" parTransId="{6C781A2A-EE34-4E6D-91C1-FA01329B498B}" sibTransId="{6950933B-D177-4766-8F61-F23E67C1973E}"/>
-    <dgm:cxn modelId="{B851CF8F-C3EE-4828-93FA-C359082CA04A}" type="presOf" srcId="{C1A4ACB8-DD4A-4D8E-952C-A9720FF7B514}" destId="{3F271227-D08B-41D6-8877-C5CB0B95F09C}" srcOrd="0" destOrd="0" presId="urn:microsoft.com/office/officeart/2005/8/layout/cycle4"/>
+    <dgm:cxn modelId="{9ECA6D0C-A32B-47D8-8E4B-E39B1E264124}" type="presOf" srcId="{AA5F531C-51A7-4118-8C6E-850E4E8ECA87}" destId="{6C391D00-9B94-4E9D-8D99-DA53F95F89C3}" srcOrd="0" destOrd="0" presId="urn:microsoft.com/office/officeart/2005/8/layout/cycle4"/>
     <dgm:cxn modelId="{2AFE6DAE-3E52-4031-9524-6D9805A4DD18}" srcId="{9A6185C8-692E-4711-A23A-B06C4F5F76D9}" destId="{C1A4ACB8-DD4A-4D8E-952C-A9720FF7B514}" srcOrd="3" destOrd="0" parTransId="{282B47C7-C901-44C4-881B-199E43A2074A}" sibTransId="{1D46FCCC-E0BA-4F8B-95E3-5F5292B27537}"/>
-    <dgm:cxn modelId="{D736C7B6-DA90-450E-A595-C2D5910E8B0D}" type="presOf" srcId="{9A6185C8-692E-4711-A23A-B06C4F5F76D9}" destId="{E2AB5052-2092-4117-8AF3-672EFD4F2909}" srcOrd="0" destOrd="0" presId="urn:microsoft.com/office/officeart/2005/8/layout/cycle4"/>
-    <dgm:cxn modelId="{9F6BCBBB-8BAB-4FA3-B96F-B2EB21504608}" srcId="{9A6185C8-692E-4711-A23A-B06C4F5F76D9}" destId="{AA5F531C-51A7-4118-8C6E-850E4E8ECA87}" srcOrd="1" destOrd="0" parTransId="{5D9C9847-35D6-4EC7-B084-A5635C11EB96}" sibTransId="{CF7253A8-4571-477E-892B-7433760F271B}"/>
     <dgm:cxn modelId="{E56D790C-0456-491D-9F2A-A07456CBDAA9}" type="presParOf" srcId="{E2AB5052-2092-4117-8AF3-672EFD4F2909}" destId="{26071CA3-4CC1-48FC-92F1-395D8F27F95D}" srcOrd="0" destOrd="0" presId="urn:microsoft.com/office/officeart/2005/8/layout/cycle4"/>
     <dgm:cxn modelId="{4394A069-EC1A-4BC0-80A2-43D93B2B7FC8}" type="presParOf" srcId="{26071CA3-4CC1-48FC-92F1-395D8F27F95D}" destId="{0D01D00A-1EA0-4DBF-96AA-1638A8392E25}" srcOrd="0" destOrd="0" presId="urn:microsoft.com/office/officeart/2005/8/layout/cycle4"/>
     <dgm:cxn modelId="{1B551068-8251-4A0C-9581-1DCC1F30C0C9}" type="presParOf" srcId="{E2AB5052-2092-4117-8AF3-672EFD4F2909}" destId="{23904F7F-10E9-4154-A5ED-773F73BDE48D}" srcOrd="1" destOrd="0" presId="urn:microsoft.com/office/officeart/2005/8/layout/cycle4"/>
@@ -3440,7 +3562,7 @@
         </a:bodyPr>
         <a:lstStyle/>
         <a:p>
-          <a:pPr marL="0" lvl="0" indent="0" algn="l" defTabSz="1689100">
+          <a:pPr lvl="0" algn="l" defTabSz="1689100">
             <a:lnSpc>
               <a:spcPct val="90000"/>
             </a:lnSpc>
@@ -3450,7 +3572,6 @@
             <a:spcAft>
               <a:spcPct val="35000"/>
             </a:spcAft>
-            <a:buNone/>
           </a:pPr>
           <a:r>
             <a:rPr lang="es-ES" sz="3800" kern="1200" dirty="0"/>
@@ -3569,7 +3690,7 @@
         </a:bodyPr>
         <a:lstStyle/>
         <a:p>
-          <a:pPr marL="0" lvl="0" indent="0" algn="l" defTabSz="1689100">
+          <a:pPr lvl="0" algn="l" defTabSz="1689100">
             <a:lnSpc>
               <a:spcPct val="90000"/>
             </a:lnSpc>
@@ -3579,7 +3700,6 @@
             <a:spcAft>
               <a:spcPct val="35000"/>
             </a:spcAft>
-            <a:buNone/>
           </a:pPr>
           <a:r>
             <a:rPr lang="es-ES" sz="3800" kern="1200" dirty="0" err="1"/>
@@ -3694,7 +3814,7 @@
         </a:bodyPr>
         <a:lstStyle/>
         <a:p>
-          <a:pPr marL="0" lvl="0" indent="0" algn="l" defTabSz="1689100">
+          <a:pPr lvl="0" algn="l" defTabSz="1689100">
             <a:lnSpc>
               <a:spcPct val="90000"/>
             </a:lnSpc>
@@ -3704,7 +3824,6 @@
             <a:spcAft>
               <a:spcPct val="35000"/>
             </a:spcAft>
-            <a:buNone/>
           </a:pPr>
           <a:r>
             <a:rPr lang="es-ES" sz="3800" kern="1200" dirty="0" err="1"/>
@@ -3819,7 +3938,7 @@
         </a:bodyPr>
         <a:lstStyle/>
         <a:p>
-          <a:pPr marL="0" lvl="0" indent="0" algn="l" defTabSz="1689100">
+          <a:pPr lvl="0" algn="l" defTabSz="1689100">
             <a:lnSpc>
               <a:spcPct val="90000"/>
             </a:lnSpc>
@@ -3829,7 +3948,6 @@
             <a:spcAft>
               <a:spcPct val="35000"/>
             </a:spcAft>
-            <a:buNone/>
           </a:pPr>
           <a:r>
             <a:rPr lang="es-ES" sz="3800" kern="1200" dirty="0" err="1"/>
@@ -3944,7 +4062,7 @@
         </a:bodyPr>
         <a:lstStyle/>
         <a:p>
-          <a:pPr marL="0" lvl="0" indent="0" algn="l" defTabSz="1689100">
+          <a:pPr lvl="0" algn="l" defTabSz="1689100">
             <a:lnSpc>
               <a:spcPct val="90000"/>
             </a:lnSpc>
@@ -3954,7 +4072,6 @@
             <a:spcAft>
               <a:spcPct val="35000"/>
             </a:spcAft>
-            <a:buNone/>
           </a:pPr>
           <a:r>
             <a:rPr lang="es-ES" sz="3800" kern="1200" dirty="0" err="1"/>
@@ -4081,7 +4198,7 @@
         </a:bodyPr>
         <a:lstStyle/>
         <a:p>
-          <a:pPr marL="0" lvl="0" indent="0" algn="ctr" defTabSz="1466850">
+          <a:pPr lvl="0" algn="ctr" defTabSz="1466850">
             <a:lnSpc>
               <a:spcPct val="90000"/>
             </a:lnSpc>
@@ -4091,7 +4208,6 @@
             <a:spcAft>
               <a:spcPct val="35000"/>
             </a:spcAft>
-            <a:buNone/>
           </a:pPr>
           <a:r>
             <a:rPr lang="es-ES" sz="3300" kern="1200" dirty="0"/>
@@ -4158,7 +4274,7 @@
         </a:bodyPr>
         <a:lstStyle/>
         <a:p>
-          <a:pPr marL="0" lvl="0" indent="0" algn="ctr" defTabSz="1466850">
+          <a:pPr lvl="0" algn="ctr" defTabSz="1466850">
             <a:lnSpc>
               <a:spcPct val="90000"/>
             </a:lnSpc>
@@ -4168,7 +4284,6 @@
             <a:spcAft>
               <a:spcPct val="35000"/>
             </a:spcAft>
-            <a:buNone/>
           </a:pPr>
           <a:r>
             <a:rPr lang="es-ES" sz="3300" kern="1200" dirty="0"/>
@@ -4257,7 +4372,7 @@
         </a:bodyPr>
         <a:lstStyle/>
         <a:p>
-          <a:pPr marL="0" lvl="0" indent="0" algn="ctr" defTabSz="711200">
+          <a:pPr lvl="0" algn="ctr" defTabSz="711200">
             <a:lnSpc>
               <a:spcPct val="90000"/>
             </a:lnSpc>
@@ -4267,7 +4382,6 @@
             <a:spcAft>
               <a:spcPct val="35000"/>
             </a:spcAft>
-            <a:buNone/>
           </a:pPr>
           <a:r>
             <a:rPr lang="es-ES" sz="1600" kern="1200" dirty="0"/>
@@ -4344,7 +4458,7 @@
         </a:bodyPr>
         <a:lstStyle/>
         <a:p>
-          <a:pPr marL="0" lvl="0" indent="0" algn="ctr" defTabSz="711200">
+          <a:pPr lvl="0" algn="ctr" defTabSz="711200">
             <a:lnSpc>
               <a:spcPct val="90000"/>
             </a:lnSpc>
@@ -4354,7 +4468,6 @@
             <a:spcAft>
               <a:spcPct val="35000"/>
             </a:spcAft>
-            <a:buNone/>
           </a:pPr>
           <a:r>
             <a:rPr lang="es-ES" sz="1600" kern="1200" dirty="0"/>
@@ -4431,7 +4544,7 @@
         </a:bodyPr>
         <a:lstStyle/>
         <a:p>
-          <a:pPr marL="0" lvl="0" indent="0" algn="ctr" defTabSz="711200">
+          <a:pPr lvl="0" algn="ctr" defTabSz="711200">
             <a:lnSpc>
               <a:spcPct val="90000"/>
             </a:lnSpc>
@@ -4441,7 +4554,6 @@
             <a:spcAft>
               <a:spcPct val="35000"/>
             </a:spcAft>
-            <a:buNone/>
           </a:pPr>
           <a:r>
             <a:rPr lang="es-ES" sz="1600" kern="1200" dirty="0"/>
@@ -4518,7 +4630,7 @@
         </a:bodyPr>
         <a:lstStyle/>
         <a:p>
-          <a:pPr marL="0" lvl="0" indent="0" algn="ctr" defTabSz="711200">
+          <a:pPr lvl="0" algn="ctr" defTabSz="711200">
             <a:lnSpc>
               <a:spcPct val="90000"/>
             </a:lnSpc>
@@ -4528,7 +4640,6 @@
             <a:spcAft>
               <a:spcPct val="35000"/>
             </a:spcAft>
-            <a:buNone/>
           </a:pPr>
           <a:r>
             <a:rPr lang="es-ES" sz="1600" kern="1200" dirty="0"/>
@@ -10806,7 +10917,7 @@
           <a:p>
             <a:fld id="{0AB2274C-2550-4869-8C3D-37ED1CBAFBB6}" type="datetimeFigureOut">
               <a:rPr lang="es-AR" smtClean="0"/>
-              <a:t>21/11/2019</a:t>
+              <a:t>22/11/2019</a:t>
             </a:fld>
             <a:endParaRPr lang="es-AR"/>
           </a:p>
@@ -10983,7 +11094,7 @@
           <a:p>
             <a:fld id="{EC9E38B6-A06B-430F-AA22-E468B22E02F6}" type="datetimeFigureOut">
               <a:rPr lang="es-AR" smtClean="0"/>
-              <a:t>21/11/2019</a:t>
+              <a:t>22/11/2019</a:t>
             </a:fld>
             <a:endParaRPr lang="es-AR"/>
           </a:p>
@@ -12058,7 +12169,7 @@
             <a:fld id="{B61BEF0D-F0BB-DE4B-95CE-6DB70DBA9567}" type="datetimeFigureOut">
               <a:rPr lang="en-US" dirty="0"/>
               <a:pPr/>
-              <a:t>11/21/2019</a:t>
+              <a:t>11/22/2019</a:t>
             </a:fld>
             <a:endParaRPr lang="en-US" dirty="0"/>
           </a:p>
@@ -12306,7 +12417,7 @@
             <a:fld id="{B61BEF0D-F0BB-DE4B-95CE-6DB70DBA9567}" type="datetimeFigureOut">
               <a:rPr lang="en-US" dirty="0"/>
               <a:pPr/>
-              <a:t>11/21/2019</a:t>
+              <a:t>11/22/2019</a:t>
             </a:fld>
             <a:endParaRPr lang="en-US" dirty="0"/>
           </a:p>
@@ -12617,7 +12728,7 @@
             <a:fld id="{B61BEF0D-F0BB-DE4B-95CE-6DB70DBA9567}" type="datetimeFigureOut">
               <a:rPr lang="en-US" dirty="0"/>
               <a:pPr/>
-              <a:t>11/21/2019</a:t>
+              <a:t>11/22/2019</a:t>
             </a:fld>
             <a:endParaRPr lang="en-US" dirty="0"/>
           </a:p>
@@ -12955,7 +13066,7 @@
             <a:fld id="{B61BEF0D-F0BB-DE4B-95CE-6DB70DBA9567}" type="datetimeFigureOut">
               <a:rPr lang="en-US" dirty="0"/>
               <a:pPr/>
-              <a:t>11/21/2019</a:t>
+              <a:t>11/22/2019</a:t>
             </a:fld>
             <a:endParaRPr lang="en-US" dirty="0"/>
           </a:p>
@@ -13266,7 +13377,7 @@
             <a:fld id="{B61BEF0D-F0BB-DE4B-95CE-6DB70DBA9567}" type="datetimeFigureOut">
               <a:rPr lang="en-US" dirty="0"/>
               <a:pPr/>
-              <a:t>11/21/2019</a:t>
+              <a:t>11/22/2019</a:t>
             </a:fld>
             <a:endParaRPr lang="en-US" dirty="0"/>
           </a:p>
@@ -13656,7 +13767,7 @@
             <a:fld id="{B61BEF0D-F0BB-DE4B-95CE-6DB70DBA9567}" type="datetimeFigureOut">
               <a:rPr lang="en-US" dirty="0"/>
               <a:pPr/>
-              <a:t>11/21/2019</a:t>
+              <a:t>11/22/2019</a:t>
             </a:fld>
             <a:endParaRPr lang="en-US" dirty="0"/>
           </a:p>
@@ -13822,7 +13933,7 @@
           <a:p>
             <a:fld id="{55C6B4A9-1611-4792-9094-5F34BCA07E0B}" type="datetimeFigureOut">
               <a:rPr lang="en-US" dirty="0"/>
-              <a:t>11/21/2019</a:t>
+              <a:t>11/22/2019</a:t>
             </a:fld>
             <a:endParaRPr lang="en-US" dirty="0"/>
           </a:p>
@@ -13998,7 +14109,7 @@
             <a:fld id="{B61BEF0D-F0BB-DE4B-95CE-6DB70DBA9567}" type="datetimeFigureOut">
               <a:rPr lang="en-US" dirty="0"/>
               <a:pPr/>
-              <a:t>11/21/2019</a:t>
+              <a:t>11/22/2019</a:t>
             </a:fld>
             <a:endParaRPr lang="en-US" dirty="0"/>
           </a:p>
@@ -14171,7 +14282,7 @@
             <a:fld id="{B61BEF0D-F0BB-DE4B-95CE-6DB70DBA9567}" type="datetimeFigureOut">
               <a:rPr lang="en-US" dirty="0"/>
               <a:pPr/>
-              <a:t>11/21/2019</a:t>
+              <a:t>11/22/2019</a:t>
             </a:fld>
             <a:endParaRPr lang="en-US" dirty="0"/>
           </a:p>
@@ -14415,7 +14526,7 @@
             <a:fld id="{B61BEF0D-F0BB-DE4B-95CE-6DB70DBA9567}" type="datetimeFigureOut">
               <a:rPr lang="en-US" dirty="0"/>
               <a:pPr/>
-              <a:t>11/21/2019</a:t>
+              <a:t>11/22/2019</a:t>
             </a:fld>
             <a:endParaRPr lang="en-US" dirty="0"/>
           </a:p>
@@ -14643,7 +14754,7 @@
           <a:p>
             <a:fld id="{EB712588-04B1-427B-82EE-E8DB90309F08}" type="datetimeFigureOut">
               <a:rPr lang="en-US" dirty="0"/>
-              <a:t>11/21/2019</a:t>
+              <a:t>11/22/2019</a:t>
             </a:fld>
             <a:endParaRPr lang="en-US" dirty="0"/>
           </a:p>
@@ -15013,7 +15124,7 @@
             <a:fld id="{B61BEF0D-F0BB-DE4B-95CE-6DB70DBA9567}" type="datetimeFigureOut">
               <a:rPr lang="en-US" dirty="0"/>
               <a:pPr/>
-              <a:t>11/21/2019</a:t>
+              <a:t>11/22/2019</a:t>
             </a:fld>
             <a:endParaRPr lang="en-US" dirty="0"/>
           </a:p>
@@ -15133,7 +15244,7 @@
             <a:fld id="{B61BEF0D-F0BB-DE4B-95CE-6DB70DBA9567}" type="datetimeFigureOut">
               <a:rPr lang="en-US" dirty="0"/>
               <a:pPr/>
-              <a:t>11/21/2019</a:t>
+              <a:t>11/22/2019</a:t>
             </a:fld>
             <a:endParaRPr lang="en-US" dirty="0"/>
           </a:p>
@@ -15225,7 +15336,7 @@
             <a:fld id="{B61BEF0D-F0BB-DE4B-95CE-6DB70DBA9567}" type="datetimeFigureOut">
               <a:rPr lang="en-US" dirty="0"/>
               <a:pPr/>
-              <a:t>11/21/2019</a:t>
+              <a:t>11/22/2019</a:t>
             </a:fld>
             <a:endParaRPr lang="en-US" dirty="0"/>
           </a:p>
@@ -15476,7 +15587,7 @@
           <a:p>
             <a:fld id="{42A54C80-263E-416B-A8E0-580EDEADCBDC}" type="datetimeFigureOut">
               <a:rPr lang="en-US" dirty="0"/>
-              <a:t>11/21/2019</a:t>
+              <a:t>11/22/2019</a:t>
             </a:fld>
             <a:endParaRPr lang="en-US" dirty="0"/>
           </a:p>
@@ -15735,7 +15846,7 @@
             <a:fld id="{B61BEF0D-F0BB-DE4B-95CE-6DB70DBA9567}" type="datetimeFigureOut">
               <a:rPr lang="en-US" dirty="0"/>
               <a:pPr/>
-              <a:t>11/21/2019</a:t>
+              <a:t>11/22/2019</a:t>
             </a:fld>
             <a:endParaRPr lang="en-US" dirty="0"/>
           </a:p>
@@ -16475,7 +16586,7 @@
             <a:fld id="{B61BEF0D-F0BB-DE4B-95CE-6DB70DBA9567}" type="datetimeFigureOut">
               <a:rPr lang="en-US" dirty="0"/>
               <a:pPr/>
-              <a:t>11/21/2019</a:t>
+              <a:t>11/22/2019</a:t>
             </a:fld>
             <a:endParaRPr lang="en-US" dirty="0"/>
           </a:p>
@@ -17047,11 +17158,11 @@
   <p:clrMapOvr>
     <a:masterClrMapping/>
   </p:clrMapOvr>
-  <mc:AlternateContent xmlns:mc="http://schemas.openxmlformats.org/markup-compatibility/2006">
-    <mc:Choice xmlns:p14="http://schemas.microsoft.com/office/powerpoint/2010/main" Requires="p14">
+  <mc:AlternateContent xmlns:mc="http://schemas.openxmlformats.org/markup-compatibility/2006" xmlns:p14="http://schemas.microsoft.com/office/powerpoint/2010/main">
+    <mc:Choice Requires="p14">
       <p:transition spd="slow" p14:dur="2000" advTm="1249"/>
     </mc:Choice>
-    <mc:Fallback>
+    <mc:Fallback xmlns="">
       <p:transition spd="slow" advTm="1249"/>
     </mc:Fallback>
   </mc:AlternateContent>
@@ -21820,8 +21931,8 @@
         </p:nvSpPr>
         <p:spPr>
           <a:xfrm>
-            <a:off x="864130" y="0"/>
-            <a:ext cx="7766936" cy="1107611"/>
+            <a:off x="864129" y="0"/>
+            <a:ext cx="8479895" cy="1107611"/>
           </a:xfrm>
         </p:spPr>
         <p:txBody>
@@ -21831,8 +21942,13 @@
             <a:pPr algn="l"/>
             <a:r>
               <a:rPr lang="es-AR" dirty="0"/>
-              <a:t>Análisis FODA</a:t>
+              <a:t>Análisis </a:t>
             </a:r>
+            <a:r>
+              <a:rPr lang="es-AR" dirty="0" smtClean="0"/>
+              <a:t>FODA del Proyecto</a:t>
+            </a:r>
+            <a:endParaRPr lang="es-AR" dirty="0"/>
           </a:p>
         </p:txBody>
       </p:sp>
@@ -22191,8 +22307,197 @@
           <a:p>
             <a:pPr lvl="0" algn="l"/>
             <a:r>
-              <a:rPr lang="es-ES" dirty="0"/>
+              <a:rPr lang="es-ES" dirty="0" smtClean="0"/>
               <a:t>Fortalezas:</a:t>
+            </a:r>
+            <a:endParaRPr lang="es-ES" dirty="0"/>
+          </a:p>
+        </p:txBody>
+      </p:sp>
+      <p:sp>
+        <p:nvSpPr>
+          <p:cNvPr id="4" name="CuadroTexto 3"/>
+          <p:cNvSpPr txBox="1"/>
+          <p:nvPr/>
+        </p:nvSpPr>
+        <p:spPr>
+          <a:xfrm>
+            <a:off x="1007005" y="1300163"/>
+            <a:ext cx="8551333" cy="4154984"/>
+          </a:xfrm>
+          <a:prstGeom prst="rect">
+            <a:avLst/>
+          </a:prstGeom>
+          <a:noFill/>
+        </p:spPr>
+        <p:txBody>
+          <a:bodyPr wrap="square" rtlCol="0">
+            <a:spAutoFit/>
+          </a:bodyPr>
+          <a:lstStyle/>
+          <a:p>
+            <a:pPr marL="285750" indent="-285750">
+              <a:buFontTx/>
+              <a:buChar char="-"/>
+            </a:pPr>
+            <a:endParaRPr lang="es-AR" sz="2400" dirty="0" smtClean="0">
+              <a:solidFill>
+                <a:schemeClr val="tx1">
+                  <a:lumMod val="50000"/>
+                  <a:lumOff val="50000"/>
+                </a:schemeClr>
+              </a:solidFill>
+            </a:endParaRPr>
+          </a:p>
+          <a:p>
+            <a:pPr marL="285750" indent="-285750">
+              <a:buFontTx/>
+              <a:buChar char="-"/>
+            </a:pPr>
+            <a:r>
+              <a:rPr lang="es-AR" sz="2400" dirty="0" smtClean="0">
+                <a:solidFill>
+                  <a:schemeClr val="tx1">
+                    <a:lumMod val="50000"/>
+                    <a:lumOff val="50000"/>
+                  </a:schemeClr>
+                </a:solidFill>
+              </a:rPr>
+              <a:t>Utilización </a:t>
+            </a:r>
+            <a:r>
+              <a:rPr lang="es-AR" sz="2400" dirty="0">
+                <a:solidFill>
+                  <a:schemeClr val="tx1">
+                    <a:lumMod val="50000"/>
+                    <a:lumOff val="50000"/>
+                  </a:schemeClr>
+                </a:solidFill>
+              </a:rPr>
+              <a:t>de las tecnologías más eficientes y usadas en la actualidad.</a:t>
+            </a:r>
+          </a:p>
+          <a:p>
+            <a:pPr marL="285750" indent="-285750">
+              <a:buFontTx/>
+              <a:buChar char="-"/>
+            </a:pPr>
+            <a:r>
+              <a:rPr lang="es-AR" sz="2400" dirty="0">
+                <a:solidFill>
+                  <a:schemeClr val="tx1">
+                    <a:lumMod val="50000"/>
+                    <a:lumOff val="50000"/>
+                  </a:schemeClr>
+                </a:solidFill>
+              </a:rPr>
+              <a:t>Pleno entendimiento de las necesidades del cliente por ser estudiantes del Centro de Formación.</a:t>
+            </a:r>
+          </a:p>
+          <a:p>
+            <a:pPr marL="285750" indent="-285750">
+              <a:buFontTx/>
+              <a:buChar char="-"/>
+            </a:pPr>
+            <a:r>
+              <a:rPr lang="es-AR" sz="2400" dirty="0" smtClean="0">
+                <a:solidFill>
+                  <a:schemeClr val="tx1">
+                    <a:lumMod val="50000"/>
+                    <a:lumOff val="50000"/>
+                  </a:schemeClr>
+                </a:solidFill>
+              </a:rPr>
+              <a:t>La </a:t>
+            </a:r>
+            <a:r>
+              <a:rPr lang="es-AR" sz="2400" dirty="0">
+                <a:solidFill>
+                  <a:schemeClr val="tx1">
+                    <a:lumMod val="50000"/>
+                    <a:lumOff val="50000"/>
+                  </a:schemeClr>
+                </a:solidFill>
+              </a:rPr>
+              <a:t>experiencia de usuario es muy intuitiva, lo cual lo convierte en un sistema fácil de aprender y rápido de implementar.</a:t>
+            </a:r>
+          </a:p>
+          <a:p>
+            <a:pPr marL="285750" indent="-285750">
+              <a:buFontTx/>
+              <a:buChar char="-"/>
+            </a:pPr>
+            <a:r>
+              <a:rPr lang="es-AR" sz="2400" dirty="0" smtClean="0">
+                <a:solidFill>
+                  <a:schemeClr val="tx1">
+                    <a:lumMod val="50000"/>
+                    <a:lumOff val="50000"/>
+                  </a:schemeClr>
+                </a:solidFill>
+              </a:rPr>
+              <a:t>Al </a:t>
+            </a:r>
+            <a:r>
+              <a:rPr lang="es-AR" sz="2400" dirty="0">
+                <a:solidFill>
+                  <a:schemeClr val="tx1">
+                    <a:lumMod val="50000"/>
+                    <a:lumOff val="50000"/>
+                  </a:schemeClr>
+                </a:solidFill>
+              </a:rPr>
+              <a:t>pertenecer al CFP, contamos con la posibilidad de dar respuestas inmediatas </a:t>
+            </a:r>
+            <a:r>
+              <a:rPr lang="es-AR" sz="2400" dirty="0" smtClean="0">
+                <a:solidFill>
+                  <a:schemeClr val="tx1">
+                    <a:lumMod val="50000"/>
+                    <a:lumOff val="50000"/>
+                  </a:schemeClr>
+                </a:solidFill>
+              </a:rPr>
+              <a:t>al usuario ante </a:t>
+            </a:r>
+            <a:r>
+              <a:rPr lang="es-AR" sz="2400" dirty="0">
+                <a:solidFill>
+                  <a:schemeClr val="tx1">
+                    <a:lumMod val="50000"/>
+                    <a:lumOff val="50000"/>
+                  </a:schemeClr>
+                </a:solidFill>
+              </a:rPr>
+              <a:t>una </a:t>
+            </a:r>
+            <a:r>
+              <a:rPr lang="es-AR" sz="2400" dirty="0" smtClean="0">
+                <a:solidFill>
+                  <a:schemeClr val="tx1">
+                    <a:lumMod val="50000"/>
+                    <a:lumOff val="50000"/>
+                  </a:schemeClr>
+                </a:solidFill>
+              </a:rPr>
+              <a:t>eventual.</a:t>
+            </a:r>
+          </a:p>
+          <a:p>
+            <a:pPr marL="285750" indent="-285750">
+              <a:buFontTx/>
+              <a:buChar char="-"/>
+            </a:pPr>
+            <a:r>
+              <a:rPr lang="es-AR" sz="2400" dirty="0" smtClean="0">
+                <a:solidFill>
+                  <a:schemeClr val="tx1">
+                    <a:lumMod val="50000"/>
+                    <a:lumOff val="50000"/>
+                  </a:schemeClr>
+                </a:solidFill>
+              </a:rPr>
+              <a:t>Equipo de trabajo sólido.</a:t>
             </a:r>
           </a:p>
         </p:txBody>
@@ -23027,7 +23332,7 @@
         <p:spPr>
           <a:xfrm>
             <a:off x="1007005" y="0"/>
-            <a:ext cx="7766936" cy="1300163"/>
+            <a:ext cx="8622770" cy="1300163"/>
           </a:xfrm>
         </p:spPr>
         <p:txBody>
@@ -23036,9 +23341,162 @@
           <a:p>
             <a:pPr lvl="0" algn="l"/>
             <a:r>
-              <a:rPr lang="es-ES" dirty="0"/>
+              <a:rPr lang="es-ES" dirty="0" smtClean="0"/>
               <a:t>Debilidades:</a:t>
             </a:r>
+            <a:endParaRPr lang="es-ES" dirty="0"/>
+          </a:p>
+        </p:txBody>
+      </p:sp>
+      <p:sp>
+        <p:nvSpPr>
+          <p:cNvPr id="6" name="CuadroTexto 5"/>
+          <p:cNvSpPr txBox="1"/>
+          <p:nvPr/>
+        </p:nvSpPr>
+        <p:spPr>
+          <a:xfrm>
+            <a:off x="1007005" y="1300163"/>
+            <a:ext cx="8622769" cy="2954655"/>
+          </a:xfrm>
+          <a:prstGeom prst="rect">
+            <a:avLst/>
+          </a:prstGeom>
+          <a:noFill/>
+        </p:spPr>
+        <p:txBody>
+          <a:bodyPr wrap="square" rtlCol="0">
+            <a:spAutoFit/>
+          </a:bodyPr>
+          <a:lstStyle/>
+          <a:p>
+            <a:pPr marL="285750" indent="-285750">
+              <a:buFontTx/>
+              <a:buChar char="-"/>
+            </a:pPr>
+            <a:endParaRPr lang="es-AR" sz="2400" dirty="0" smtClean="0">
+              <a:solidFill>
+                <a:schemeClr val="tx1">
+                  <a:lumMod val="50000"/>
+                  <a:lumOff val="50000"/>
+                </a:schemeClr>
+              </a:solidFill>
+            </a:endParaRPr>
+          </a:p>
+          <a:p>
+            <a:pPr marL="285750" indent="-285750">
+              <a:buFontTx/>
+              <a:buChar char="-"/>
+            </a:pPr>
+            <a:r>
+              <a:rPr lang="es-AR" sz="2400" dirty="0" err="1" smtClean="0">
+                <a:solidFill>
+                  <a:schemeClr val="tx1">
+                    <a:lumMod val="50000"/>
+                    <a:lumOff val="50000"/>
+                  </a:schemeClr>
+                </a:solidFill>
+              </a:rPr>
+              <a:t>Testing</a:t>
+            </a:r>
+            <a:r>
+              <a:rPr lang="es-AR" sz="2400" dirty="0" smtClean="0">
+                <a:solidFill>
+                  <a:schemeClr val="tx1">
+                    <a:lumMod val="50000"/>
+                    <a:lumOff val="50000"/>
+                  </a:schemeClr>
+                </a:solidFill>
+              </a:rPr>
+              <a:t> </a:t>
+            </a:r>
+            <a:r>
+              <a:rPr lang="es-AR" sz="2400" dirty="0">
+                <a:solidFill>
+                  <a:schemeClr val="tx1">
+                    <a:lumMod val="50000"/>
+                    <a:lumOff val="50000"/>
+                  </a:schemeClr>
+                </a:solidFill>
+              </a:rPr>
+              <a:t>realizado únicamente de manera manual.</a:t>
+            </a:r>
+          </a:p>
+          <a:p>
+            <a:pPr marL="285750" indent="-285750">
+              <a:buFontTx/>
+              <a:buChar char="-"/>
+            </a:pPr>
+            <a:r>
+              <a:rPr lang="es-AR" sz="2400" dirty="0">
+                <a:solidFill>
+                  <a:schemeClr val="tx1">
+                    <a:lumMod val="50000"/>
+                    <a:lumOff val="50000"/>
+                  </a:schemeClr>
+                </a:solidFill>
+              </a:rPr>
+              <a:t>No permite aún establecer restricciones de acceso en los </a:t>
+            </a:r>
+            <a:r>
+              <a:rPr lang="es-AR" sz="2400" dirty="0" err="1">
+                <a:solidFill>
+                  <a:schemeClr val="tx1">
+                    <a:lumMod val="50000"/>
+                    <a:lumOff val="50000"/>
+                  </a:schemeClr>
+                </a:solidFill>
+              </a:rPr>
+              <a:t>logins</a:t>
+            </a:r>
+            <a:r>
+              <a:rPr lang="es-AR" sz="2400" dirty="0">
+                <a:solidFill>
+                  <a:schemeClr val="tx1">
+                    <a:lumMod val="50000"/>
+                    <a:lumOff val="50000"/>
+                  </a:schemeClr>
+                </a:solidFill>
+              </a:rPr>
+              <a:t>.</a:t>
+            </a:r>
+          </a:p>
+          <a:p>
+            <a:pPr marL="285750" indent="-285750">
+              <a:buFontTx/>
+              <a:buChar char="-"/>
+            </a:pPr>
+            <a:r>
+              <a:rPr lang="es-AR" sz="2400" dirty="0">
+                <a:solidFill>
+                  <a:schemeClr val="tx1">
+                    <a:lumMod val="50000"/>
+                    <a:lumOff val="50000"/>
+                  </a:schemeClr>
+                </a:solidFill>
+              </a:rPr>
+              <a:t>Necesidad de conectividad a internet para su utilización.</a:t>
+            </a:r>
+          </a:p>
+          <a:p>
+            <a:pPr marL="285750" indent="-285750">
+              <a:buFontTx/>
+              <a:buChar char="-"/>
+            </a:pPr>
+            <a:r>
+              <a:rPr lang="es-AR" sz="2400" dirty="0">
+                <a:solidFill>
+                  <a:schemeClr val="tx1">
+                    <a:lumMod val="50000"/>
+                    <a:lumOff val="50000"/>
+                  </a:schemeClr>
+                </a:solidFill>
+              </a:rPr>
+              <a:t>Es estrictamente orientado a lo educativo, no permitiendo manejar cuestiones contables.</a:t>
+            </a:r>
+          </a:p>
+          <a:p>
+            <a:endParaRPr lang="es-AR" dirty="0"/>
           </a:p>
         </p:txBody>
       </p:sp>
@@ -23173,8 +23631,8 @@
         </p:nvSpPr>
         <p:spPr>
           <a:xfrm>
-            <a:off x="1007005" y="0"/>
-            <a:ext cx="7766936" cy="1300163"/>
+            <a:off x="1007004" y="0"/>
+            <a:ext cx="8765645" cy="1300163"/>
           </a:xfrm>
         </p:spPr>
         <p:txBody>
@@ -23183,9 +23641,178 @@
           <a:p>
             <a:pPr lvl="0" algn="l"/>
             <a:r>
-              <a:rPr lang="es-ES" dirty="0"/>
+              <a:rPr lang="es-ES" dirty="0" smtClean="0"/>
               <a:t>Oportunidades:</a:t>
             </a:r>
+            <a:endParaRPr lang="es-ES" dirty="0"/>
+          </a:p>
+        </p:txBody>
+      </p:sp>
+      <p:sp>
+        <p:nvSpPr>
+          <p:cNvPr id="5" name="CuadroTexto 4"/>
+          <p:cNvSpPr txBox="1"/>
+          <p:nvPr/>
+        </p:nvSpPr>
+        <p:spPr>
+          <a:xfrm>
+            <a:off x="1007004" y="1300163"/>
+            <a:ext cx="8579909" cy="4431983"/>
+          </a:xfrm>
+          <a:prstGeom prst="rect">
+            <a:avLst/>
+          </a:prstGeom>
+          <a:noFill/>
+        </p:spPr>
+        <p:txBody>
+          <a:bodyPr wrap="square" rtlCol="0">
+            <a:spAutoFit/>
+          </a:bodyPr>
+          <a:lstStyle/>
+          <a:p>
+            <a:pPr marL="285750" indent="-285750">
+              <a:buFontTx/>
+              <a:buChar char="-"/>
+            </a:pPr>
+            <a:endParaRPr lang="es-AR" sz="2400" dirty="0" smtClean="0">
+              <a:solidFill>
+                <a:schemeClr val="tx1">
+                  <a:lumMod val="50000"/>
+                  <a:lumOff val="50000"/>
+                </a:schemeClr>
+              </a:solidFill>
+            </a:endParaRPr>
+          </a:p>
+          <a:p>
+            <a:pPr marL="285750" indent="-285750">
+              <a:buFontTx/>
+              <a:buChar char="-"/>
+            </a:pPr>
+            <a:r>
+              <a:rPr lang="es-AR" sz="2400" dirty="0" smtClean="0">
+                <a:solidFill>
+                  <a:schemeClr val="tx1">
+                    <a:lumMod val="50000"/>
+                    <a:lumOff val="50000"/>
+                  </a:schemeClr>
+                </a:solidFill>
+              </a:rPr>
+              <a:t>El </a:t>
+            </a:r>
+            <a:r>
+              <a:rPr lang="es-AR" sz="2400" dirty="0">
+                <a:solidFill>
+                  <a:schemeClr val="tx1">
+                    <a:lumMod val="50000"/>
+                    <a:lumOff val="50000"/>
+                  </a:schemeClr>
+                </a:solidFill>
+              </a:rPr>
+              <a:t>Centro de Formación no cuenta actualmente con un sitio web propio a medida de sus necesidades administrativas cotidianas.</a:t>
+            </a:r>
+          </a:p>
+          <a:p>
+            <a:pPr marL="285750" indent="-285750">
+              <a:buFontTx/>
+              <a:buChar char="-"/>
+            </a:pPr>
+            <a:r>
+              <a:rPr lang="es-AR" sz="2400" dirty="0">
+                <a:solidFill>
+                  <a:schemeClr val="tx1">
+                    <a:lumMod val="50000"/>
+                    <a:lumOff val="50000"/>
+                  </a:schemeClr>
+                </a:solidFill>
+              </a:rPr>
+              <a:t>Crecimiento sostenido del Centro de Formación en cuanto a cantidad de cursos y alumnos, lo cual permitirá la mejora continua del producto para hacer frente a las eventuales necesidades del usuario</a:t>
+            </a:r>
+          </a:p>
+          <a:p>
+            <a:pPr marL="285750" indent="-285750">
+              <a:buFontTx/>
+              <a:buChar char="-"/>
+            </a:pPr>
+            <a:r>
+              <a:rPr lang="es-AR" sz="2400" dirty="0">
+                <a:solidFill>
+                  <a:schemeClr val="tx1">
+                    <a:lumMod val="50000"/>
+                    <a:lumOff val="50000"/>
+                  </a:schemeClr>
+                </a:solidFill>
+              </a:rPr>
+              <a:t>Las tecnologías utilizadas están en constante </a:t>
+            </a:r>
+            <a:r>
+              <a:rPr lang="es-AR" sz="2400" dirty="0" smtClean="0">
+                <a:solidFill>
+                  <a:schemeClr val="tx1">
+                    <a:lumMod val="50000"/>
+                    <a:lumOff val="50000"/>
+                  </a:schemeClr>
+                </a:solidFill>
+              </a:rPr>
+              <a:t>progreso </a:t>
+            </a:r>
+            <a:r>
+              <a:rPr lang="es-AR" sz="2400" dirty="0">
+                <a:solidFill>
+                  <a:schemeClr val="tx1">
+                    <a:lumMod val="50000"/>
+                    <a:lumOff val="50000"/>
+                  </a:schemeClr>
+                </a:solidFill>
+              </a:rPr>
+              <a:t>y popularidad, lo que </a:t>
+            </a:r>
+            <a:r>
+              <a:rPr lang="es-AR" sz="2400" dirty="0" smtClean="0">
+                <a:solidFill>
+                  <a:schemeClr val="tx1">
+                    <a:lumMod val="50000"/>
+                    <a:lumOff val="50000"/>
+                  </a:schemeClr>
+                </a:solidFill>
+              </a:rPr>
+              <a:t>garantiza mejoras </a:t>
+            </a:r>
+            <a:r>
+              <a:rPr lang="es-AR" sz="2400" dirty="0">
+                <a:solidFill>
+                  <a:schemeClr val="tx1">
+                    <a:lumMod val="50000"/>
+                    <a:lumOff val="50000"/>
+                  </a:schemeClr>
+                </a:solidFill>
+              </a:rPr>
+              <a:t>en el sistema de manera </a:t>
+            </a:r>
+            <a:r>
+              <a:rPr lang="es-AR" sz="2400" dirty="0" smtClean="0">
+                <a:solidFill>
+                  <a:schemeClr val="tx1">
+                    <a:lumMod val="50000"/>
+                    <a:lumOff val="50000"/>
+                  </a:schemeClr>
+                </a:solidFill>
+              </a:rPr>
+              <a:t>sumamente </a:t>
+            </a:r>
+            <a:r>
+              <a:rPr lang="es-AR" sz="2400" dirty="0">
+                <a:solidFill>
+                  <a:schemeClr val="tx1">
+                    <a:lumMod val="50000"/>
+                    <a:lumOff val="50000"/>
+                  </a:schemeClr>
+                </a:solidFill>
+              </a:rPr>
+              <a:t>eficientes en el futuro. </a:t>
+            </a:r>
+          </a:p>
+          <a:p>
+            <a:endParaRPr lang="es-AR" dirty="0"/>
           </a:p>
         </p:txBody>
       </p:sp>
@@ -23333,6 +23960,119 @@
               <a:rPr lang="es-ES" dirty="0"/>
               <a:t>Amenazas:</a:t>
             </a:r>
+          </a:p>
+        </p:txBody>
+      </p:sp>
+      <p:sp>
+        <p:nvSpPr>
+          <p:cNvPr id="4" name="CuadroTexto 3"/>
+          <p:cNvSpPr txBox="1"/>
+          <p:nvPr/>
+        </p:nvSpPr>
+        <p:spPr>
+          <a:xfrm>
+            <a:off x="1007005" y="1300163"/>
+            <a:ext cx="8608483" cy="2954655"/>
+          </a:xfrm>
+          <a:prstGeom prst="rect">
+            <a:avLst/>
+          </a:prstGeom>
+          <a:noFill/>
+        </p:spPr>
+        <p:txBody>
+          <a:bodyPr wrap="square" rtlCol="0">
+            <a:spAutoFit/>
+          </a:bodyPr>
+          <a:lstStyle/>
+          <a:p>
+            <a:pPr marL="285750" indent="-285750">
+              <a:buFontTx/>
+              <a:buChar char="-"/>
+            </a:pPr>
+            <a:endParaRPr lang="es-AR" sz="2400" dirty="0" smtClean="0">
+              <a:solidFill>
+                <a:schemeClr val="tx1">
+                  <a:lumMod val="50000"/>
+                  <a:lumOff val="50000"/>
+                </a:schemeClr>
+              </a:solidFill>
+            </a:endParaRPr>
+          </a:p>
+          <a:p>
+            <a:pPr marL="285750" indent="-285750">
+              <a:buFontTx/>
+              <a:buChar char="-"/>
+            </a:pPr>
+            <a:r>
+              <a:rPr lang="es-AR" sz="2400" dirty="0" smtClean="0">
+                <a:solidFill>
+                  <a:schemeClr val="tx1">
+                    <a:lumMod val="50000"/>
+                    <a:lumOff val="50000"/>
+                  </a:schemeClr>
+                </a:solidFill>
+              </a:rPr>
+              <a:t>Alta </a:t>
+            </a:r>
+            <a:r>
+              <a:rPr lang="es-AR" sz="2400" dirty="0">
+                <a:solidFill>
+                  <a:schemeClr val="tx1">
+                    <a:lumMod val="50000"/>
+                    <a:lumOff val="50000"/>
+                  </a:schemeClr>
+                </a:solidFill>
+              </a:rPr>
+              <a:t>influencia de las decisiones gubernamentales sobre las funcionalidades que debe permitir el sistema.</a:t>
+            </a:r>
+          </a:p>
+          <a:p>
+            <a:pPr marL="285750" indent="-285750">
+              <a:buFontTx/>
+              <a:buChar char="-"/>
+            </a:pPr>
+            <a:r>
+              <a:rPr lang="es-AR" sz="2400" dirty="0">
+                <a:solidFill>
+                  <a:schemeClr val="tx1">
+                    <a:lumMod val="50000"/>
+                    <a:lumOff val="50000"/>
+                  </a:schemeClr>
+                </a:solidFill>
+              </a:rPr>
+              <a:t>Nuevos competidores.</a:t>
+            </a:r>
+          </a:p>
+          <a:p>
+            <a:pPr marL="285750" indent="-285750">
+              <a:buFontTx/>
+              <a:buChar char="-"/>
+            </a:pPr>
+            <a:r>
+              <a:rPr lang="es-AR" sz="2400" dirty="0" smtClean="0">
+                <a:solidFill>
+                  <a:schemeClr val="tx1">
+                    <a:lumMod val="50000"/>
+                    <a:lumOff val="50000"/>
+                  </a:schemeClr>
+                </a:solidFill>
+              </a:rPr>
+              <a:t>Debido a la situación económica del país, se cuenta con poca </a:t>
+            </a:r>
+            <a:r>
+              <a:rPr lang="es-AR" sz="2400" dirty="0">
+                <a:solidFill>
+                  <a:schemeClr val="tx1">
+                    <a:lumMod val="50000"/>
+                    <a:lumOff val="50000"/>
+                  </a:schemeClr>
+                </a:solidFill>
+              </a:rPr>
+              <a:t>capacidad de inversión en recursos tanto humanos como tecnológicos.</a:t>
+            </a:r>
+          </a:p>
+          <a:p>
+            <a:endParaRPr lang="es-AR" dirty="0"/>
           </a:p>
         </p:txBody>
       </p:sp>

</xml_diff>